<commit_message>
adding full pre release lection #2 pptx file
</commit_message>
<xml_diff>
--- a/lections/cpp_craft_lec_2_pre.pptx
+++ b/lections/cpp_craft_lec_2_pre.pptx
@@ -17,6 +17,23 @@
     <p:sldId id="265" r:id="rId11"/>
     <p:sldId id="266" r:id="rId12"/>
     <p:sldId id="267" r:id="rId13"/>
+    <p:sldId id="268" r:id="rId14"/>
+    <p:sldId id="269" r:id="rId15"/>
+    <p:sldId id="270" r:id="rId16"/>
+    <p:sldId id="271" r:id="rId17"/>
+    <p:sldId id="272" r:id="rId18"/>
+    <p:sldId id="273" r:id="rId19"/>
+    <p:sldId id="274" r:id="rId20"/>
+    <p:sldId id="275" r:id="rId21"/>
+    <p:sldId id="276" r:id="rId22"/>
+    <p:sldId id="277" r:id="rId23"/>
+    <p:sldId id="278" r:id="rId24"/>
+    <p:sldId id="279" r:id="rId25"/>
+    <p:sldId id="280" r:id="rId26"/>
+    <p:sldId id="281" r:id="rId27"/>
+    <p:sldId id="282" r:id="rId28"/>
+    <p:sldId id="283" r:id="rId29"/>
+    <p:sldId id="284" r:id="rId30"/>
   </p:sldIdLst>
   <p:sldSz cx="9144000" cy="6858000" type="screen4x3"/>
   <p:notesSz cx="6858000" cy="9144000"/>
@@ -300,7 +317,7 @@
             <a:fld id="{8281312E-8B3E-4748-9BAE-A66E5A6CC2C8}" type="datetimeFigureOut">
               <a:rPr lang="en-US" smtClean="0"/>
               <a:pPr/>
-              <a:t>10/9/2013</a:t>
+              <a:t>10/10/2013</a:t>
             </a:fld>
             <a:endParaRPr lang="en-US"/>
           </a:p>
@@ -467,7 +484,7 @@
             <a:fld id="{8281312E-8B3E-4748-9BAE-A66E5A6CC2C8}" type="datetimeFigureOut">
               <a:rPr lang="en-US" smtClean="0"/>
               <a:pPr/>
-              <a:t>10/9/2013</a:t>
+              <a:t>10/10/2013</a:t>
             </a:fld>
             <a:endParaRPr lang="en-US"/>
           </a:p>
@@ -644,7 +661,7 @@
             <a:fld id="{8281312E-8B3E-4748-9BAE-A66E5A6CC2C8}" type="datetimeFigureOut">
               <a:rPr lang="en-US" smtClean="0"/>
               <a:pPr/>
-              <a:t>10/9/2013</a:t>
+              <a:t>10/10/2013</a:t>
             </a:fld>
             <a:endParaRPr lang="en-US"/>
           </a:p>
@@ -811,7 +828,7 @@
             <a:fld id="{8281312E-8B3E-4748-9BAE-A66E5A6CC2C8}" type="datetimeFigureOut">
               <a:rPr lang="en-US" smtClean="0"/>
               <a:pPr/>
-              <a:t>10/9/2013</a:t>
+              <a:t>10/10/2013</a:t>
             </a:fld>
             <a:endParaRPr lang="en-US"/>
           </a:p>
@@ -1054,7 +1071,7 @@
             <a:fld id="{8281312E-8B3E-4748-9BAE-A66E5A6CC2C8}" type="datetimeFigureOut">
               <a:rPr lang="en-US" smtClean="0"/>
               <a:pPr/>
-              <a:t>10/9/2013</a:t>
+              <a:t>10/10/2013</a:t>
             </a:fld>
             <a:endParaRPr lang="en-US"/>
           </a:p>
@@ -1339,7 +1356,7 @@
             <a:fld id="{8281312E-8B3E-4748-9BAE-A66E5A6CC2C8}" type="datetimeFigureOut">
               <a:rPr lang="en-US" smtClean="0"/>
               <a:pPr/>
-              <a:t>10/9/2013</a:t>
+              <a:t>10/10/2013</a:t>
             </a:fld>
             <a:endParaRPr lang="en-US"/>
           </a:p>
@@ -1758,7 +1775,7 @@
             <a:fld id="{8281312E-8B3E-4748-9BAE-A66E5A6CC2C8}" type="datetimeFigureOut">
               <a:rPr lang="en-US" smtClean="0"/>
               <a:pPr/>
-              <a:t>10/9/2013</a:t>
+              <a:t>10/10/2013</a:t>
             </a:fld>
             <a:endParaRPr lang="en-US"/>
           </a:p>
@@ -1873,7 +1890,7 @@
             <a:fld id="{8281312E-8B3E-4748-9BAE-A66E5A6CC2C8}" type="datetimeFigureOut">
               <a:rPr lang="en-US" smtClean="0"/>
               <a:pPr/>
-              <a:t>10/9/2013</a:t>
+              <a:t>10/10/2013</a:t>
             </a:fld>
             <a:endParaRPr lang="en-US"/>
           </a:p>
@@ -1965,7 +1982,7 @@
             <a:fld id="{8281312E-8B3E-4748-9BAE-A66E5A6CC2C8}" type="datetimeFigureOut">
               <a:rPr lang="en-US" smtClean="0"/>
               <a:pPr/>
-              <a:t>10/9/2013</a:t>
+              <a:t>10/10/2013</a:t>
             </a:fld>
             <a:endParaRPr lang="en-US"/>
           </a:p>
@@ -2239,7 +2256,7 @@
             <a:fld id="{8281312E-8B3E-4748-9BAE-A66E5A6CC2C8}" type="datetimeFigureOut">
               <a:rPr lang="en-US" smtClean="0"/>
               <a:pPr/>
-              <a:t>10/9/2013</a:t>
+              <a:t>10/10/2013</a:t>
             </a:fld>
             <a:endParaRPr lang="en-US"/>
           </a:p>
@@ -2489,7 +2506,7 @@
             <a:fld id="{8281312E-8B3E-4748-9BAE-A66E5A6CC2C8}" type="datetimeFigureOut">
               <a:rPr lang="en-US" smtClean="0"/>
               <a:pPr/>
-              <a:t>10/9/2013</a:t>
+              <a:t>10/10/2013</a:t>
             </a:fld>
             <a:endParaRPr lang="en-US"/>
           </a:p>
@@ -2699,7 +2716,7 @@
             <a:fld id="{8281312E-8B3E-4748-9BAE-A66E5A6CC2C8}" type="datetimeFigureOut">
               <a:rPr lang="en-US" smtClean="0"/>
               <a:pPr/>
-              <a:t>10/9/2013</a:t>
+              <a:t>10/10/2013</a:t>
             </a:fld>
             <a:endParaRPr lang="en-US"/>
           </a:p>
@@ -3091,11 +3108,7 @@
             </a:r>
             <a:r>
               <a:rPr lang="en-US" dirty="0" smtClean="0"/>
-              <a:t>Craft: </a:t>
-            </a:r>
-            <a:r>
-              <a:rPr lang="en-US" dirty="0" smtClean="0"/>
-              <a:t>#2</a:t>
+              <a:t>Craft: #2</a:t>
             </a:r>
             <a:endParaRPr lang="en-US" dirty="0"/>
           </a:p>
@@ -3635,7 +3648,11 @@
           <a:bodyPr/>
           <a:lstStyle/>
           <a:p>
-            <a:endParaRPr lang="en-US"/>
+            <a:r>
+              <a:rPr lang="en-US" dirty="0" smtClean="0"/>
+              <a:t>Boost</a:t>
+            </a:r>
+            <a:endParaRPr lang="en-US" dirty="0"/>
           </a:p>
         </p:txBody>
       </p:sp>
@@ -3649,12 +3666,2697 @@
             <p:ph idx="1"/>
           </p:nvPr>
         </p:nvSpPr>
+        <p:spPr>
+          <a:xfrm>
+            <a:off x="457200" y="1600200"/>
+            <a:ext cx="4114800" cy="4525963"/>
+          </a:xfrm>
+        </p:spPr>
+        <p:txBody>
+          <a:bodyPr>
+            <a:normAutofit/>
+          </a:bodyPr>
+          <a:lstStyle/>
+          <a:p>
+            <a:r>
+              <a:rPr lang="en-US" dirty="0" err="1" smtClean="0"/>
+              <a:t>date_time</a:t>
+            </a:r>
+            <a:endParaRPr lang="en-US" dirty="0" smtClean="0"/>
+          </a:p>
+          <a:p>
+            <a:r>
+              <a:rPr lang="en-US" dirty="0" err="1" smtClean="0"/>
+              <a:t>asio</a:t>
+            </a:r>
+            <a:r>
+              <a:rPr lang="en-US" dirty="0" smtClean="0"/>
+              <a:t>         {             </a:t>
+            </a:r>
+          </a:p>
+          <a:p>
+            <a:r>
+              <a:rPr lang="en-US" dirty="0" err="1" smtClean="0"/>
+              <a:t>smart_ptr</a:t>
+            </a:r>
+            <a:endParaRPr lang="en-US" dirty="0" smtClean="0"/>
+          </a:p>
+          <a:p>
+            <a:r>
+              <a:rPr lang="en-US" dirty="0" err="1" smtClean="0"/>
+              <a:t>filesystem</a:t>
+            </a:r>
+            <a:endParaRPr lang="en-US" dirty="0" smtClean="0"/>
+          </a:p>
+          <a:p>
+            <a:r>
+              <a:rPr lang="en-US" dirty="0" smtClean="0"/>
+              <a:t>thread</a:t>
+            </a:r>
+          </a:p>
+          <a:p>
+            <a:r>
+              <a:rPr lang="en-US" dirty="0" smtClean="0"/>
+              <a:t>a</a:t>
+            </a:r>
+            <a:r>
+              <a:rPr lang="en-US" dirty="0" smtClean="0"/>
+              <a:t>lgorithm</a:t>
+            </a:r>
+          </a:p>
+        </p:txBody>
+      </p:sp>
+      <p:sp>
+        <p:nvSpPr>
+          <p:cNvPr id="4" name="TextBox 3"/>
+          <p:cNvSpPr txBox="1"/>
+          <p:nvPr/>
+        </p:nvSpPr>
+        <p:spPr>
+          <a:xfrm>
+            <a:off x="2590800" y="1981200"/>
+            <a:ext cx="1600200" cy="954107"/>
+          </a:xfrm>
+          <a:prstGeom prst="rect">
+            <a:avLst/>
+          </a:prstGeom>
+          <a:noFill/>
+        </p:spPr>
+        <p:txBody>
+          <a:bodyPr wrap="square" rtlCol="0">
+            <a:spAutoFit/>
+          </a:bodyPr>
+          <a:lstStyle/>
+          <a:p>
+            <a:r>
+              <a:rPr lang="en-US" sz="2800" dirty="0" err="1" smtClean="0"/>
+              <a:t>t</a:t>
+            </a:r>
+            <a:r>
+              <a:rPr lang="en-US" sz="2800" dirty="0" err="1" smtClean="0"/>
+              <a:t>cp</a:t>
+            </a:r>
+            <a:endParaRPr lang="en-US" sz="2800" dirty="0" smtClean="0"/>
+          </a:p>
+          <a:p>
+            <a:r>
+              <a:rPr lang="en-US" sz="2800" dirty="0" err="1" smtClean="0"/>
+              <a:t>udp</a:t>
+            </a:r>
+            <a:endParaRPr lang="en-US" sz="2800" dirty="0"/>
+          </a:p>
+        </p:txBody>
+      </p:sp>
+      <p:sp>
+        <p:nvSpPr>
+          <p:cNvPr id="5" name="Rectangle 4"/>
+          <p:cNvSpPr/>
+          <p:nvPr/>
+        </p:nvSpPr>
+        <p:spPr>
+          <a:xfrm>
+            <a:off x="5105400" y="1676400"/>
+            <a:ext cx="3810000" cy="2554545"/>
+          </a:xfrm>
+          <a:prstGeom prst="rect">
+            <a:avLst/>
+          </a:prstGeom>
+        </p:spPr>
+        <p:txBody>
+          <a:bodyPr wrap="square">
+            <a:spAutoFit/>
+          </a:bodyPr>
+          <a:lstStyle/>
+          <a:p>
+            <a:pPr>
+              <a:buFont typeface="Arial" pitchFamily="34" charset="0"/>
+              <a:buChar char="•"/>
+            </a:pPr>
+            <a:r>
+              <a:rPr lang="en-US" sz="3200" dirty="0" smtClean="0"/>
+              <a:t>  </a:t>
+            </a:r>
+            <a:r>
+              <a:rPr lang="en-US" sz="3200" dirty="0" err="1" smtClean="0"/>
+              <a:t>interprocess</a:t>
+            </a:r>
+            <a:endParaRPr lang="en-US" sz="3200" dirty="0" smtClean="0"/>
+          </a:p>
+          <a:p>
+            <a:pPr>
+              <a:buFont typeface="Arial" pitchFamily="34" charset="0"/>
+              <a:buChar char="•"/>
+            </a:pPr>
+            <a:r>
+              <a:rPr lang="en-US" sz="3200" dirty="0" smtClean="0"/>
+              <a:t>  random</a:t>
+            </a:r>
+          </a:p>
+          <a:p>
+            <a:pPr>
+              <a:buFont typeface="Arial" pitchFamily="34" charset="0"/>
+              <a:buChar char="•"/>
+            </a:pPr>
+            <a:r>
+              <a:rPr lang="en-US" sz="3200" dirty="0" smtClean="0"/>
+              <a:t>  </a:t>
+            </a:r>
+            <a:r>
+              <a:rPr lang="en-US" sz="3200" dirty="0" err="1" smtClean="0"/>
+              <a:t>tuple</a:t>
+            </a:r>
+            <a:endParaRPr lang="en-US" sz="3200" dirty="0" smtClean="0"/>
+          </a:p>
+          <a:p>
+            <a:pPr>
+              <a:buFont typeface="Arial" pitchFamily="34" charset="0"/>
+              <a:buChar char="•"/>
+            </a:pPr>
+            <a:r>
+              <a:rPr lang="en-US" sz="3200" dirty="0" smtClean="0"/>
+              <a:t>  bind</a:t>
+            </a:r>
+          </a:p>
+          <a:p>
+            <a:pPr>
+              <a:buFont typeface="Arial" pitchFamily="34" charset="0"/>
+              <a:buChar char="•"/>
+            </a:pPr>
+            <a:r>
+              <a:rPr lang="en-US" sz="3200" dirty="0" smtClean="0"/>
+              <a:t>  </a:t>
+            </a:r>
+            <a:r>
+              <a:rPr lang="en-US" sz="3200" dirty="0" err="1" smtClean="0"/>
+              <a:t>regex</a:t>
+            </a:r>
+            <a:endParaRPr lang="en-US" sz="3200" dirty="0" smtClean="0"/>
+          </a:p>
+        </p:txBody>
+      </p:sp>
+    </p:spTree>
+  </p:cSld>
+  <p:clrMapOvr>
+    <a:masterClrMapping/>
+  </p:clrMapOvr>
+</p:sld>
+</file>
+
+<file path=ppt/slides/slide13.xml><?xml version="1.0" encoding="utf-8"?>
+<p:sld xmlns:a="http://schemas.openxmlformats.org/drawingml/2006/main" xmlns:r="http://schemas.openxmlformats.org/officeDocument/2006/relationships" xmlns:p="http://schemas.openxmlformats.org/presentationml/2006/main">
+  <p:cSld>
+    <p:spTree>
+      <p:nvGrpSpPr>
+        <p:cNvPr id="1" name=""/>
+        <p:cNvGrpSpPr/>
+        <p:nvPr/>
+      </p:nvGrpSpPr>
+      <p:grpSpPr>
+        <a:xfrm>
+          <a:off x="0" y="0"/>
+          <a:ext cx="0" cy="0"/>
+          <a:chOff x="0" y="0"/>
+          <a:chExt cx="0" cy="0"/>
+        </a:xfrm>
+      </p:grpSpPr>
+      <p:sp>
+        <p:nvSpPr>
+          <p:cNvPr id="2" name="Title 1"/>
+          <p:cNvSpPr>
+            <a:spLocks noGrp="1"/>
+          </p:cNvSpPr>
+          <p:nvPr>
+            <p:ph type="title"/>
+          </p:nvPr>
+        </p:nvSpPr>
         <p:spPr/>
         <p:txBody>
           <a:bodyPr/>
           <a:lstStyle/>
           <a:p>
-            <a:endParaRPr lang="en-US"/>
+            <a:r>
+              <a:rPr lang="en-US" dirty="0" smtClean="0"/>
+              <a:t>RAII</a:t>
+            </a:r>
+            <a:endParaRPr lang="en-US" dirty="0"/>
+          </a:p>
+        </p:txBody>
+      </p:sp>
+      <p:sp>
+        <p:nvSpPr>
+          <p:cNvPr id="3" name="Content Placeholder 2"/>
+          <p:cNvSpPr>
+            <a:spLocks noGrp="1"/>
+          </p:cNvSpPr>
+          <p:nvPr>
+            <p:ph idx="1"/>
+          </p:nvPr>
+        </p:nvSpPr>
+        <p:spPr/>
+        <p:txBody>
+          <a:bodyPr/>
+          <a:lstStyle/>
+          <a:p>
+            <a:r>
+              <a:rPr lang="en-US" dirty="0" smtClean="0">
+                <a:hlinkClick r:id="rId2"/>
+              </a:rPr>
+              <a:t>http://</a:t>
+            </a:r>
+            <a:r>
+              <a:rPr lang="en-US" dirty="0" smtClean="0">
+                <a:hlinkClick r:id="rId2"/>
+              </a:rPr>
+              <a:t>en.wikipedia.org/wiki/Resource_Acquisition_Is_Initialization</a:t>
+            </a:r>
+            <a:endParaRPr lang="en-US" dirty="0" smtClean="0"/>
+          </a:p>
+          <a:p>
+            <a:endParaRPr lang="en-US" dirty="0" smtClean="0"/>
+          </a:p>
+          <a:p>
+            <a:r>
+              <a:rPr lang="en-US" dirty="0" smtClean="0"/>
+              <a:t>b</a:t>
+            </a:r>
+            <a:r>
+              <a:rPr lang="en-US" dirty="0" smtClean="0"/>
+              <a:t>oost::</a:t>
+            </a:r>
+            <a:r>
+              <a:rPr lang="en-US" dirty="0" err="1" smtClean="0"/>
+              <a:t>shared_ptr</a:t>
+            </a:r>
+            <a:r>
+              <a:rPr lang="en-US" dirty="0" smtClean="0"/>
+              <a:t>&lt; T &gt;</a:t>
+            </a:r>
+          </a:p>
+          <a:p>
+            <a:r>
+              <a:rPr lang="en-US" dirty="0" smtClean="0"/>
+              <a:t>boost::</a:t>
+            </a:r>
+            <a:r>
+              <a:rPr lang="en-US" dirty="0" err="1" smtClean="0"/>
+              <a:t>scoped_ptr</a:t>
+            </a:r>
+            <a:r>
+              <a:rPr lang="en-US" dirty="0" smtClean="0"/>
+              <a:t>&lt; T &gt; </a:t>
+            </a:r>
+          </a:p>
+          <a:p>
+            <a:endParaRPr lang="en-US" dirty="0" smtClean="0"/>
+          </a:p>
+          <a:p>
+            <a:r>
+              <a:rPr lang="en-US" strike="sngStrike" dirty="0" smtClean="0"/>
+              <a:t>std::</a:t>
+            </a:r>
+            <a:r>
+              <a:rPr lang="en-US" strike="sngStrike" dirty="0" err="1" smtClean="0"/>
+              <a:t>auto_ptr</a:t>
+            </a:r>
+            <a:r>
+              <a:rPr lang="en-US" strike="sngStrike" dirty="0" smtClean="0"/>
+              <a:t>&lt; T &gt;</a:t>
+            </a:r>
+            <a:endParaRPr lang="en-US" strike="sngStrike" dirty="0"/>
+          </a:p>
+        </p:txBody>
+      </p:sp>
+    </p:spTree>
+  </p:cSld>
+  <p:clrMapOvr>
+    <a:masterClrMapping/>
+  </p:clrMapOvr>
+</p:sld>
+</file>
+
+<file path=ppt/slides/slide14.xml><?xml version="1.0" encoding="utf-8"?>
+<p:sld xmlns:a="http://schemas.openxmlformats.org/drawingml/2006/main" xmlns:r="http://schemas.openxmlformats.org/officeDocument/2006/relationships" xmlns:p="http://schemas.openxmlformats.org/presentationml/2006/main">
+  <p:cSld>
+    <p:spTree>
+      <p:nvGrpSpPr>
+        <p:cNvPr id="1" name=""/>
+        <p:cNvGrpSpPr/>
+        <p:nvPr/>
+      </p:nvGrpSpPr>
+      <p:grpSpPr>
+        <a:xfrm>
+          <a:off x="0" y="0"/>
+          <a:ext cx="0" cy="0"/>
+          <a:chOff x="0" y="0"/>
+          <a:chExt cx="0" cy="0"/>
+        </a:xfrm>
+      </p:grpSpPr>
+      <p:sp>
+        <p:nvSpPr>
+          <p:cNvPr id="2" name="Title 1"/>
+          <p:cNvSpPr>
+            <a:spLocks noGrp="1"/>
+          </p:cNvSpPr>
+          <p:nvPr>
+            <p:ph type="title"/>
+          </p:nvPr>
+        </p:nvSpPr>
+        <p:spPr/>
+        <p:txBody>
+          <a:bodyPr/>
+          <a:lstStyle/>
+          <a:p>
+            <a:r>
+              <a:rPr lang="en-US" dirty="0" smtClean="0"/>
+              <a:t>STL</a:t>
+            </a:r>
+            <a:endParaRPr lang="en-US" dirty="0"/>
+          </a:p>
+        </p:txBody>
+      </p:sp>
+      <p:sp>
+        <p:nvSpPr>
+          <p:cNvPr id="3" name="Content Placeholder 2"/>
+          <p:cNvSpPr>
+            <a:spLocks noGrp="1"/>
+          </p:cNvSpPr>
+          <p:nvPr>
+            <p:ph idx="1"/>
+          </p:nvPr>
+        </p:nvSpPr>
+        <p:spPr/>
+        <p:txBody>
+          <a:bodyPr/>
+          <a:lstStyle/>
+          <a:p>
+            <a:r>
+              <a:rPr lang="en-US" dirty="0" err="1" smtClean="0"/>
+              <a:t>Standart</a:t>
+            </a:r>
+            <a:r>
+              <a:rPr lang="en-US" dirty="0" smtClean="0"/>
+              <a:t> Template Library</a:t>
+            </a:r>
+          </a:p>
+          <a:p>
+            <a:endParaRPr lang="en-US" dirty="0" smtClean="0"/>
+          </a:p>
+          <a:p>
+            <a:pPr>
+              <a:buNone/>
+            </a:pPr>
+            <a:endParaRPr lang="en-US" dirty="0" smtClean="0"/>
+          </a:p>
+          <a:p>
+            <a:r>
+              <a:rPr lang="en-US" dirty="0" smtClean="0"/>
+              <a:t>Templates</a:t>
+            </a:r>
+          </a:p>
+          <a:p>
+            <a:r>
+              <a:rPr lang="en-US" dirty="0" smtClean="0"/>
+              <a:t>Algorithms</a:t>
+            </a:r>
+          </a:p>
+          <a:p>
+            <a:r>
+              <a:rPr lang="en-US" dirty="0" err="1" smtClean="0"/>
+              <a:t>Iterators</a:t>
+            </a:r>
+            <a:endParaRPr lang="en-US" dirty="0" smtClean="0"/>
+          </a:p>
+        </p:txBody>
+      </p:sp>
+    </p:spTree>
+  </p:cSld>
+  <p:clrMapOvr>
+    <a:masterClrMapping/>
+  </p:clrMapOvr>
+</p:sld>
+</file>
+
+<file path=ppt/slides/slide15.xml><?xml version="1.0" encoding="utf-8"?>
+<p:sld xmlns:a="http://schemas.openxmlformats.org/drawingml/2006/main" xmlns:r="http://schemas.openxmlformats.org/officeDocument/2006/relationships" xmlns:p="http://schemas.openxmlformats.org/presentationml/2006/main">
+  <p:cSld>
+    <p:spTree>
+      <p:nvGrpSpPr>
+        <p:cNvPr id="1" name=""/>
+        <p:cNvGrpSpPr/>
+        <p:nvPr/>
+      </p:nvGrpSpPr>
+      <p:grpSpPr>
+        <a:xfrm>
+          <a:off x="0" y="0"/>
+          <a:ext cx="0" cy="0"/>
+          <a:chOff x="0" y="0"/>
+          <a:chExt cx="0" cy="0"/>
+        </a:xfrm>
+      </p:grpSpPr>
+      <p:sp>
+        <p:nvSpPr>
+          <p:cNvPr id="2" name="Title 1"/>
+          <p:cNvSpPr>
+            <a:spLocks noGrp="1"/>
+          </p:cNvSpPr>
+          <p:nvPr>
+            <p:ph type="title"/>
+          </p:nvPr>
+        </p:nvSpPr>
+        <p:spPr/>
+        <p:txBody>
+          <a:bodyPr/>
+          <a:lstStyle/>
+          <a:p>
+            <a:r>
+              <a:rPr lang="en-US" dirty="0" smtClean="0"/>
+              <a:t>std::vector</a:t>
+            </a:r>
+            <a:endParaRPr lang="en-US" dirty="0"/>
+          </a:p>
+        </p:txBody>
+      </p:sp>
+      <p:graphicFrame>
+        <p:nvGraphicFramePr>
+          <p:cNvPr id="4" name="Content Placeholder 3"/>
+          <p:cNvGraphicFramePr>
+            <a:graphicFrameLocks noGrp="1"/>
+          </p:cNvGraphicFramePr>
+          <p:nvPr>
+            <p:ph idx="1"/>
+          </p:nvPr>
+        </p:nvGraphicFramePr>
+        <p:xfrm>
+          <a:off x="4572000" y="1981200"/>
+          <a:ext cx="838200" cy="304800"/>
+        </p:xfrm>
+        <a:graphic>
+          <a:graphicData uri="http://schemas.openxmlformats.org/drawingml/2006/table">
+            <a:tbl>
+              <a:tblPr firstRow="1" bandRow="1">
+                <a:tableStyleId>{5C22544A-7EE6-4342-B048-85BDC9FD1C3A}</a:tableStyleId>
+              </a:tblPr>
+              <a:tblGrid>
+                <a:gridCol w="419100"/>
+                <a:gridCol w="419100"/>
+              </a:tblGrid>
+              <a:tr h="304800">
+                <a:tc>
+                  <a:txBody>
+                    <a:bodyPr/>
+                    <a:lstStyle/>
+                    <a:p>
+                      <a:endParaRPr lang="en-US" sz="1400" b="0" dirty="0"/>
+                    </a:p>
+                  </a:txBody>
+                  <a:tcPr/>
+                </a:tc>
+                <a:tc>
+                  <a:txBody>
+                    <a:bodyPr/>
+                    <a:lstStyle/>
+                    <a:p>
+                      <a:endParaRPr lang="en-US" sz="1400" b="0" dirty="0"/>
+                    </a:p>
+                  </a:txBody>
+                  <a:tcPr/>
+                </a:tc>
+              </a:tr>
+            </a:tbl>
+          </a:graphicData>
+        </a:graphic>
+      </p:graphicFrame>
+      <p:sp>
+        <p:nvSpPr>
+          <p:cNvPr id="5" name="TextBox 4"/>
+          <p:cNvSpPr txBox="1"/>
+          <p:nvPr/>
+        </p:nvSpPr>
+        <p:spPr>
+          <a:xfrm>
+            <a:off x="1219200" y="1981200"/>
+            <a:ext cx="2363211" cy="369332"/>
+          </a:xfrm>
+          <a:prstGeom prst="rect">
+            <a:avLst/>
+          </a:prstGeom>
+          <a:noFill/>
+        </p:spPr>
+        <p:txBody>
+          <a:bodyPr wrap="none" rtlCol="0">
+            <a:spAutoFit/>
+          </a:bodyPr>
+          <a:lstStyle/>
+          <a:p>
+            <a:r>
+              <a:rPr lang="en-US" dirty="0" smtClean="0"/>
+              <a:t>std::vector&lt; </a:t>
+            </a:r>
+            <a:r>
+              <a:rPr lang="en-US" dirty="0" err="1" smtClean="0"/>
+              <a:t>int</a:t>
+            </a:r>
+            <a:r>
+              <a:rPr lang="en-US" dirty="0" smtClean="0"/>
+              <a:t> &gt; array;</a:t>
+            </a:r>
+            <a:endParaRPr lang="en-US" dirty="0"/>
+          </a:p>
+        </p:txBody>
+      </p:sp>
+      <p:sp>
+        <p:nvSpPr>
+          <p:cNvPr id="6" name="Rectangle 5"/>
+          <p:cNvSpPr/>
+          <p:nvPr/>
+        </p:nvSpPr>
+        <p:spPr>
+          <a:xfrm>
+            <a:off x="1219200" y="2514600"/>
+            <a:ext cx="5272469" cy="3139321"/>
+          </a:xfrm>
+          <a:prstGeom prst="rect">
+            <a:avLst/>
+          </a:prstGeom>
+        </p:spPr>
+        <p:txBody>
+          <a:bodyPr wrap="none">
+            <a:spAutoFit/>
+          </a:bodyPr>
+          <a:lstStyle/>
+          <a:p>
+            <a:r>
+              <a:rPr lang="en-US" dirty="0" err="1" smtClean="0"/>
+              <a:t>array.push_back</a:t>
+            </a:r>
+            <a:r>
+              <a:rPr lang="en-US" dirty="0" smtClean="0"/>
+              <a:t>(12 );</a:t>
+            </a:r>
+          </a:p>
+          <a:p>
+            <a:r>
+              <a:rPr lang="en-US" dirty="0" err="1" smtClean="0"/>
+              <a:t>array.push_back</a:t>
+            </a:r>
+            <a:r>
+              <a:rPr lang="en-US" dirty="0" smtClean="0"/>
+              <a:t>(45);</a:t>
+            </a:r>
+            <a:endParaRPr lang="en-US" dirty="0" smtClean="0"/>
+          </a:p>
+          <a:p>
+            <a:endParaRPr lang="en-US" dirty="0" smtClean="0"/>
+          </a:p>
+          <a:p>
+            <a:r>
+              <a:rPr lang="en-US" dirty="0" err="1" smtClean="0"/>
+              <a:t>array.push_back</a:t>
+            </a:r>
+            <a:r>
+              <a:rPr lang="en-US" dirty="0" smtClean="0"/>
+              <a:t>(67);</a:t>
+            </a:r>
+            <a:endParaRPr lang="en-US" dirty="0" smtClean="0"/>
+          </a:p>
+          <a:p>
+            <a:r>
+              <a:rPr lang="en-US" dirty="0" err="1" smtClean="0"/>
+              <a:t>array.push_back</a:t>
+            </a:r>
+            <a:r>
+              <a:rPr lang="en-US" dirty="0" smtClean="0"/>
+              <a:t>(89);</a:t>
+            </a:r>
+            <a:endParaRPr lang="en-US" dirty="0" smtClean="0"/>
+          </a:p>
+          <a:p>
+            <a:endParaRPr lang="en-US" dirty="0" smtClean="0"/>
+          </a:p>
+          <a:p>
+            <a:r>
+              <a:rPr lang="en-US" dirty="0" err="1" smtClean="0"/>
+              <a:t>array.push_back</a:t>
+            </a:r>
+            <a:r>
+              <a:rPr lang="en-US" dirty="0" smtClean="0"/>
+              <a:t>(11);</a:t>
+            </a:r>
+            <a:endParaRPr lang="en-US" dirty="0" smtClean="0"/>
+          </a:p>
+          <a:p>
+            <a:r>
+              <a:rPr lang="en-US" dirty="0" err="1" smtClean="0"/>
+              <a:t>array.push_back</a:t>
+            </a:r>
+            <a:r>
+              <a:rPr lang="en-US" dirty="0" smtClean="0"/>
+              <a:t>(22);</a:t>
+            </a:r>
+          </a:p>
+          <a:p>
+            <a:endParaRPr lang="en-US" dirty="0" smtClean="0"/>
+          </a:p>
+          <a:p>
+            <a:r>
+              <a:rPr lang="en-US" dirty="0" err="1" smtClean="0"/>
+              <a:t>a.erase</a:t>
+            </a:r>
+            <a:r>
+              <a:rPr lang="en-US" dirty="0" smtClean="0"/>
+              <a:t>( std::remove( </a:t>
+            </a:r>
+            <a:r>
+              <a:rPr lang="en-US" dirty="0" err="1" smtClean="0"/>
+              <a:t>a.begin</a:t>
+            </a:r>
+            <a:r>
+              <a:rPr lang="en-US" dirty="0" smtClean="0"/>
+              <a:t>(), </a:t>
+            </a:r>
+            <a:r>
+              <a:rPr lang="en-US" dirty="0" err="1" smtClean="0"/>
+              <a:t>a.end</a:t>
+            </a:r>
+            <a:r>
+              <a:rPr lang="en-US" dirty="0" smtClean="0"/>
+              <a:t>(), </a:t>
+            </a:r>
+            <a:r>
+              <a:rPr lang="en-US" dirty="0" smtClean="0"/>
+              <a:t>45 </a:t>
+            </a:r>
+            <a:r>
+              <a:rPr lang="en-US" dirty="0" smtClean="0"/>
+              <a:t>), </a:t>
+            </a:r>
+            <a:r>
+              <a:rPr lang="en-US" dirty="0" err="1" smtClean="0"/>
+              <a:t>a.end</a:t>
+            </a:r>
+            <a:r>
+              <a:rPr lang="en-US" dirty="0" smtClean="0"/>
+              <a:t>() );</a:t>
+            </a:r>
+          </a:p>
+          <a:p>
+            <a:endParaRPr lang="en-US" dirty="0" smtClean="0"/>
+          </a:p>
+        </p:txBody>
+      </p:sp>
+      <p:graphicFrame>
+        <p:nvGraphicFramePr>
+          <p:cNvPr id="7" name="Content Placeholder 3"/>
+          <p:cNvGraphicFramePr>
+            <a:graphicFrameLocks/>
+          </p:cNvGraphicFramePr>
+          <p:nvPr/>
+        </p:nvGraphicFramePr>
+        <p:xfrm>
+          <a:off x="4572000" y="2514600"/>
+          <a:ext cx="838200" cy="304800"/>
+        </p:xfrm>
+        <a:graphic>
+          <a:graphicData uri="http://schemas.openxmlformats.org/drawingml/2006/table">
+            <a:tbl>
+              <a:tblPr firstRow="1" bandRow="1">
+                <a:tableStyleId>{5C22544A-7EE6-4342-B048-85BDC9FD1C3A}</a:tableStyleId>
+              </a:tblPr>
+              <a:tblGrid>
+                <a:gridCol w="419100"/>
+                <a:gridCol w="419100"/>
+              </a:tblGrid>
+              <a:tr h="228600">
+                <a:tc>
+                  <a:txBody>
+                    <a:bodyPr/>
+                    <a:lstStyle/>
+                    <a:p>
+                      <a:r>
+                        <a:rPr lang="en-US" sz="1400" b="0" dirty="0" smtClean="0"/>
+                        <a:t>12</a:t>
+                      </a:r>
+                      <a:endParaRPr lang="en-US" sz="1400" b="0" dirty="0"/>
+                    </a:p>
+                  </a:txBody>
+                  <a:tcPr/>
+                </a:tc>
+                <a:tc>
+                  <a:txBody>
+                    <a:bodyPr/>
+                    <a:lstStyle/>
+                    <a:p>
+                      <a:endParaRPr lang="en-US" sz="1400" b="0" dirty="0"/>
+                    </a:p>
+                  </a:txBody>
+                  <a:tcPr/>
+                </a:tc>
+              </a:tr>
+            </a:tbl>
+          </a:graphicData>
+        </a:graphic>
+      </p:graphicFrame>
+      <p:graphicFrame>
+        <p:nvGraphicFramePr>
+          <p:cNvPr id="8" name="Content Placeholder 3"/>
+          <p:cNvGraphicFramePr>
+            <a:graphicFrameLocks/>
+          </p:cNvGraphicFramePr>
+          <p:nvPr/>
+        </p:nvGraphicFramePr>
+        <p:xfrm>
+          <a:off x="4572000" y="2819400"/>
+          <a:ext cx="838200" cy="304800"/>
+        </p:xfrm>
+        <a:graphic>
+          <a:graphicData uri="http://schemas.openxmlformats.org/drawingml/2006/table">
+            <a:tbl>
+              <a:tblPr firstRow="1" bandRow="1">
+                <a:tableStyleId>{5C22544A-7EE6-4342-B048-85BDC9FD1C3A}</a:tableStyleId>
+              </a:tblPr>
+              <a:tblGrid>
+                <a:gridCol w="419100"/>
+                <a:gridCol w="419100"/>
+              </a:tblGrid>
+              <a:tr h="228600">
+                <a:tc>
+                  <a:txBody>
+                    <a:bodyPr/>
+                    <a:lstStyle/>
+                    <a:p>
+                      <a:r>
+                        <a:rPr lang="en-US" sz="1400" b="0" dirty="0" smtClean="0"/>
+                        <a:t>12</a:t>
+                      </a:r>
+                      <a:endParaRPr lang="en-US" sz="1400" b="0" dirty="0"/>
+                    </a:p>
+                  </a:txBody>
+                  <a:tcPr/>
+                </a:tc>
+                <a:tc>
+                  <a:txBody>
+                    <a:bodyPr/>
+                    <a:lstStyle/>
+                    <a:p>
+                      <a:r>
+                        <a:rPr lang="en-US" sz="1400" b="0" dirty="0" smtClean="0"/>
+                        <a:t>45</a:t>
+                      </a:r>
+                      <a:endParaRPr lang="en-US" sz="1400" b="0" dirty="0"/>
+                    </a:p>
+                  </a:txBody>
+                  <a:tcPr/>
+                </a:tc>
+              </a:tr>
+            </a:tbl>
+          </a:graphicData>
+        </a:graphic>
+      </p:graphicFrame>
+      <p:graphicFrame>
+        <p:nvGraphicFramePr>
+          <p:cNvPr id="9" name="Content Placeholder 3"/>
+          <p:cNvGraphicFramePr>
+            <a:graphicFrameLocks/>
+          </p:cNvGraphicFramePr>
+          <p:nvPr/>
+        </p:nvGraphicFramePr>
+        <p:xfrm>
+          <a:off x="4572000" y="3352800"/>
+          <a:ext cx="1676400" cy="304800"/>
+        </p:xfrm>
+        <a:graphic>
+          <a:graphicData uri="http://schemas.openxmlformats.org/drawingml/2006/table">
+            <a:tbl>
+              <a:tblPr firstRow="1" bandRow="1">
+                <a:tableStyleId>{5C22544A-7EE6-4342-B048-85BDC9FD1C3A}</a:tableStyleId>
+              </a:tblPr>
+              <a:tblGrid>
+                <a:gridCol w="419100"/>
+                <a:gridCol w="419100"/>
+                <a:gridCol w="419100"/>
+                <a:gridCol w="419100"/>
+              </a:tblGrid>
+              <a:tr h="228600">
+                <a:tc>
+                  <a:txBody>
+                    <a:bodyPr/>
+                    <a:lstStyle/>
+                    <a:p>
+                      <a:r>
+                        <a:rPr lang="en-US" sz="1400" b="0" dirty="0" smtClean="0"/>
+                        <a:t>12</a:t>
+                      </a:r>
+                      <a:endParaRPr lang="en-US" sz="1400" b="0" dirty="0"/>
+                    </a:p>
+                  </a:txBody>
+                  <a:tcPr/>
+                </a:tc>
+                <a:tc>
+                  <a:txBody>
+                    <a:bodyPr/>
+                    <a:lstStyle/>
+                    <a:p>
+                      <a:r>
+                        <a:rPr lang="en-US" sz="1400" b="0" dirty="0" smtClean="0"/>
+                        <a:t>45</a:t>
+                      </a:r>
+                      <a:endParaRPr lang="en-US" sz="1400" b="0" dirty="0"/>
+                    </a:p>
+                  </a:txBody>
+                  <a:tcPr/>
+                </a:tc>
+                <a:tc>
+                  <a:txBody>
+                    <a:bodyPr/>
+                    <a:lstStyle/>
+                    <a:p>
+                      <a:r>
+                        <a:rPr lang="en-US" sz="1400" b="0" dirty="0" smtClean="0"/>
+                        <a:t>67</a:t>
+                      </a:r>
+                      <a:endParaRPr lang="en-US" sz="1400" b="0" dirty="0"/>
+                    </a:p>
+                  </a:txBody>
+                  <a:tcPr/>
+                </a:tc>
+                <a:tc>
+                  <a:txBody>
+                    <a:bodyPr/>
+                    <a:lstStyle/>
+                    <a:p>
+                      <a:endParaRPr lang="en-US" sz="1400" b="0" dirty="0"/>
+                    </a:p>
+                  </a:txBody>
+                  <a:tcPr/>
+                </a:tc>
+              </a:tr>
+            </a:tbl>
+          </a:graphicData>
+        </a:graphic>
+      </p:graphicFrame>
+      <p:graphicFrame>
+        <p:nvGraphicFramePr>
+          <p:cNvPr id="10" name="Content Placeholder 3"/>
+          <p:cNvGraphicFramePr>
+            <a:graphicFrameLocks/>
+          </p:cNvGraphicFramePr>
+          <p:nvPr/>
+        </p:nvGraphicFramePr>
+        <p:xfrm>
+          <a:off x="4572000" y="3657600"/>
+          <a:ext cx="1676400" cy="304800"/>
+        </p:xfrm>
+        <a:graphic>
+          <a:graphicData uri="http://schemas.openxmlformats.org/drawingml/2006/table">
+            <a:tbl>
+              <a:tblPr firstRow="1" bandRow="1">
+                <a:tableStyleId>{5C22544A-7EE6-4342-B048-85BDC9FD1C3A}</a:tableStyleId>
+              </a:tblPr>
+              <a:tblGrid>
+                <a:gridCol w="419100"/>
+                <a:gridCol w="419100"/>
+                <a:gridCol w="419100"/>
+                <a:gridCol w="419100"/>
+              </a:tblGrid>
+              <a:tr h="228600">
+                <a:tc>
+                  <a:txBody>
+                    <a:bodyPr/>
+                    <a:lstStyle/>
+                    <a:p>
+                      <a:r>
+                        <a:rPr lang="en-US" sz="1400" b="0" dirty="0" smtClean="0"/>
+                        <a:t>12</a:t>
+                      </a:r>
+                      <a:endParaRPr lang="en-US" sz="1400" b="0" dirty="0"/>
+                    </a:p>
+                  </a:txBody>
+                  <a:tcPr/>
+                </a:tc>
+                <a:tc>
+                  <a:txBody>
+                    <a:bodyPr/>
+                    <a:lstStyle/>
+                    <a:p>
+                      <a:r>
+                        <a:rPr lang="en-US" sz="1400" b="0" dirty="0" smtClean="0"/>
+                        <a:t>45</a:t>
+                      </a:r>
+                      <a:endParaRPr lang="en-US" sz="1400" b="0" dirty="0"/>
+                    </a:p>
+                  </a:txBody>
+                  <a:tcPr/>
+                </a:tc>
+                <a:tc>
+                  <a:txBody>
+                    <a:bodyPr/>
+                    <a:lstStyle/>
+                    <a:p>
+                      <a:r>
+                        <a:rPr lang="en-US" sz="1400" b="0" dirty="0" smtClean="0"/>
+                        <a:t>67</a:t>
+                      </a:r>
+                      <a:endParaRPr lang="en-US" sz="1400" b="0" dirty="0"/>
+                    </a:p>
+                  </a:txBody>
+                  <a:tcPr/>
+                </a:tc>
+                <a:tc>
+                  <a:txBody>
+                    <a:bodyPr/>
+                    <a:lstStyle/>
+                    <a:p>
+                      <a:r>
+                        <a:rPr lang="en-US" sz="1400" b="0" dirty="0" smtClean="0"/>
+                        <a:t>89</a:t>
+                      </a:r>
+                      <a:endParaRPr lang="en-US" sz="1400" b="0" dirty="0"/>
+                    </a:p>
+                  </a:txBody>
+                  <a:tcPr/>
+                </a:tc>
+              </a:tr>
+            </a:tbl>
+          </a:graphicData>
+        </a:graphic>
+      </p:graphicFrame>
+      <p:graphicFrame>
+        <p:nvGraphicFramePr>
+          <p:cNvPr id="11" name="Content Placeholder 3"/>
+          <p:cNvGraphicFramePr>
+            <a:graphicFrameLocks/>
+          </p:cNvGraphicFramePr>
+          <p:nvPr/>
+        </p:nvGraphicFramePr>
+        <p:xfrm>
+          <a:off x="4572000" y="4191000"/>
+          <a:ext cx="3505200" cy="304800"/>
+        </p:xfrm>
+        <a:graphic>
+          <a:graphicData uri="http://schemas.openxmlformats.org/drawingml/2006/table">
+            <a:tbl>
+              <a:tblPr firstRow="1" bandRow="1">
+                <a:tableStyleId>{5C22544A-7EE6-4342-B048-85BDC9FD1C3A}</a:tableStyleId>
+              </a:tblPr>
+              <a:tblGrid>
+                <a:gridCol w="438150"/>
+                <a:gridCol w="438150"/>
+                <a:gridCol w="438150"/>
+                <a:gridCol w="438150"/>
+                <a:gridCol w="438150"/>
+                <a:gridCol w="438150"/>
+                <a:gridCol w="438150"/>
+                <a:gridCol w="438150"/>
+              </a:tblGrid>
+              <a:tr h="228600">
+                <a:tc>
+                  <a:txBody>
+                    <a:bodyPr/>
+                    <a:lstStyle/>
+                    <a:p>
+                      <a:r>
+                        <a:rPr lang="en-US" sz="1400" b="0" dirty="0" smtClean="0"/>
+                        <a:t>12</a:t>
+                      </a:r>
+                      <a:endParaRPr lang="en-US" sz="1400" b="0" dirty="0"/>
+                    </a:p>
+                  </a:txBody>
+                  <a:tcPr/>
+                </a:tc>
+                <a:tc>
+                  <a:txBody>
+                    <a:bodyPr/>
+                    <a:lstStyle/>
+                    <a:p>
+                      <a:r>
+                        <a:rPr lang="en-US" sz="1400" b="0" dirty="0" smtClean="0"/>
+                        <a:t>45</a:t>
+                      </a:r>
+                      <a:endParaRPr lang="en-US" sz="1400" b="0" dirty="0"/>
+                    </a:p>
+                  </a:txBody>
+                  <a:tcPr/>
+                </a:tc>
+                <a:tc>
+                  <a:txBody>
+                    <a:bodyPr/>
+                    <a:lstStyle/>
+                    <a:p>
+                      <a:r>
+                        <a:rPr lang="en-US" sz="1400" b="0" dirty="0" smtClean="0"/>
+                        <a:t>67</a:t>
+                      </a:r>
+                      <a:endParaRPr lang="en-US" sz="1400" b="0" dirty="0"/>
+                    </a:p>
+                  </a:txBody>
+                  <a:tcPr/>
+                </a:tc>
+                <a:tc>
+                  <a:txBody>
+                    <a:bodyPr/>
+                    <a:lstStyle/>
+                    <a:p>
+                      <a:r>
+                        <a:rPr lang="en-US" sz="1400" b="0" dirty="0" smtClean="0"/>
+                        <a:t>89</a:t>
+                      </a:r>
+                      <a:endParaRPr lang="en-US" sz="1400" b="0" dirty="0"/>
+                    </a:p>
+                  </a:txBody>
+                  <a:tcPr/>
+                </a:tc>
+                <a:tc>
+                  <a:txBody>
+                    <a:bodyPr/>
+                    <a:lstStyle/>
+                    <a:p>
+                      <a:r>
+                        <a:rPr lang="en-US" sz="1400" b="0" dirty="0" smtClean="0"/>
+                        <a:t>11</a:t>
+                      </a:r>
+                      <a:endParaRPr lang="en-US" sz="1400" b="0" dirty="0"/>
+                    </a:p>
+                  </a:txBody>
+                  <a:tcPr/>
+                </a:tc>
+                <a:tc>
+                  <a:txBody>
+                    <a:bodyPr/>
+                    <a:lstStyle/>
+                    <a:p>
+                      <a:endParaRPr lang="en-US" sz="1400" b="0" dirty="0"/>
+                    </a:p>
+                  </a:txBody>
+                  <a:tcPr/>
+                </a:tc>
+                <a:tc>
+                  <a:txBody>
+                    <a:bodyPr/>
+                    <a:lstStyle/>
+                    <a:p>
+                      <a:endParaRPr lang="en-US" sz="1400" b="0" dirty="0"/>
+                    </a:p>
+                  </a:txBody>
+                  <a:tcPr/>
+                </a:tc>
+                <a:tc>
+                  <a:txBody>
+                    <a:bodyPr/>
+                    <a:lstStyle/>
+                    <a:p>
+                      <a:endParaRPr lang="en-US" sz="1400" b="0" dirty="0"/>
+                    </a:p>
+                  </a:txBody>
+                  <a:tcPr/>
+                </a:tc>
+              </a:tr>
+            </a:tbl>
+          </a:graphicData>
+        </a:graphic>
+      </p:graphicFrame>
+      <p:graphicFrame>
+        <p:nvGraphicFramePr>
+          <p:cNvPr id="12" name="Content Placeholder 3"/>
+          <p:cNvGraphicFramePr>
+            <a:graphicFrameLocks/>
+          </p:cNvGraphicFramePr>
+          <p:nvPr/>
+        </p:nvGraphicFramePr>
+        <p:xfrm>
+          <a:off x="4572000" y="4495800"/>
+          <a:ext cx="3505200" cy="304800"/>
+        </p:xfrm>
+        <a:graphic>
+          <a:graphicData uri="http://schemas.openxmlformats.org/drawingml/2006/table">
+            <a:tbl>
+              <a:tblPr firstRow="1" bandRow="1">
+                <a:tableStyleId>{5C22544A-7EE6-4342-B048-85BDC9FD1C3A}</a:tableStyleId>
+              </a:tblPr>
+              <a:tblGrid>
+                <a:gridCol w="438150"/>
+                <a:gridCol w="438150"/>
+                <a:gridCol w="438150"/>
+                <a:gridCol w="438150"/>
+                <a:gridCol w="438150"/>
+                <a:gridCol w="438150"/>
+                <a:gridCol w="438150"/>
+                <a:gridCol w="438150"/>
+              </a:tblGrid>
+              <a:tr h="228600">
+                <a:tc>
+                  <a:txBody>
+                    <a:bodyPr/>
+                    <a:lstStyle/>
+                    <a:p>
+                      <a:r>
+                        <a:rPr lang="en-US" sz="1400" b="0" dirty="0" smtClean="0"/>
+                        <a:t>12</a:t>
+                      </a:r>
+                      <a:endParaRPr lang="en-US" sz="1400" b="0" dirty="0"/>
+                    </a:p>
+                  </a:txBody>
+                  <a:tcPr/>
+                </a:tc>
+                <a:tc>
+                  <a:txBody>
+                    <a:bodyPr/>
+                    <a:lstStyle/>
+                    <a:p>
+                      <a:r>
+                        <a:rPr lang="en-US" sz="1400" b="0" dirty="0" smtClean="0"/>
+                        <a:t>45</a:t>
+                      </a:r>
+                      <a:endParaRPr lang="en-US" sz="1400" b="0" dirty="0"/>
+                    </a:p>
+                  </a:txBody>
+                  <a:tcPr/>
+                </a:tc>
+                <a:tc>
+                  <a:txBody>
+                    <a:bodyPr/>
+                    <a:lstStyle/>
+                    <a:p>
+                      <a:r>
+                        <a:rPr lang="en-US" sz="1400" b="0" dirty="0" smtClean="0"/>
+                        <a:t>67</a:t>
+                      </a:r>
+                      <a:endParaRPr lang="en-US" sz="1400" b="0" dirty="0"/>
+                    </a:p>
+                  </a:txBody>
+                  <a:tcPr/>
+                </a:tc>
+                <a:tc>
+                  <a:txBody>
+                    <a:bodyPr/>
+                    <a:lstStyle/>
+                    <a:p>
+                      <a:r>
+                        <a:rPr lang="en-US" sz="1400" b="0" dirty="0" smtClean="0"/>
+                        <a:t>89</a:t>
+                      </a:r>
+                      <a:endParaRPr lang="en-US" sz="1400" b="0" dirty="0"/>
+                    </a:p>
+                  </a:txBody>
+                  <a:tcPr/>
+                </a:tc>
+                <a:tc>
+                  <a:txBody>
+                    <a:bodyPr/>
+                    <a:lstStyle/>
+                    <a:p>
+                      <a:r>
+                        <a:rPr lang="en-US" sz="1400" b="0" dirty="0" smtClean="0"/>
+                        <a:t>11</a:t>
+                      </a:r>
+                      <a:endParaRPr lang="en-US" sz="1400" b="0" dirty="0"/>
+                    </a:p>
+                  </a:txBody>
+                  <a:tcPr/>
+                </a:tc>
+                <a:tc>
+                  <a:txBody>
+                    <a:bodyPr/>
+                    <a:lstStyle/>
+                    <a:p>
+                      <a:r>
+                        <a:rPr lang="en-US" sz="1400" b="0" dirty="0" smtClean="0"/>
+                        <a:t>22</a:t>
+                      </a:r>
+                      <a:endParaRPr lang="en-US" sz="1400" b="0" dirty="0"/>
+                    </a:p>
+                  </a:txBody>
+                  <a:tcPr/>
+                </a:tc>
+                <a:tc>
+                  <a:txBody>
+                    <a:bodyPr/>
+                    <a:lstStyle/>
+                    <a:p>
+                      <a:endParaRPr lang="en-US" sz="1400" b="0" dirty="0"/>
+                    </a:p>
+                  </a:txBody>
+                  <a:tcPr/>
+                </a:tc>
+                <a:tc>
+                  <a:txBody>
+                    <a:bodyPr/>
+                    <a:lstStyle/>
+                    <a:p>
+                      <a:endParaRPr lang="en-US" sz="1400" b="0" dirty="0"/>
+                    </a:p>
+                  </a:txBody>
+                  <a:tcPr/>
+                </a:tc>
+              </a:tr>
+            </a:tbl>
+          </a:graphicData>
+        </a:graphic>
+      </p:graphicFrame>
+      <p:graphicFrame>
+        <p:nvGraphicFramePr>
+          <p:cNvPr id="13" name="Table 12"/>
+          <p:cNvGraphicFramePr>
+            <a:graphicFrameLocks noGrp="1"/>
+          </p:cNvGraphicFramePr>
+          <p:nvPr/>
+        </p:nvGraphicFramePr>
+        <p:xfrm>
+          <a:off x="4572000" y="5486400"/>
+          <a:ext cx="3505200" cy="304800"/>
+        </p:xfrm>
+        <a:graphic>
+          <a:graphicData uri="http://schemas.openxmlformats.org/drawingml/2006/table">
+            <a:tbl>
+              <a:tblPr firstRow="1" bandRow="1">
+                <a:tableStyleId>{5C22544A-7EE6-4342-B048-85BDC9FD1C3A}</a:tableStyleId>
+              </a:tblPr>
+              <a:tblGrid>
+                <a:gridCol w="438150"/>
+                <a:gridCol w="438150"/>
+                <a:gridCol w="438150"/>
+                <a:gridCol w="438150"/>
+                <a:gridCol w="438150"/>
+                <a:gridCol w="438150"/>
+                <a:gridCol w="438150"/>
+                <a:gridCol w="438150"/>
+              </a:tblGrid>
+              <a:tr h="228600">
+                <a:tc>
+                  <a:txBody>
+                    <a:bodyPr/>
+                    <a:lstStyle/>
+                    <a:p>
+                      <a:r>
+                        <a:rPr lang="en-US" sz="1400" b="0" dirty="0" smtClean="0"/>
+                        <a:t>12</a:t>
+                      </a:r>
+                      <a:endParaRPr lang="en-US" sz="1400" b="0" dirty="0"/>
+                    </a:p>
+                  </a:txBody>
+                  <a:tcPr/>
+                </a:tc>
+                <a:tc>
+                  <a:txBody>
+                    <a:bodyPr/>
+                    <a:lstStyle/>
+                    <a:p>
+                      <a:r>
+                        <a:rPr lang="en-US" sz="1400" b="0" dirty="0" smtClean="0"/>
+                        <a:t>67</a:t>
+                      </a:r>
+                      <a:endParaRPr lang="en-US" sz="1400" b="0" dirty="0"/>
+                    </a:p>
+                  </a:txBody>
+                  <a:tcPr/>
+                </a:tc>
+                <a:tc>
+                  <a:txBody>
+                    <a:bodyPr/>
+                    <a:lstStyle/>
+                    <a:p>
+                      <a:r>
+                        <a:rPr lang="en-US" sz="1400" b="0" dirty="0" smtClean="0"/>
+                        <a:t>89</a:t>
+                      </a:r>
+                      <a:endParaRPr lang="en-US" sz="1400" b="0" dirty="0"/>
+                    </a:p>
+                  </a:txBody>
+                  <a:tcPr/>
+                </a:tc>
+                <a:tc>
+                  <a:txBody>
+                    <a:bodyPr/>
+                    <a:lstStyle/>
+                    <a:p>
+                      <a:r>
+                        <a:rPr lang="en-US" sz="1400" b="0" dirty="0" smtClean="0"/>
+                        <a:t>11</a:t>
+                      </a:r>
+                      <a:endParaRPr lang="en-US" sz="1400" b="0" dirty="0"/>
+                    </a:p>
+                  </a:txBody>
+                  <a:tcPr/>
+                </a:tc>
+                <a:tc>
+                  <a:txBody>
+                    <a:bodyPr/>
+                    <a:lstStyle/>
+                    <a:p>
+                      <a:r>
+                        <a:rPr lang="en-US" sz="1400" b="0" dirty="0" smtClean="0"/>
+                        <a:t>22</a:t>
+                      </a:r>
+                      <a:endParaRPr lang="en-US" sz="1400" b="0" dirty="0"/>
+                    </a:p>
+                  </a:txBody>
+                  <a:tcPr/>
+                </a:tc>
+                <a:tc>
+                  <a:txBody>
+                    <a:bodyPr/>
+                    <a:lstStyle/>
+                    <a:p>
+                      <a:endParaRPr lang="en-US" sz="1400" b="0" dirty="0"/>
+                    </a:p>
+                  </a:txBody>
+                  <a:tcPr/>
+                </a:tc>
+                <a:tc>
+                  <a:txBody>
+                    <a:bodyPr/>
+                    <a:lstStyle/>
+                    <a:p>
+                      <a:endParaRPr lang="en-US" sz="1400" b="0" dirty="0"/>
+                    </a:p>
+                  </a:txBody>
+                  <a:tcPr/>
+                </a:tc>
+                <a:tc>
+                  <a:txBody>
+                    <a:bodyPr/>
+                    <a:lstStyle/>
+                    <a:p>
+                      <a:endParaRPr lang="en-US" sz="1400" b="0" dirty="0"/>
+                    </a:p>
+                  </a:txBody>
+                  <a:tcPr/>
+                </a:tc>
+              </a:tr>
+            </a:tbl>
+          </a:graphicData>
+        </a:graphic>
+      </p:graphicFrame>
+    </p:spTree>
+  </p:cSld>
+  <p:clrMapOvr>
+    <a:masterClrMapping/>
+  </p:clrMapOvr>
+</p:sld>
+</file>
+
+<file path=ppt/slides/slide16.xml><?xml version="1.0" encoding="utf-8"?>
+<p:sld xmlns:a="http://schemas.openxmlformats.org/drawingml/2006/main" xmlns:r="http://schemas.openxmlformats.org/officeDocument/2006/relationships" xmlns:p="http://schemas.openxmlformats.org/presentationml/2006/main">
+  <p:cSld>
+    <p:spTree>
+      <p:nvGrpSpPr>
+        <p:cNvPr id="1" name=""/>
+        <p:cNvGrpSpPr/>
+        <p:nvPr/>
+      </p:nvGrpSpPr>
+      <p:grpSpPr>
+        <a:xfrm>
+          <a:off x="0" y="0"/>
+          <a:ext cx="0" cy="0"/>
+          <a:chOff x="0" y="0"/>
+          <a:chExt cx="0" cy="0"/>
+        </a:xfrm>
+      </p:grpSpPr>
+      <p:sp>
+        <p:nvSpPr>
+          <p:cNvPr id="2" name="Title 1"/>
+          <p:cNvSpPr>
+            <a:spLocks noGrp="1"/>
+          </p:cNvSpPr>
+          <p:nvPr>
+            <p:ph type="title"/>
+          </p:nvPr>
+        </p:nvSpPr>
+        <p:spPr/>
+        <p:txBody>
+          <a:bodyPr/>
+          <a:lstStyle/>
+          <a:p>
+            <a:r>
+              <a:rPr lang="en-US" dirty="0" smtClean="0"/>
+              <a:t>std::list</a:t>
+            </a:r>
+            <a:endParaRPr lang="en-US" dirty="0"/>
+          </a:p>
+        </p:txBody>
+      </p:sp>
+      <p:graphicFrame>
+        <p:nvGraphicFramePr>
+          <p:cNvPr id="4" name="Content Placeholder 3"/>
+          <p:cNvGraphicFramePr>
+            <a:graphicFrameLocks noGrp="1"/>
+          </p:cNvGraphicFramePr>
+          <p:nvPr>
+            <p:ph idx="1"/>
+          </p:nvPr>
+        </p:nvGraphicFramePr>
+        <p:xfrm>
+          <a:off x="1066800" y="2743200"/>
+          <a:ext cx="381000" cy="370840"/>
+        </p:xfrm>
+        <a:graphic>
+          <a:graphicData uri="http://schemas.openxmlformats.org/drawingml/2006/table">
+            <a:tbl>
+              <a:tblPr firstRow="1" bandRow="1">
+                <a:tableStyleId>{5C22544A-7EE6-4342-B048-85BDC9FD1C3A}</a:tableStyleId>
+              </a:tblPr>
+              <a:tblGrid>
+                <a:gridCol w="381000"/>
+              </a:tblGrid>
+              <a:tr h="370840">
+                <a:tc>
+                  <a:txBody>
+                    <a:bodyPr/>
+                    <a:lstStyle/>
+                    <a:p>
+                      <a:pPr algn="ctr"/>
+                      <a:r>
+                        <a:rPr lang="en-US" b="0" dirty="0" smtClean="0"/>
+                        <a:t>5</a:t>
+                      </a:r>
+                      <a:endParaRPr lang="en-US" b="0" dirty="0"/>
+                    </a:p>
+                  </a:txBody>
+                  <a:tcPr/>
+                </a:tc>
+              </a:tr>
+            </a:tbl>
+          </a:graphicData>
+        </a:graphic>
+      </p:graphicFrame>
+      <p:graphicFrame>
+        <p:nvGraphicFramePr>
+          <p:cNvPr id="5" name="Content Placeholder 3"/>
+          <p:cNvGraphicFramePr>
+            <a:graphicFrameLocks/>
+          </p:cNvGraphicFramePr>
+          <p:nvPr/>
+        </p:nvGraphicFramePr>
+        <p:xfrm>
+          <a:off x="1752600" y="3886200"/>
+          <a:ext cx="381000" cy="370840"/>
+        </p:xfrm>
+        <a:graphic>
+          <a:graphicData uri="http://schemas.openxmlformats.org/drawingml/2006/table">
+            <a:tbl>
+              <a:tblPr firstRow="1" bandRow="1">
+                <a:tableStyleId>{5C22544A-7EE6-4342-B048-85BDC9FD1C3A}</a:tableStyleId>
+              </a:tblPr>
+              <a:tblGrid>
+                <a:gridCol w="381000"/>
+              </a:tblGrid>
+              <a:tr h="370840">
+                <a:tc>
+                  <a:txBody>
+                    <a:bodyPr/>
+                    <a:lstStyle/>
+                    <a:p>
+                      <a:pPr algn="ctr"/>
+                      <a:r>
+                        <a:rPr lang="en-US" b="0" dirty="0" smtClean="0"/>
+                        <a:t>8</a:t>
+                      </a:r>
+                      <a:endParaRPr lang="en-US" b="0" dirty="0"/>
+                    </a:p>
+                  </a:txBody>
+                  <a:tcPr/>
+                </a:tc>
+              </a:tr>
+            </a:tbl>
+          </a:graphicData>
+        </a:graphic>
+      </p:graphicFrame>
+      <p:graphicFrame>
+        <p:nvGraphicFramePr>
+          <p:cNvPr id="6" name="Content Placeholder 3"/>
+          <p:cNvGraphicFramePr>
+            <a:graphicFrameLocks/>
+          </p:cNvGraphicFramePr>
+          <p:nvPr/>
+        </p:nvGraphicFramePr>
+        <p:xfrm>
+          <a:off x="2819400" y="4876800"/>
+          <a:ext cx="381000" cy="370840"/>
+        </p:xfrm>
+        <a:graphic>
+          <a:graphicData uri="http://schemas.openxmlformats.org/drawingml/2006/table">
+            <a:tbl>
+              <a:tblPr firstRow="1" bandRow="1">
+                <a:tableStyleId>{5C22544A-7EE6-4342-B048-85BDC9FD1C3A}</a:tableStyleId>
+              </a:tblPr>
+              <a:tblGrid>
+                <a:gridCol w="381000"/>
+              </a:tblGrid>
+              <a:tr h="370840">
+                <a:tc>
+                  <a:txBody>
+                    <a:bodyPr/>
+                    <a:lstStyle/>
+                    <a:p>
+                      <a:pPr algn="r"/>
+                      <a:r>
+                        <a:rPr lang="en-US" b="0" dirty="0" smtClean="0"/>
+                        <a:t>3</a:t>
+                      </a:r>
+                      <a:endParaRPr lang="en-US" b="0" dirty="0"/>
+                    </a:p>
+                  </a:txBody>
+                  <a:tcPr/>
+                </a:tc>
+              </a:tr>
+            </a:tbl>
+          </a:graphicData>
+        </a:graphic>
+      </p:graphicFrame>
+      <p:graphicFrame>
+        <p:nvGraphicFramePr>
+          <p:cNvPr id="7" name="Content Placeholder 3"/>
+          <p:cNvGraphicFramePr>
+            <a:graphicFrameLocks/>
+          </p:cNvGraphicFramePr>
+          <p:nvPr/>
+        </p:nvGraphicFramePr>
+        <p:xfrm>
+          <a:off x="4343400" y="5410200"/>
+          <a:ext cx="381000" cy="370840"/>
+        </p:xfrm>
+        <a:graphic>
+          <a:graphicData uri="http://schemas.openxmlformats.org/drawingml/2006/table">
+            <a:tbl>
+              <a:tblPr firstRow="1" bandRow="1">
+                <a:tableStyleId>{5C22544A-7EE6-4342-B048-85BDC9FD1C3A}</a:tableStyleId>
+              </a:tblPr>
+              <a:tblGrid>
+                <a:gridCol w="381000"/>
+              </a:tblGrid>
+              <a:tr h="370840">
+                <a:tc>
+                  <a:txBody>
+                    <a:bodyPr/>
+                    <a:lstStyle/>
+                    <a:p>
+                      <a:pPr algn="ctr"/>
+                      <a:r>
+                        <a:rPr lang="en-US" b="0" dirty="0" smtClean="0"/>
+                        <a:t>5</a:t>
+                      </a:r>
+                      <a:endParaRPr lang="en-US" b="0" dirty="0"/>
+                    </a:p>
+                  </a:txBody>
+                  <a:tcPr/>
+                </a:tc>
+              </a:tr>
+            </a:tbl>
+          </a:graphicData>
+        </a:graphic>
+      </p:graphicFrame>
+      <p:graphicFrame>
+        <p:nvGraphicFramePr>
+          <p:cNvPr id="8" name="Content Placeholder 3"/>
+          <p:cNvGraphicFramePr>
+            <a:graphicFrameLocks/>
+          </p:cNvGraphicFramePr>
+          <p:nvPr/>
+        </p:nvGraphicFramePr>
+        <p:xfrm>
+          <a:off x="6096000" y="4953000"/>
+          <a:ext cx="381000" cy="370840"/>
+        </p:xfrm>
+        <a:graphic>
+          <a:graphicData uri="http://schemas.openxmlformats.org/drawingml/2006/table">
+            <a:tbl>
+              <a:tblPr firstRow="1" bandRow="1">
+                <a:tableStyleId>{5C22544A-7EE6-4342-B048-85BDC9FD1C3A}</a:tableStyleId>
+              </a:tblPr>
+              <a:tblGrid>
+                <a:gridCol w="381000"/>
+              </a:tblGrid>
+              <a:tr h="370840">
+                <a:tc>
+                  <a:txBody>
+                    <a:bodyPr/>
+                    <a:lstStyle/>
+                    <a:p>
+                      <a:pPr algn="ctr"/>
+                      <a:r>
+                        <a:rPr lang="en-US" b="0" dirty="0" smtClean="0"/>
+                        <a:t>2</a:t>
+                      </a:r>
+                      <a:endParaRPr lang="en-US" b="0" dirty="0"/>
+                    </a:p>
+                  </a:txBody>
+                  <a:tcPr/>
+                </a:tc>
+              </a:tr>
+            </a:tbl>
+          </a:graphicData>
+        </a:graphic>
+      </p:graphicFrame>
+      <p:graphicFrame>
+        <p:nvGraphicFramePr>
+          <p:cNvPr id="9" name="Content Placeholder 3"/>
+          <p:cNvGraphicFramePr>
+            <a:graphicFrameLocks/>
+          </p:cNvGraphicFramePr>
+          <p:nvPr/>
+        </p:nvGraphicFramePr>
+        <p:xfrm>
+          <a:off x="7543800" y="3886200"/>
+          <a:ext cx="381000" cy="370840"/>
+        </p:xfrm>
+        <a:graphic>
+          <a:graphicData uri="http://schemas.openxmlformats.org/drawingml/2006/table">
+            <a:tbl>
+              <a:tblPr firstRow="1" bandRow="1">
+                <a:tableStyleId>{5C22544A-7EE6-4342-B048-85BDC9FD1C3A}</a:tableStyleId>
+              </a:tblPr>
+              <a:tblGrid>
+                <a:gridCol w="381000"/>
+              </a:tblGrid>
+              <a:tr h="370840">
+                <a:tc>
+                  <a:txBody>
+                    <a:bodyPr/>
+                    <a:lstStyle/>
+                    <a:p>
+                      <a:pPr algn="ctr"/>
+                      <a:r>
+                        <a:rPr lang="en-US" b="0" dirty="0" smtClean="0"/>
+                        <a:t>7</a:t>
+                      </a:r>
+                      <a:endParaRPr lang="en-US" b="0" dirty="0"/>
+                    </a:p>
+                  </a:txBody>
+                  <a:tcPr/>
+                </a:tc>
+              </a:tr>
+            </a:tbl>
+          </a:graphicData>
+        </a:graphic>
+      </p:graphicFrame>
+      <p:cxnSp>
+        <p:nvCxnSpPr>
+          <p:cNvPr id="11" name="Straight Arrow Connector 10"/>
+          <p:cNvCxnSpPr/>
+          <p:nvPr/>
+        </p:nvCxnSpPr>
+        <p:spPr>
+          <a:xfrm>
+            <a:off x="1447800" y="3200400"/>
+            <a:ext cx="304800" cy="533400"/>
+          </a:xfrm>
+          <a:prstGeom prst="straightConnector1">
+            <a:avLst/>
+          </a:prstGeom>
+          <a:ln>
+            <a:headEnd type="arrow"/>
+            <a:tailEnd type="arrow"/>
+          </a:ln>
+        </p:spPr>
+        <p:style>
+          <a:lnRef idx="1">
+            <a:schemeClr val="accent1"/>
+          </a:lnRef>
+          <a:fillRef idx="0">
+            <a:schemeClr val="accent1"/>
+          </a:fillRef>
+          <a:effectRef idx="0">
+            <a:schemeClr val="accent1"/>
+          </a:effectRef>
+          <a:fontRef idx="minor">
+            <a:schemeClr val="tx1"/>
+          </a:fontRef>
+        </p:style>
+      </p:cxnSp>
+      <p:cxnSp>
+        <p:nvCxnSpPr>
+          <p:cNvPr id="13" name="Straight Arrow Connector 12"/>
+          <p:cNvCxnSpPr/>
+          <p:nvPr/>
+        </p:nvCxnSpPr>
+        <p:spPr>
+          <a:xfrm>
+            <a:off x="2209800" y="4343400"/>
+            <a:ext cx="457200" cy="457200"/>
+          </a:xfrm>
+          <a:prstGeom prst="straightConnector1">
+            <a:avLst/>
+          </a:prstGeom>
+          <a:ln>
+            <a:headEnd type="arrow"/>
+            <a:tailEnd type="arrow"/>
+          </a:ln>
+        </p:spPr>
+        <p:style>
+          <a:lnRef idx="1">
+            <a:schemeClr val="accent1"/>
+          </a:lnRef>
+          <a:fillRef idx="0">
+            <a:schemeClr val="accent1"/>
+          </a:fillRef>
+          <a:effectRef idx="0">
+            <a:schemeClr val="accent1"/>
+          </a:effectRef>
+          <a:fontRef idx="minor">
+            <a:schemeClr val="tx1"/>
+          </a:fontRef>
+        </p:style>
+      </p:cxnSp>
+      <p:cxnSp>
+        <p:nvCxnSpPr>
+          <p:cNvPr id="15" name="Straight Arrow Connector 14"/>
+          <p:cNvCxnSpPr/>
+          <p:nvPr/>
+        </p:nvCxnSpPr>
+        <p:spPr>
+          <a:xfrm>
+            <a:off x="3276600" y="5257800"/>
+            <a:ext cx="990600" cy="228600"/>
+          </a:xfrm>
+          <a:prstGeom prst="straightConnector1">
+            <a:avLst/>
+          </a:prstGeom>
+          <a:ln>
+            <a:headEnd type="arrow"/>
+            <a:tailEnd type="arrow"/>
+          </a:ln>
+        </p:spPr>
+        <p:style>
+          <a:lnRef idx="1">
+            <a:schemeClr val="accent1"/>
+          </a:lnRef>
+          <a:fillRef idx="0">
+            <a:schemeClr val="accent1"/>
+          </a:fillRef>
+          <a:effectRef idx="0">
+            <a:schemeClr val="accent1"/>
+          </a:effectRef>
+          <a:fontRef idx="minor">
+            <a:schemeClr val="tx1"/>
+          </a:fontRef>
+        </p:style>
+      </p:cxnSp>
+      <p:cxnSp>
+        <p:nvCxnSpPr>
+          <p:cNvPr id="17" name="Straight Arrow Connector 16"/>
+          <p:cNvCxnSpPr/>
+          <p:nvPr/>
+        </p:nvCxnSpPr>
+        <p:spPr>
+          <a:xfrm flipV="1">
+            <a:off x="4876800" y="5181600"/>
+            <a:ext cx="1066800" cy="304800"/>
+          </a:xfrm>
+          <a:prstGeom prst="straightConnector1">
+            <a:avLst/>
+          </a:prstGeom>
+          <a:ln>
+            <a:headEnd type="arrow"/>
+            <a:tailEnd type="arrow"/>
+          </a:ln>
+        </p:spPr>
+        <p:style>
+          <a:lnRef idx="1">
+            <a:schemeClr val="accent1"/>
+          </a:lnRef>
+          <a:fillRef idx="0">
+            <a:schemeClr val="accent1"/>
+          </a:fillRef>
+          <a:effectRef idx="0">
+            <a:schemeClr val="accent1"/>
+          </a:effectRef>
+          <a:fontRef idx="minor">
+            <a:schemeClr val="tx1"/>
+          </a:fontRef>
+        </p:style>
+      </p:cxnSp>
+      <p:cxnSp>
+        <p:nvCxnSpPr>
+          <p:cNvPr id="19" name="Straight Arrow Connector 18"/>
+          <p:cNvCxnSpPr/>
+          <p:nvPr/>
+        </p:nvCxnSpPr>
+        <p:spPr>
+          <a:xfrm flipV="1">
+            <a:off x="6553200" y="4267200"/>
+            <a:ext cx="914400" cy="609600"/>
+          </a:xfrm>
+          <a:prstGeom prst="straightConnector1">
+            <a:avLst/>
+          </a:prstGeom>
+          <a:ln>
+            <a:headEnd type="arrow"/>
+            <a:tailEnd type="arrow"/>
+          </a:ln>
+        </p:spPr>
+        <p:style>
+          <a:lnRef idx="1">
+            <a:schemeClr val="accent1"/>
+          </a:lnRef>
+          <a:fillRef idx="0">
+            <a:schemeClr val="accent1"/>
+          </a:fillRef>
+          <a:effectRef idx="0">
+            <a:schemeClr val="accent1"/>
+          </a:effectRef>
+          <a:fontRef idx="minor">
+            <a:schemeClr val="tx1"/>
+          </a:fontRef>
+        </p:style>
+      </p:cxnSp>
+      <p:sp>
+        <p:nvSpPr>
+          <p:cNvPr id="20" name="TextBox 19"/>
+          <p:cNvSpPr txBox="1"/>
+          <p:nvPr/>
+        </p:nvSpPr>
+        <p:spPr>
+          <a:xfrm>
+            <a:off x="3505200" y="1676400"/>
+            <a:ext cx="2743200" cy="2585323"/>
+          </a:xfrm>
+          <a:prstGeom prst="rect">
+            <a:avLst/>
+          </a:prstGeom>
+          <a:noFill/>
+        </p:spPr>
+        <p:txBody>
+          <a:bodyPr wrap="square" rtlCol="0">
+            <a:spAutoFit/>
+          </a:bodyPr>
+          <a:lstStyle/>
+          <a:p>
+            <a:r>
+              <a:rPr lang="en-US" dirty="0" smtClean="0">
+                <a:latin typeface="Consolas" pitchFamily="49" charset="0"/>
+                <a:cs typeface="Consolas" pitchFamily="49" charset="0"/>
+              </a:rPr>
+              <a:t>std</a:t>
+            </a:r>
+            <a:r>
+              <a:rPr lang="en-US" dirty="0" smtClean="0">
+                <a:latin typeface="Consolas" pitchFamily="49" charset="0"/>
+                <a:cs typeface="Consolas" pitchFamily="49" charset="0"/>
+              </a:rPr>
+              <a:t>::list&lt; </a:t>
+            </a:r>
+            <a:r>
+              <a:rPr lang="en-US" dirty="0" err="1" smtClean="0">
+                <a:latin typeface="Consolas" pitchFamily="49" charset="0"/>
+                <a:cs typeface="Consolas" pitchFamily="49" charset="0"/>
+              </a:rPr>
+              <a:t>int</a:t>
+            </a:r>
+            <a:r>
+              <a:rPr lang="en-US" dirty="0" smtClean="0">
+                <a:latin typeface="Consolas" pitchFamily="49" charset="0"/>
+                <a:cs typeface="Consolas" pitchFamily="49" charset="0"/>
+              </a:rPr>
+              <a:t> &gt; a;</a:t>
+            </a:r>
+          </a:p>
+          <a:p>
+            <a:endParaRPr lang="en-US" dirty="0" smtClean="0">
+              <a:latin typeface="Consolas" pitchFamily="49" charset="0"/>
+              <a:cs typeface="Consolas" pitchFamily="49" charset="0"/>
+            </a:endParaRPr>
+          </a:p>
+          <a:p>
+            <a:r>
+              <a:rPr lang="en-US" dirty="0" err="1" smtClean="0">
+                <a:latin typeface="Consolas" pitchFamily="49" charset="0"/>
+                <a:cs typeface="Consolas" pitchFamily="49" charset="0"/>
+              </a:rPr>
+              <a:t>a.push_back</a:t>
+            </a:r>
+            <a:r>
+              <a:rPr lang="en-US" dirty="0" smtClean="0">
+                <a:latin typeface="Consolas" pitchFamily="49" charset="0"/>
+                <a:cs typeface="Consolas" pitchFamily="49" charset="0"/>
+              </a:rPr>
+              <a:t>( 5 );</a:t>
+            </a:r>
+          </a:p>
+          <a:p>
+            <a:r>
+              <a:rPr lang="en-US" dirty="0" err="1" smtClean="0">
+                <a:latin typeface="Consolas" pitchFamily="49" charset="0"/>
+                <a:cs typeface="Consolas" pitchFamily="49" charset="0"/>
+              </a:rPr>
+              <a:t>a.push_back</a:t>
+            </a:r>
+            <a:r>
+              <a:rPr lang="en-US" dirty="0" smtClean="0">
+                <a:latin typeface="Consolas" pitchFamily="49" charset="0"/>
+                <a:cs typeface="Consolas" pitchFamily="49" charset="0"/>
+              </a:rPr>
+              <a:t>( 8 );</a:t>
+            </a:r>
+          </a:p>
+          <a:p>
+            <a:r>
+              <a:rPr lang="en-US" dirty="0" err="1" smtClean="0">
+                <a:latin typeface="Consolas" pitchFamily="49" charset="0"/>
+                <a:cs typeface="Consolas" pitchFamily="49" charset="0"/>
+              </a:rPr>
+              <a:t>a.push_back</a:t>
+            </a:r>
+            <a:r>
+              <a:rPr lang="en-US" dirty="0" smtClean="0">
+                <a:latin typeface="Consolas" pitchFamily="49" charset="0"/>
+                <a:cs typeface="Consolas" pitchFamily="49" charset="0"/>
+              </a:rPr>
+              <a:t>( 3 );</a:t>
+            </a:r>
+          </a:p>
+          <a:p>
+            <a:r>
+              <a:rPr lang="en-US" dirty="0" err="1" smtClean="0">
+                <a:latin typeface="Consolas" pitchFamily="49" charset="0"/>
+                <a:cs typeface="Consolas" pitchFamily="49" charset="0"/>
+              </a:rPr>
+              <a:t>a.push_back</a:t>
+            </a:r>
+            <a:r>
+              <a:rPr lang="en-US" dirty="0" smtClean="0">
+                <a:latin typeface="Consolas" pitchFamily="49" charset="0"/>
+                <a:cs typeface="Consolas" pitchFamily="49" charset="0"/>
+              </a:rPr>
+              <a:t>( 5 );</a:t>
+            </a:r>
+          </a:p>
+          <a:p>
+            <a:r>
+              <a:rPr lang="en-US" dirty="0" err="1" smtClean="0">
+                <a:latin typeface="Consolas" pitchFamily="49" charset="0"/>
+                <a:cs typeface="Consolas" pitchFamily="49" charset="0"/>
+              </a:rPr>
+              <a:t>a.push_back</a:t>
+            </a:r>
+            <a:r>
+              <a:rPr lang="en-US" dirty="0" smtClean="0">
+                <a:latin typeface="Consolas" pitchFamily="49" charset="0"/>
+                <a:cs typeface="Consolas" pitchFamily="49" charset="0"/>
+              </a:rPr>
+              <a:t>( 2 );</a:t>
+            </a:r>
+          </a:p>
+          <a:p>
+            <a:r>
+              <a:rPr lang="en-US" dirty="0" err="1" smtClean="0">
+                <a:latin typeface="Consolas" pitchFamily="49" charset="0"/>
+                <a:cs typeface="Consolas" pitchFamily="49" charset="0"/>
+              </a:rPr>
+              <a:t>a.push_back</a:t>
+            </a:r>
+            <a:r>
+              <a:rPr lang="en-US" dirty="0" smtClean="0">
+                <a:latin typeface="Consolas" pitchFamily="49" charset="0"/>
+                <a:cs typeface="Consolas" pitchFamily="49" charset="0"/>
+              </a:rPr>
+              <a:t>( 7 );</a:t>
+            </a:r>
+          </a:p>
+          <a:p>
+            <a:endParaRPr lang="en-US" dirty="0"/>
+          </a:p>
+        </p:txBody>
+      </p:sp>
+    </p:spTree>
+  </p:cSld>
+  <p:clrMapOvr>
+    <a:masterClrMapping/>
+  </p:clrMapOvr>
+</p:sld>
+</file>
+
+<file path=ppt/slides/slide17.xml><?xml version="1.0" encoding="utf-8"?>
+<p:sld xmlns:a="http://schemas.openxmlformats.org/drawingml/2006/main" xmlns:r="http://schemas.openxmlformats.org/officeDocument/2006/relationships" xmlns:p="http://schemas.openxmlformats.org/presentationml/2006/main">
+  <p:cSld>
+    <p:spTree>
+      <p:nvGrpSpPr>
+        <p:cNvPr id="1" name=""/>
+        <p:cNvGrpSpPr/>
+        <p:nvPr/>
+      </p:nvGrpSpPr>
+      <p:grpSpPr>
+        <a:xfrm>
+          <a:off x="0" y="0"/>
+          <a:ext cx="0" cy="0"/>
+          <a:chOff x="0" y="0"/>
+          <a:chExt cx="0" cy="0"/>
+        </a:xfrm>
+      </p:grpSpPr>
+      <p:sp>
+        <p:nvSpPr>
+          <p:cNvPr id="2" name="Title 1"/>
+          <p:cNvSpPr>
+            <a:spLocks noGrp="1"/>
+          </p:cNvSpPr>
+          <p:nvPr>
+            <p:ph type="title"/>
+          </p:nvPr>
+        </p:nvSpPr>
+        <p:spPr/>
+        <p:txBody>
+          <a:bodyPr/>
+          <a:lstStyle/>
+          <a:p>
+            <a:r>
+              <a:rPr lang="en-US" dirty="0" smtClean="0"/>
+              <a:t>std::list</a:t>
+            </a:r>
+            <a:endParaRPr lang="en-US" dirty="0"/>
+          </a:p>
+        </p:txBody>
+      </p:sp>
+      <p:graphicFrame>
+        <p:nvGraphicFramePr>
+          <p:cNvPr id="4" name="Content Placeholder 3"/>
+          <p:cNvGraphicFramePr>
+            <a:graphicFrameLocks noGrp="1"/>
+          </p:cNvGraphicFramePr>
+          <p:nvPr>
+            <p:ph idx="1"/>
+          </p:nvPr>
+        </p:nvGraphicFramePr>
+        <p:xfrm>
+          <a:off x="1066800" y="2743200"/>
+          <a:ext cx="381000" cy="370840"/>
+        </p:xfrm>
+        <a:graphic>
+          <a:graphicData uri="http://schemas.openxmlformats.org/drawingml/2006/table">
+            <a:tbl>
+              <a:tblPr firstRow="1" bandRow="1">
+                <a:tableStyleId>{5C22544A-7EE6-4342-B048-85BDC9FD1C3A}</a:tableStyleId>
+              </a:tblPr>
+              <a:tblGrid>
+                <a:gridCol w="381000"/>
+              </a:tblGrid>
+              <a:tr h="370840">
+                <a:tc>
+                  <a:txBody>
+                    <a:bodyPr/>
+                    <a:lstStyle/>
+                    <a:p>
+                      <a:pPr algn="ctr"/>
+                      <a:r>
+                        <a:rPr lang="en-US" b="0" dirty="0" smtClean="0"/>
+                        <a:t>5</a:t>
+                      </a:r>
+                      <a:endParaRPr lang="en-US" b="0" dirty="0"/>
+                    </a:p>
+                  </a:txBody>
+                  <a:tcPr/>
+                </a:tc>
+              </a:tr>
+            </a:tbl>
+          </a:graphicData>
+        </a:graphic>
+      </p:graphicFrame>
+      <p:graphicFrame>
+        <p:nvGraphicFramePr>
+          <p:cNvPr id="5" name="Content Placeholder 3"/>
+          <p:cNvGraphicFramePr>
+            <a:graphicFrameLocks/>
+          </p:cNvGraphicFramePr>
+          <p:nvPr/>
+        </p:nvGraphicFramePr>
+        <p:xfrm>
+          <a:off x="1752600" y="3886200"/>
+          <a:ext cx="381000" cy="370840"/>
+        </p:xfrm>
+        <a:graphic>
+          <a:graphicData uri="http://schemas.openxmlformats.org/drawingml/2006/table">
+            <a:tbl>
+              <a:tblPr firstRow="1" bandRow="1">
+                <a:tableStyleId>{5C22544A-7EE6-4342-B048-85BDC9FD1C3A}</a:tableStyleId>
+              </a:tblPr>
+              <a:tblGrid>
+                <a:gridCol w="381000"/>
+              </a:tblGrid>
+              <a:tr h="370840">
+                <a:tc>
+                  <a:txBody>
+                    <a:bodyPr/>
+                    <a:lstStyle/>
+                    <a:p>
+                      <a:pPr algn="ctr"/>
+                      <a:r>
+                        <a:rPr lang="en-US" b="0" dirty="0" smtClean="0"/>
+                        <a:t>8</a:t>
+                      </a:r>
+                      <a:endParaRPr lang="en-US" b="0" dirty="0"/>
+                    </a:p>
+                  </a:txBody>
+                  <a:tcPr/>
+                </a:tc>
+              </a:tr>
+            </a:tbl>
+          </a:graphicData>
+        </a:graphic>
+      </p:graphicFrame>
+      <p:graphicFrame>
+        <p:nvGraphicFramePr>
+          <p:cNvPr id="7" name="Content Placeholder 3"/>
+          <p:cNvGraphicFramePr>
+            <a:graphicFrameLocks/>
+          </p:cNvGraphicFramePr>
+          <p:nvPr/>
+        </p:nvGraphicFramePr>
+        <p:xfrm>
+          <a:off x="4343400" y="5410200"/>
+          <a:ext cx="381000" cy="370840"/>
+        </p:xfrm>
+        <a:graphic>
+          <a:graphicData uri="http://schemas.openxmlformats.org/drawingml/2006/table">
+            <a:tbl>
+              <a:tblPr firstRow="1" bandRow="1">
+                <a:tableStyleId>{5C22544A-7EE6-4342-B048-85BDC9FD1C3A}</a:tableStyleId>
+              </a:tblPr>
+              <a:tblGrid>
+                <a:gridCol w="381000"/>
+              </a:tblGrid>
+              <a:tr h="370840">
+                <a:tc>
+                  <a:txBody>
+                    <a:bodyPr/>
+                    <a:lstStyle/>
+                    <a:p>
+                      <a:pPr algn="ctr"/>
+                      <a:r>
+                        <a:rPr lang="en-US" b="0" dirty="0" smtClean="0"/>
+                        <a:t>5</a:t>
+                      </a:r>
+                      <a:endParaRPr lang="en-US" b="0" dirty="0"/>
+                    </a:p>
+                  </a:txBody>
+                  <a:tcPr/>
+                </a:tc>
+              </a:tr>
+            </a:tbl>
+          </a:graphicData>
+        </a:graphic>
+      </p:graphicFrame>
+      <p:graphicFrame>
+        <p:nvGraphicFramePr>
+          <p:cNvPr id="8" name="Content Placeholder 3"/>
+          <p:cNvGraphicFramePr>
+            <a:graphicFrameLocks/>
+          </p:cNvGraphicFramePr>
+          <p:nvPr/>
+        </p:nvGraphicFramePr>
+        <p:xfrm>
+          <a:off x="6096000" y="4953000"/>
+          <a:ext cx="381000" cy="370840"/>
+        </p:xfrm>
+        <a:graphic>
+          <a:graphicData uri="http://schemas.openxmlformats.org/drawingml/2006/table">
+            <a:tbl>
+              <a:tblPr firstRow="1" bandRow="1">
+                <a:tableStyleId>{5C22544A-7EE6-4342-B048-85BDC9FD1C3A}</a:tableStyleId>
+              </a:tblPr>
+              <a:tblGrid>
+                <a:gridCol w="381000"/>
+              </a:tblGrid>
+              <a:tr h="370840">
+                <a:tc>
+                  <a:txBody>
+                    <a:bodyPr/>
+                    <a:lstStyle/>
+                    <a:p>
+                      <a:pPr algn="ctr"/>
+                      <a:r>
+                        <a:rPr lang="en-US" b="0" dirty="0" smtClean="0"/>
+                        <a:t>2</a:t>
+                      </a:r>
+                      <a:endParaRPr lang="en-US" b="0" dirty="0"/>
+                    </a:p>
+                  </a:txBody>
+                  <a:tcPr/>
+                </a:tc>
+              </a:tr>
+            </a:tbl>
+          </a:graphicData>
+        </a:graphic>
+      </p:graphicFrame>
+      <p:graphicFrame>
+        <p:nvGraphicFramePr>
+          <p:cNvPr id="9" name="Content Placeholder 3"/>
+          <p:cNvGraphicFramePr>
+            <a:graphicFrameLocks/>
+          </p:cNvGraphicFramePr>
+          <p:nvPr/>
+        </p:nvGraphicFramePr>
+        <p:xfrm>
+          <a:off x="7543800" y="3886200"/>
+          <a:ext cx="381000" cy="370840"/>
+        </p:xfrm>
+        <a:graphic>
+          <a:graphicData uri="http://schemas.openxmlformats.org/drawingml/2006/table">
+            <a:tbl>
+              <a:tblPr firstRow="1" bandRow="1">
+                <a:tableStyleId>{5C22544A-7EE6-4342-B048-85BDC9FD1C3A}</a:tableStyleId>
+              </a:tblPr>
+              <a:tblGrid>
+                <a:gridCol w="381000"/>
+              </a:tblGrid>
+              <a:tr h="370840">
+                <a:tc>
+                  <a:txBody>
+                    <a:bodyPr/>
+                    <a:lstStyle/>
+                    <a:p>
+                      <a:pPr algn="ctr"/>
+                      <a:r>
+                        <a:rPr lang="en-US" b="0" dirty="0" smtClean="0"/>
+                        <a:t>7</a:t>
+                      </a:r>
+                      <a:endParaRPr lang="en-US" b="0" dirty="0"/>
+                    </a:p>
+                  </a:txBody>
+                  <a:tcPr/>
+                </a:tc>
+              </a:tr>
+            </a:tbl>
+          </a:graphicData>
+        </a:graphic>
+      </p:graphicFrame>
+      <p:cxnSp>
+        <p:nvCxnSpPr>
+          <p:cNvPr id="11" name="Straight Arrow Connector 10"/>
+          <p:cNvCxnSpPr/>
+          <p:nvPr/>
+        </p:nvCxnSpPr>
+        <p:spPr>
+          <a:xfrm>
+            <a:off x="1447800" y="3200400"/>
+            <a:ext cx="304800" cy="533400"/>
+          </a:xfrm>
+          <a:prstGeom prst="straightConnector1">
+            <a:avLst/>
+          </a:prstGeom>
+          <a:ln>
+            <a:headEnd type="arrow"/>
+            <a:tailEnd type="arrow"/>
+          </a:ln>
+        </p:spPr>
+        <p:style>
+          <a:lnRef idx="1">
+            <a:schemeClr val="accent1"/>
+          </a:lnRef>
+          <a:fillRef idx="0">
+            <a:schemeClr val="accent1"/>
+          </a:fillRef>
+          <a:effectRef idx="0">
+            <a:schemeClr val="accent1"/>
+          </a:effectRef>
+          <a:fontRef idx="minor">
+            <a:schemeClr val="tx1"/>
+          </a:fontRef>
+        </p:style>
+      </p:cxnSp>
+      <p:cxnSp>
+        <p:nvCxnSpPr>
+          <p:cNvPr id="15" name="Straight Arrow Connector 14"/>
+          <p:cNvCxnSpPr/>
+          <p:nvPr/>
+        </p:nvCxnSpPr>
+        <p:spPr>
+          <a:xfrm>
+            <a:off x="2209800" y="4343400"/>
+            <a:ext cx="2057400" cy="1143000"/>
+          </a:xfrm>
+          <a:prstGeom prst="straightConnector1">
+            <a:avLst/>
+          </a:prstGeom>
+          <a:ln>
+            <a:headEnd type="arrow"/>
+            <a:tailEnd type="arrow"/>
+          </a:ln>
+        </p:spPr>
+        <p:style>
+          <a:lnRef idx="1">
+            <a:schemeClr val="accent1"/>
+          </a:lnRef>
+          <a:fillRef idx="0">
+            <a:schemeClr val="accent1"/>
+          </a:fillRef>
+          <a:effectRef idx="0">
+            <a:schemeClr val="accent1"/>
+          </a:effectRef>
+          <a:fontRef idx="minor">
+            <a:schemeClr val="tx1"/>
+          </a:fontRef>
+        </p:style>
+      </p:cxnSp>
+      <p:cxnSp>
+        <p:nvCxnSpPr>
+          <p:cNvPr id="17" name="Straight Arrow Connector 16"/>
+          <p:cNvCxnSpPr/>
+          <p:nvPr/>
+        </p:nvCxnSpPr>
+        <p:spPr>
+          <a:xfrm flipV="1">
+            <a:off x="4876800" y="5181600"/>
+            <a:ext cx="1066800" cy="304800"/>
+          </a:xfrm>
+          <a:prstGeom prst="straightConnector1">
+            <a:avLst/>
+          </a:prstGeom>
+          <a:ln>
+            <a:headEnd type="arrow"/>
+            <a:tailEnd type="arrow"/>
+          </a:ln>
+        </p:spPr>
+        <p:style>
+          <a:lnRef idx="1">
+            <a:schemeClr val="accent1"/>
+          </a:lnRef>
+          <a:fillRef idx="0">
+            <a:schemeClr val="accent1"/>
+          </a:fillRef>
+          <a:effectRef idx="0">
+            <a:schemeClr val="accent1"/>
+          </a:effectRef>
+          <a:fontRef idx="minor">
+            <a:schemeClr val="tx1"/>
+          </a:fontRef>
+        </p:style>
+      </p:cxnSp>
+      <p:cxnSp>
+        <p:nvCxnSpPr>
+          <p:cNvPr id="19" name="Straight Arrow Connector 18"/>
+          <p:cNvCxnSpPr/>
+          <p:nvPr/>
+        </p:nvCxnSpPr>
+        <p:spPr>
+          <a:xfrm flipV="1">
+            <a:off x="6553200" y="4267200"/>
+            <a:ext cx="914400" cy="609600"/>
+          </a:xfrm>
+          <a:prstGeom prst="straightConnector1">
+            <a:avLst/>
+          </a:prstGeom>
+          <a:ln>
+            <a:headEnd type="arrow"/>
+            <a:tailEnd type="arrow"/>
+          </a:ln>
+        </p:spPr>
+        <p:style>
+          <a:lnRef idx="1">
+            <a:schemeClr val="accent1"/>
+          </a:lnRef>
+          <a:fillRef idx="0">
+            <a:schemeClr val="accent1"/>
+          </a:fillRef>
+          <a:effectRef idx="0">
+            <a:schemeClr val="accent1"/>
+          </a:effectRef>
+          <a:fontRef idx="minor">
+            <a:schemeClr val="tx1"/>
+          </a:fontRef>
+        </p:style>
+      </p:cxnSp>
+      <p:sp>
+        <p:nvSpPr>
+          <p:cNvPr id="20" name="TextBox 19"/>
+          <p:cNvSpPr txBox="1"/>
+          <p:nvPr/>
+        </p:nvSpPr>
+        <p:spPr>
+          <a:xfrm>
+            <a:off x="2590800" y="1828800"/>
+            <a:ext cx="5867400" cy="923330"/>
+          </a:xfrm>
+          <a:prstGeom prst="rect">
+            <a:avLst/>
+          </a:prstGeom>
+          <a:noFill/>
+        </p:spPr>
+        <p:txBody>
+          <a:bodyPr wrap="square" rtlCol="0">
+            <a:spAutoFit/>
+          </a:bodyPr>
+          <a:lstStyle/>
+          <a:p>
+            <a:r>
+              <a:rPr lang="en-US" dirty="0" smtClean="0"/>
+              <a:t>std</a:t>
+            </a:r>
+            <a:r>
+              <a:rPr lang="en-US" dirty="0" smtClean="0"/>
+              <a:t>::list&lt; </a:t>
+            </a:r>
+            <a:r>
+              <a:rPr lang="en-US" dirty="0" err="1" smtClean="0"/>
+              <a:t>int</a:t>
+            </a:r>
+            <a:r>
+              <a:rPr lang="en-US" dirty="0" smtClean="0"/>
+              <a:t> &gt;::</a:t>
+            </a:r>
+            <a:r>
+              <a:rPr lang="en-US" dirty="0" err="1" smtClean="0"/>
+              <a:t>iterator</a:t>
+            </a:r>
+            <a:r>
+              <a:rPr lang="en-US" dirty="0" smtClean="0"/>
+              <a:t> </a:t>
+            </a:r>
+            <a:r>
+              <a:rPr lang="en-US" dirty="0" err="1" smtClean="0"/>
+              <a:t>i</a:t>
+            </a:r>
+            <a:r>
+              <a:rPr lang="en-US" dirty="0" smtClean="0"/>
+              <a:t> = std::find( </a:t>
+            </a:r>
+            <a:r>
+              <a:rPr lang="en-US" dirty="0" err="1" smtClean="0"/>
+              <a:t>a.begin</a:t>
+            </a:r>
+            <a:r>
+              <a:rPr lang="en-US" dirty="0" smtClean="0"/>
+              <a:t>(), </a:t>
+            </a:r>
+            <a:r>
+              <a:rPr lang="en-US" dirty="0" err="1" smtClean="0"/>
+              <a:t>a.end</a:t>
+            </a:r>
+            <a:r>
+              <a:rPr lang="en-US" dirty="0" smtClean="0"/>
+              <a:t>(), 3 );</a:t>
+            </a:r>
+          </a:p>
+          <a:p>
+            <a:r>
+              <a:rPr lang="en-US" dirty="0" err="1" smtClean="0"/>
+              <a:t>a.erase</a:t>
+            </a:r>
+            <a:r>
+              <a:rPr lang="en-US" dirty="0" smtClean="0"/>
+              <a:t>( </a:t>
+            </a:r>
+            <a:r>
+              <a:rPr lang="en-US" dirty="0" err="1" smtClean="0"/>
+              <a:t>i</a:t>
+            </a:r>
+            <a:r>
+              <a:rPr lang="en-US" dirty="0" smtClean="0"/>
+              <a:t> );</a:t>
+            </a:r>
+          </a:p>
+          <a:p>
+            <a:endParaRPr lang="en-US" dirty="0"/>
+          </a:p>
+        </p:txBody>
+      </p:sp>
+    </p:spTree>
+  </p:cSld>
+  <p:clrMapOvr>
+    <a:masterClrMapping/>
+  </p:clrMapOvr>
+</p:sld>
+</file>
+
+<file path=ppt/slides/slide18.xml><?xml version="1.0" encoding="utf-8"?>
+<p:sld xmlns:a="http://schemas.openxmlformats.org/drawingml/2006/main" xmlns:r="http://schemas.openxmlformats.org/officeDocument/2006/relationships" xmlns:p="http://schemas.openxmlformats.org/presentationml/2006/main">
+  <p:cSld>
+    <p:spTree>
+      <p:nvGrpSpPr>
+        <p:cNvPr id="1" name=""/>
+        <p:cNvGrpSpPr/>
+        <p:nvPr/>
+      </p:nvGrpSpPr>
+      <p:grpSpPr>
+        <a:xfrm>
+          <a:off x="0" y="0"/>
+          <a:ext cx="0" cy="0"/>
+          <a:chOff x="0" y="0"/>
+          <a:chExt cx="0" cy="0"/>
+        </a:xfrm>
+      </p:grpSpPr>
+      <p:sp>
+        <p:nvSpPr>
+          <p:cNvPr id="2" name="Title 1"/>
+          <p:cNvSpPr>
+            <a:spLocks noGrp="1"/>
+          </p:cNvSpPr>
+          <p:nvPr>
+            <p:ph type="title"/>
+          </p:nvPr>
+        </p:nvSpPr>
+        <p:spPr/>
+        <p:txBody>
+          <a:bodyPr/>
+          <a:lstStyle/>
+          <a:p>
+            <a:r>
+              <a:rPr lang="en-US" dirty="0" smtClean="0"/>
+              <a:t>std::queue, std::</a:t>
+            </a:r>
+            <a:r>
+              <a:rPr lang="en-US" dirty="0" err="1" smtClean="0"/>
+              <a:t>priority_queue</a:t>
+            </a:r>
+            <a:endParaRPr lang="en-US" dirty="0"/>
+          </a:p>
+        </p:txBody>
+      </p:sp>
+      <p:sp>
+        <p:nvSpPr>
+          <p:cNvPr id="3" name="Content Placeholder 2"/>
+          <p:cNvSpPr>
+            <a:spLocks noGrp="1"/>
+          </p:cNvSpPr>
+          <p:nvPr>
+            <p:ph idx="1"/>
+          </p:nvPr>
+        </p:nvSpPr>
+        <p:spPr/>
+        <p:txBody>
+          <a:bodyPr/>
+          <a:lstStyle/>
+          <a:p>
+            <a:r>
+              <a:rPr lang="ru-RU" dirty="0" smtClean="0"/>
+              <a:t>Это не контейнер – это адаптер.</a:t>
+            </a:r>
+            <a:endParaRPr lang="en-US" dirty="0"/>
+          </a:p>
+        </p:txBody>
+      </p:sp>
+    </p:spTree>
+  </p:cSld>
+  <p:clrMapOvr>
+    <a:masterClrMapping/>
+  </p:clrMapOvr>
+</p:sld>
+</file>
+
+<file path=ppt/slides/slide19.xml><?xml version="1.0" encoding="utf-8"?>
+<p:sld xmlns:a="http://schemas.openxmlformats.org/drawingml/2006/main" xmlns:r="http://schemas.openxmlformats.org/officeDocument/2006/relationships" xmlns:p="http://schemas.openxmlformats.org/presentationml/2006/main">
+  <p:cSld>
+    <p:spTree>
+      <p:nvGrpSpPr>
+        <p:cNvPr id="1" name=""/>
+        <p:cNvGrpSpPr/>
+        <p:nvPr/>
+      </p:nvGrpSpPr>
+      <p:grpSpPr>
+        <a:xfrm>
+          <a:off x="0" y="0"/>
+          <a:ext cx="0" cy="0"/>
+          <a:chOff x="0" y="0"/>
+          <a:chExt cx="0" cy="0"/>
+        </a:xfrm>
+      </p:grpSpPr>
+      <p:sp>
+        <p:nvSpPr>
+          <p:cNvPr id="2" name="Title 1"/>
+          <p:cNvSpPr>
+            <a:spLocks noGrp="1"/>
+          </p:cNvSpPr>
+          <p:nvPr>
+            <p:ph type="title"/>
+          </p:nvPr>
+        </p:nvSpPr>
+        <p:spPr/>
+        <p:txBody>
+          <a:bodyPr/>
+          <a:lstStyle/>
+          <a:p>
+            <a:r>
+              <a:rPr lang="en-US" dirty="0" smtClean="0"/>
+              <a:t>std::</a:t>
+            </a:r>
+            <a:r>
+              <a:rPr lang="en-US" dirty="0" err="1" smtClean="0"/>
+              <a:t>deque</a:t>
+            </a:r>
+            <a:endParaRPr lang="en-US" dirty="0"/>
+          </a:p>
+        </p:txBody>
+      </p:sp>
+      <p:sp>
+        <p:nvSpPr>
+          <p:cNvPr id="3" name="Content Placeholder 2"/>
+          <p:cNvSpPr>
+            <a:spLocks noGrp="1"/>
+          </p:cNvSpPr>
+          <p:nvPr>
+            <p:ph idx="1"/>
+          </p:nvPr>
+        </p:nvSpPr>
+        <p:spPr/>
+        <p:txBody>
+          <a:bodyPr/>
+          <a:lstStyle/>
+          <a:p>
+            <a:r>
+              <a:rPr lang="ru-RU" dirty="0" smtClean="0"/>
+              <a:t>Когда нужен и </a:t>
+            </a:r>
+            <a:r>
+              <a:rPr lang="en-US" dirty="0" smtClean="0"/>
+              <a:t>vector</a:t>
+            </a:r>
+            <a:r>
+              <a:rPr lang="ru-RU" dirty="0" smtClean="0"/>
+              <a:t> и </a:t>
+            </a:r>
+            <a:r>
+              <a:rPr lang="en-US" dirty="0" smtClean="0"/>
+              <a:t>list.</a:t>
+            </a:r>
+          </a:p>
+          <a:p>
+            <a:r>
+              <a:rPr lang="en-US" dirty="0" smtClean="0">
+                <a:hlinkClick r:id="rId2"/>
+              </a:rPr>
+              <a:t>http://</a:t>
+            </a:r>
+            <a:r>
+              <a:rPr lang="en-US" dirty="0" smtClean="0">
+                <a:hlinkClick r:id="rId2"/>
+              </a:rPr>
+              <a:t>ru.cppreference.com/w/cpp/container/deque</a:t>
+            </a:r>
+            <a:endParaRPr lang="en-US" dirty="0" smtClean="0"/>
+          </a:p>
+          <a:p>
+            <a:r>
+              <a:rPr lang="en-US" dirty="0" smtClean="0">
+                <a:hlinkClick r:id="rId3"/>
+              </a:rPr>
+              <a:t>http://www.cplusplus.com/reference/deque/deque</a:t>
+            </a:r>
+            <a:r>
+              <a:rPr lang="en-US" dirty="0" smtClean="0">
+                <a:hlinkClick r:id="rId3"/>
+              </a:rPr>
+              <a:t>/</a:t>
+            </a:r>
+            <a:endParaRPr lang="en-US" dirty="0" smtClean="0"/>
+          </a:p>
+          <a:p>
+            <a:endParaRPr lang="en-US" dirty="0"/>
           </a:p>
         </p:txBody>
       </p:sp>
@@ -3786,6 +6488,1104 @@
 </p:sld>
 </file>
 
+<file path=ppt/slides/slide20.xml><?xml version="1.0" encoding="utf-8"?>
+<p:sld xmlns:a="http://schemas.openxmlformats.org/drawingml/2006/main" xmlns:r="http://schemas.openxmlformats.org/officeDocument/2006/relationships" xmlns:p="http://schemas.openxmlformats.org/presentationml/2006/main">
+  <p:cSld>
+    <p:spTree>
+      <p:nvGrpSpPr>
+        <p:cNvPr id="1" name=""/>
+        <p:cNvGrpSpPr/>
+        <p:nvPr/>
+      </p:nvGrpSpPr>
+      <p:grpSpPr>
+        <a:xfrm>
+          <a:off x="0" y="0"/>
+          <a:ext cx="0" cy="0"/>
+          <a:chOff x="0" y="0"/>
+          <a:chExt cx="0" cy="0"/>
+        </a:xfrm>
+      </p:grpSpPr>
+      <p:sp>
+        <p:nvSpPr>
+          <p:cNvPr id="2" name="Title 1"/>
+          <p:cNvSpPr>
+            <a:spLocks noGrp="1"/>
+          </p:cNvSpPr>
+          <p:nvPr>
+            <p:ph type="title"/>
+          </p:nvPr>
+        </p:nvSpPr>
+        <p:spPr/>
+        <p:txBody>
+          <a:bodyPr/>
+          <a:lstStyle/>
+          <a:p>
+            <a:r>
+              <a:rPr lang="en-US" dirty="0" smtClean="0"/>
+              <a:t>std::map</a:t>
+            </a:r>
+            <a:endParaRPr lang="en-US" dirty="0"/>
+          </a:p>
+        </p:txBody>
+      </p:sp>
+      <p:sp>
+        <p:nvSpPr>
+          <p:cNvPr id="3" name="Content Placeholder 2"/>
+          <p:cNvSpPr>
+            <a:spLocks noGrp="1"/>
+          </p:cNvSpPr>
+          <p:nvPr>
+            <p:ph idx="1"/>
+          </p:nvPr>
+        </p:nvSpPr>
+        <p:spPr/>
+        <p:txBody>
+          <a:bodyPr/>
+          <a:lstStyle/>
+          <a:p>
+            <a:r>
+              <a:rPr lang="ru-RU" dirty="0" smtClean="0"/>
+              <a:t>Красно-чёрное дерево.</a:t>
+            </a:r>
+            <a:r>
+              <a:rPr lang="en-US" dirty="0" smtClean="0"/>
+              <a:t> ???</a:t>
+            </a:r>
+            <a:endParaRPr lang="ru-RU" dirty="0" smtClean="0"/>
+          </a:p>
+          <a:p>
+            <a:r>
+              <a:rPr lang="en-US" i="1" dirty="0" err="1" smtClean="0"/>
+              <a:t>typedef</a:t>
+            </a:r>
+            <a:r>
+              <a:rPr lang="en-US" dirty="0" smtClean="0"/>
+              <a:t> pair&lt;</a:t>
+            </a:r>
+            <a:r>
+              <a:rPr lang="en-US" i="1" dirty="0" smtClean="0"/>
+              <a:t>const</a:t>
+            </a:r>
+            <a:r>
+              <a:rPr lang="en-US" dirty="0" smtClean="0"/>
+              <a:t> Key, T&gt; </a:t>
+            </a:r>
+            <a:r>
+              <a:rPr lang="en-US" dirty="0" err="1" smtClean="0"/>
+              <a:t>value_type</a:t>
+            </a:r>
+            <a:r>
+              <a:rPr lang="en-US" dirty="0" smtClean="0"/>
+              <a:t>;</a:t>
+            </a:r>
+            <a:endParaRPr lang="ru-RU" dirty="0" smtClean="0"/>
+          </a:p>
+          <a:p>
+            <a:endParaRPr lang="ru-RU" dirty="0" smtClean="0"/>
+          </a:p>
+          <a:p>
+            <a:r>
+              <a:rPr lang="ru-RU" dirty="0" smtClean="0"/>
+              <a:t>Отсортировано</a:t>
+            </a:r>
+            <a:endParaRPr lang="en-US" dirty="0" smtClean="0"/>
+          </a:p>
+          <a:p>
+            <a:endParaRPr lang="en-US" dirty="0" smtClean="0"/>
+          </a:p>
+          <a:p>
+            <a:r>
+              <a:rPr lang="en-US" dirty="0" smtClean="0"/>
+              <a:t>begin(), end(), find()</a:t>
+            </a:r>
+            <a:endParaRPr lang="en-US" dirty="0" smtClean="0"/>
+          </a:p>
+          <a:p>
+            <a:endParaRPr lang="en-US" dirty="0" smtClean="0"/>
+          </a:p>
+          <a:p>
+            <a:pPr>
+              <a:buNone/>
+            </a:pPr>
+            <a:endParaRPr lang="ru-RU" dirty="0" smtClean="0"/>
+          </a:p>
+          <a:p>
+            <a:pPr>
+              <a:buNone/>
+            </a:pPr>
+            <a:endParaRPr lang="en-US" dirty="0"/>
+          </a:p>
+        </p:txBody>
+      </p:sp>
+    </p:spTree>
+  </p:cSld>
+  <p:clrMapOvr>
+    <a:masterClrMapping/>
+  </p:clrMapOvr>
+</p:sld>
+</file>
+
+<file path=ppt/slides/slide21.xml><?xml version="1.0" encoding="utf-8"?>
+<p:sld xmlns:a="http://schemas.openxmlformats.org/drawingml/2006/main" xmlns:r="http://schemas.openxmlformats.org/officeDocument/2006/relationships" xmlns:p="http://schemas.openxmlformats.org/presentationml/2006/main">
+  <p:cSld>
+    <p:spTree>
+      <p:nvGrpSpPr>
+        <p:cNvPr id="1" name=""/>
+        <p:cNvGrpSpPr/>
+        <p:nvPr/>
+      </p:nvGrpSpPr>
+      <p:grpSpPr>
+        <a:xfrm>
+          <a:off x="0" y="0"/>
+          <a:ext cx="0" cy="0"/>
+          <a:chOff x="0" y="0"/>
+          <a:chExt cx="0" cy="0"/>
+        </a:xfrm>
+      </p:grpSpPr>
+      <p:sp>
+        <p:nvSpPr>
+          <p:cNvPr id="2" name="Title 1"/>
+          <p:cNvSpPr>
+            <a:spLocks noGrp="1"/>
+          </p:cNvSpPr>
+          <p:nvPr>
+            <p:ph type="title"/>
+          </p:nvPr>
+        </p:nvSpPr>
+        <p:spPr/>
+        <p:txBody>
+          <a:bodyPr/>
+          <a:lstStyle/>
+          <a:p>
+            <a:r>
+              <a:rPr lang="en-US" dirty="0" smtClean="0"/>
+              <a:t>std::set</a:t>
+            </a:r>
+            <a:endParaRPr lang="en-US" dirty="0"/>
+          </a:p>
+        </p:txBody>
+      </p:sp>
+      <p:sp>
+        <p:nvSpPr>
+          <p:cNvPr id="3" name="Content Placeholder 2"/>
+          <p:cNvSpPr>
+            <a:spLocks noGrp="1"/>
+          </p:cNvSpPr>
+          <p:nvPr>
+            <p:ph idx="1"/>
+          </p:nvPr>
+        </p:nvSpPr>
+        <p:spPr/>
+        <p:txBody>
+          <a:bodyPr/>
+          <a:lstStyle/>
+          <a:p>
+            <a:r>
+              <a:rPr lang="en-US" dirty="0" smtClean="0"/>
+              <a:t>std::map </a:t>
+            </a:r>
+            <a:r>
+              <a:rPr lang="ru-RU" dirty="0" smtClean="0"/>
+              <a:t>без второго элемента.</a:t>
+            </a:r>
+            <a:endParaRPr lang="en-US" dirty="0" smtClean="0"/>
+          </a:p>
+          <a:p>
+            <a:endParaRPr lang="en-US" dirty="0" smtClean="0"/>
+          </a:p>
+          <a:p>
+            <a:r>
+              <a:rPr lang="en-US" dirty="0" smtClean="0"/>
+              <a:t>std::set&lt; </a:t>
+            </a:r>
+            <a:r>
+              <a:rPr lang="en-US" dirty="0" err="1" smtClean="0"/>
+              <a:t>int</a:t>
+            </a:r>
+            <a:r>
+              <a:rPr lang="en-US" dirty="0" smtClean="0"/>
+              <a:t>, std::greater&lt; </a:t>
+            </a:r>
+            <a:r>
+              <a:rPr lang="en-US" dirty="0" err="1" smtClean="0"/>
+              <a:t>int</a:t>
+            </a:r>
+            <a:r>
+              <a:rPr lang="en-US" dirty="0" smtClean="0"/>
+              <a:t> &gt; &gt;</a:t>
+            </a:r>
+            <a:endParaRPr lang="en-US" dirty="0"/>
+          </a:p>
+        </p:txBody>
+      </p:sp>
+    </p:spTree>
+  </p:cSld>
+  <p:clrMapOvr>
+    <a:masterClrMapping/>
+  </p:clrMapOvr>
+</p:sld>
+</file>
+
+<file path=ppt/slides/slide22.xml><?xml version="1.0" encoding="utf-8"?>
+<p:sld xmlns:a="http://schemas.openxmlformats.org/drawingml/2006/main" xmlns:r="http://schemas.openxmlformats.org/officeDocument/2006/relationships" xmlns:p="http://schemas.openxmlformats.org/presentationml/2006/main">
+  <p:cSld>
+    <p:spTree>
+      <p:nvGrpSpPr>
+        <p:cNvPr id="1" name=""/>
+        <p:cNvGrpSpPr/>
+        <p:nvPr/>
+      </p:nvGrpSpPr>
+      <p:grpSpPr>
+        <a:xfrm>
+          <a:off x="0" y="0"/>
+          <a:ext cx="0" cy="0"/>
+          <a:chOff x="0" y="0"/>
+          <a:chExt cx="0" cy="0"/>
+        </a:xfrm>
+      </p:grpSpPr>
+      <p:sp>
+        <p:nvSpPr>
+          <p:cNvPr id="2" name="Title 1"/>
+          <p:cNvSpPr>
+            <a:spLocks noGrp="1"/>
+          </p:cNvSpPr>
+          <p:nvPr>
+            <p:ph type="title"/>
+          </p:nvPr>
+        </p:nvSpPr>
+        <p:spPr/>
+        <p:txBody>
+          <a:bodyPr/>
+          <a:lstStyle/>
+          <a:p>
+            <a:r>
+              <a:rPr lang="en-US" dirty="0" smtClean="0"/>
+              <a:t>std::</a:t>
+            </a:r>
+            <a:r>
+              <a:rPr lang="en-US" dirty="0" err="1" smtClean="0"/>
+              <a:t>multimap</a:t>
+            </a:r>
+            <a:r>
+              <a:rPr lang="en-US" dirty="0" smtClean="0"/>
+              <a:t>, std::</a:t>
+            </a:r>
+            <a:r>
+              <a:rPr lang="en-US" dirty="0" err="1" smtClean="0"/>
+              <a:t>multiset</a:t>
+            </a:r>
+            <a:endParaRPr lang="en-US" dirty="0"/>
+          </a:p>
+        </p:txBody>
+      </p:sp>
+      <p:sp>
+        <p:nvSpPr>
+          <p:cNvPr id="3" name="Content Placeholder 2"/>
+          <p:cNvSpPr>
+            <a:spLocks noGrp="1"/>
+          </p:cNvSpPr>
+          <p:nvPr>
+            <p:ph idx="1"/>
+          </p:nvPr>
+        </p:nvSpPr>
+        <p:spPr/>
+        <p:txBody>
+          <a:bodyPr/>
+          <a:lstStyle/>
+          <a:p>
+            <a:r>
+              <a:rPr lang="ru-RU" dirty="0" smtClean="0"/>
+              <a:t>Один ключ – несколько значений.</a:t>
+            </a:r>
+            <a:endParaRPr lang="en-US" dirty="0" smtClean="0"/>
+          </a:p>
+          <a:p>
+            <a:endParaRPr lang="ru-RU" dirty="0" smtClean="0"/>
+          </a:p>
+          <a:p>
+            <a:r>
+              <a:rPr lang="en-US" dirty="0" err="1" smtClean="0"/>
+              <a:t>lower_bound</a:t>
+            </a:r>
+            <a:r>
+              <a:rPr lang="en-US" dirty="0" smtClean="0"/>
+              <a:t>( const T&amp; v );</a:t>
+            </a:r>
+          </a:p>
+          <a:p>
+            <a:r>
+              <a:rPr lang="en-US" dirty="0" err="1" smtClean="0"/>
+              <a:t>upper_bound</a:t>
+            </a:r>
+            <a:r>
+              <a:rPr lang="en-US" dirty="0" smtClean="0"/>
+              <a:t>( const T&amp; v );</a:t>
+            </a:r>
+          </a:p>
+          <a:p>
+            <a:r>
+              <a:rPr lang="en-US" dirty="0" err="1" smtClean="0"/>
+              <a:t>equal_range</a:t>
+            </a:r>
+            <a:r>
+              <a:rPr lang="en-US" dirty="0" smtClean="0"/>
+              <a:t>( </a:t>
+            </a:r>
+            <a:r>
+              <a:rPr lang="en-US" dirty="0" smtClean="0"/>
+              <a:t>const T&amp; v );</a:t>
+            </a:r>
+          </a:p>
+          <a:p>
+            <a:endParaRPr lang="en-US" dirty="0"/>
+          </a:p>
+        </p:txBody>
+      </p:sp>
+    </p:spTree>
+  </p:cSld>
+  <p:clrMapOvr>
+    <a:masterClrMapping/>
+  </p:clrMapOvr>
+</p:sld>
+</file>
+
+<file path=ppt/slides/slide23.xml><?xml version="1.0" encoding="utf-8"?>
+<p:sld xmlns:a="http://schemas.openxmlformats.org/drawingml/2006/main" xmlns:r="http://schemas.openxmlformats.org/officeDocument/2006/relationships" xmlns:p="http://schemas.openxmlformats.org/presentationml/2006/main">
+  <p:cSld>
+    <p:spTree>
+      <p:nvGrpSpPr>
+        <p:cNvPr id="1" name=""/>
+        <p:cNvGrpSpPr/>
+        <p:nvPr/>
+      </p:nvGrpSpPr>
+      <p:grpSpPr>
+        <a:xfrm>
+          <a:off x="0" y="0"/>
+          <a:ext cx="0" cy="0"/>
+          <a:chOff x="0" y="0"/>
+          <a:chExt cx="0" cy="0"/>
+        </a:xfrm>
+      </p:grpSpPr>
+      <p:sp>
+        <p:nvSpPr>
+          <p:cNvPr id="2" name="Title 1"/>
+          <p:cNvSpPr>
+            <a:spLocks noGrp="1"/>
+          </p:cNvSpPr>
+          <p:nvPr>
+            <p:ph type="title"/>
+          </p:nvPr>
+        </p:nvSpPr>
+        <p:spPr/>
+        <p:txBody>
+          <a:bodyPr/>
+          <a:lstStyle/>
+          <a:p>
+            <a:r>
+              <a:rPr lang="en-US" dirty="0" smtClean="0"/>
+              <a:t>Q?</a:t>
+            </a:r>
+            <a:endParaRPr lang="en-US" dirty="0"/>
+          </a:p>
+        </p:txBody>
+      </p:sp>
+      <p:sp>
+        <p:nvSpPr>
+          <p:cNvPr id="3" name="Content Placeholder 2"/>
+          <p:cNvSpPr>
+            <a:spLocks noGrp="1"/>
+          </p:cNvSpPr>
+          <p:nvPr>
+            <p:ph idx="1"/>
+          </p:nvPr>
+        </p:nvSpPr>
+        <p:spPr/>
+        <p:txBody>
+          <a:bodyPr/>
+          <a:lstStyle/>
+          <a:p>
+            <a:endParaRPr lang="en-US" dirty="0"/>
+          </a:p>
+        </p:txBody>
+      </p:sp>
+    </p:spTree>
+  </p:cSld>
+  <p:clrMapOvr>
+    <a:masterClrMapping/>
+  </p:clrMapOvr>
+</p:sld>
+</file>
+
+<file path=ppt/slides/slide24.xml><?xml version="1.0" encoding="utf-8"?>
+<p:sld xmlns:a="http://schemas.openxmlformats.org/drawingml/2006/main" xmlns:r="http://schemas.openxmlformats.org/officeDocument/2006/relationships" xmlns:p="http://schemas.openxmlformats.org/presentationml/2006/main">
+  <p:cSld>
+    <p:spTree>
+      <p:nvGrpSpPr>
+        <p:cNvPr id="1" name=""/>
+        <p:cNvGrpSpPr/>
+        <p:nvPr/>
+      </p:nvGrpSpPr>
+      <p:grpSpPr>
+        <a:xfrm>
+          <a:off x="0" y="0"/>
+          <a:ext cx="0" cy="0"/>
+          <a:chOff x="0" y="0"/>
+          <a:chExt cx="0" cy="0"/>
+        </a:xfrm>
+      </p:grpSpPr>
+      <p:sp>
+        <p:nvSpPr>
+          <p:cNvPr id="2" name="Title 1"/>
+          <p:cNvSpPr>
+            <a:spLocks noGrp="1"/>
+          </p:cNvSpPr>
+          <p:nvPr>
+            <p:ph type="title"/>
+          </p:nvPr>
+        </p:nvSpPr>
+        <p:spPr/>
+        <p:txBody>
+          <a:bodyPr/>
+          <a:lstStyle/>
+          <a:p>
+            <a:r>
+              <a:rPr lang="ru-RU" dirty="0" smtClean="0"/>
+              <a:t>Алгоритмы</a:t>
+            </a:r>
+            <a:endParaRPr lang="en-US" dirty="0"/>
+          </a:p>
+        </p:txBody>
+      </p:sp>
+      <p:sp>
+        <p:nvSpPr>
+          <p:cNvPr id="3" name="Content Placeholder 2"/>
+          <p:cNvSpPr>
+            <a:spLocks noGrp="1"/>
+          </p:cNvSpPr>
+          <p:nvPr>
+            <p:ph idx="1"/>
+          </p:nvPr>
+        </p:nvSpPr>
+        <p:spPr>
+          <a:xfrm>
+            <a:off x="457200" y="2590800"/>
+            <a:ext cx="8229600" cy="3535363"/>
+          </a:xfrm>
+        </p:spPr>
+        <p:txBody>
+          <a:bodyPr/>
+          <a:lstStyle/>
+          <a:p>
+            <a:r>
+              <a:rPr lang="ru-RU" dirty="0" smtClean="0"/>
+              <a:t>Не изменяющие последовательность</a:t>
+            </a:r>
+          </a:p>
+          <a:p>
+            <a:r>
+              <a:rPr lang="ru-RU" dirty="0" smtClean="0"/>
+              <a:t>Изменяющие последовательность</a:t>
+            </a:r>
+            <a:endParaRPr lang="en-US" dirty="0" smtClean="0"/>
+          </a:p>
+          <a:p>
+            <a:pPr lvl="1"/>
+            <a:r>
+              <a:rPr lang="ru-RU" dirty="0" smtClean="0"/>
+              <a:t>Сортирующие последовательность</a:t>
+            </a:r>
+          </a:p>
+          <a:p>
+            <a:endParaRPr lang="en-US" dirty="0"/>
+          </a:p>
+        </p:txBody>
+      </p:sp>
+    </p:spTree>
+  </p:cSld>
+  <p:clrMapOvr>
+    <a:masterClrMapping/>
+  </p:clrMapOvr>
+</p:sld>
+</file>
+
+<file path=ppt/slides/slide25.xml><?xml version="1.0" encoding="utf-8"?>
+<p:sld xmlns:a="http://schemas.openxmlformats.org/drawingml/2006/main" xmlns:r="http://schemas.openxmlformats.org/officeDocument/2006/relationships" xmlns:p="http://schemas.openxmlformats.org/presentationml/2006/main">
+  <p:cSld>
+    <p:spTree>
+      <p:nvGrpSpPr>
+        <p:cNvPr id="1" name=""/>
+        <p:cNvGrpSpPr/>
+        <p:nvPr/>
+      </p:nvGrpSpPr>
+      <p:grpSpPr>
+        <a:xfrm>
+          <a:off x="0" y="0"/>
+          <a:ext cx="0" cy="0"/>
+          <a:chOff x="0" y="0"/>
+          <a:chExt cx="0" cy="0"/>
+        </a:xfrm>
+      </p:grpSpPr>
+      <p:sp>
+        <p:nvSpPr>
+          <p:cNvPr id="2" name="Title 1"/>
+          <p:cNvSpPr>
+            <a:spLocks noGrp="1"/>
+          </p:cNvSpPr>
+          <p:nvPr>
+            <p:ph type="title"/>
+          </p:nvPr>
+        </p:nvSpPr>
+        <p:spPr/>
+        <p:txBody>
+          <a:bodyPr/>
+          <a:lstStyle/>
+          <a:p>
+            <a:r>
+              <a:rPr lang="ru-RU" dirty="0" smtClean="0"/>
+              <a:t>Не изменяющие</a:t>
+            </a:r>
+            <a:endParaRPr lang="en-US" dirty="0"/>
+          </a:p>
+        </p:txBody>
+      </p:sp>
+      <p:sp>
+        <p:nvSpPr>
+          <p:cNvPr id="3" name="Content Placeholder 2"/>
+          <p:cNvSpPr>
+            <a:spLocks noGrp="1"/>
+          </p:cNvSpPr>
+          <p:nvPr>
+            <p:ph idx="1"/>
+          </p:nvPr>
+        </p:nvSpPr>
+        <p:spPr/>
+        <p:txBody>
+          <a:bodyPr/>
+          <a:lstStyle/>
+          <a:p>
+            <a:r>
+              <a:rPr lang="en-US" dirty="0" err="1" smtClean="0"/>
+              <a:t>for_each</a:t>
+            </a:r>
+            <a:endParaRPr lang="en-US" dirty="0" smtClean="0"/>
+          </a:p>
+          <a:p>
+            <a:r>
+              <a:rPr lang="en-US" dirty="0" smtClean="0"/>
+              <a:t>find / </a:t>
+            </a:r>
+            <a:r>
+              <a:rPr lang="en-US" dirty="0" err="1" smtClean="0"/>
+              <a:t>find_if</a:t>
+            </a:r>
+            <a:endParaRPr lang="en-US" dirty="0" smtClean="0"/>
+          </a:p>
+          <a:p>
+            <a:r>
+              <a:rPr lang="en-US" dirty="0" smtClean="0"/>
+              <a:t>count / </a:t>
+            </a:r>
+            <a:r>
+              <a:rPr lang="en-US" dirty="0" err="1" smtClean="0"/>
+              <a:t>count_if</a:t>
+            </a:r>
+            <a:endParaRPr lang="en-US" dirty="0" smtClean="0"/>
+          </a:p>
+          <a:p>
+            <a:r>
+              <a:rPr lang="en-US" dirty="0" smtClean="0"/>
+              <a:t>equal / mismatch</a:t>
+            </a:r>
+          </a:p>
+          <a:p>
+            <a:r>
+              <a:rPr lang="en-US" dirty="0" smtClean="0"/>
+              <a:t>search / </a:t>
+            </a:r>
+            <a:r>
+              <a:rPr lang="en-US" dirty="0" err="1" smtClean="0"/>
+              <a:t>search_end</a:t>
+            </a:r>
+            <a:r>
+              <a:rPr lang="en-US" dirty="0" smtClean="0"/>
+              <a:t> / </a:t>
+            </a:r>
+            <a:r>
+              <a:rPr lang="en-US" dirty="0" err="1" smtClean="0"/>
+              <a:t>find_end</a:t>
+            </a:r>
+            <a:endParaRPr lang="en-US" dirty="0" smtClean="0"/>
+          </a:p>
+          <a:p>
+            <a:endParaRPr lang="en-US" dirty="0"/>
+          </a:p>
+        </p:txBody>
+      </p:sp>
+    </p:spTree>
+  </p:cSld>
+  <p:clrMapOvr>
+    <a:masterClrMapping/>
+  </p:clrMapOvr>
+</p:sld>
+</file>
+
+<file path=ppt/slides/slide26.xml><?xml version="1.0" encoding="utf-8"?>
+<p:sld xmlns:a="http://schemas.openxmlformats.org/drawingml/2006/main" xmlns:r="http://schemas.openxmlformats.org/officeDocument/2006/relationships" xmlns:p="http://schemas.openxmlformats.org/presentationml/2006/main">
+  <p:cSld>
+    <p:spTree>
+      <p:nvGrpSpPr>
+        <p:cNvPr id="1" name=""/>
+        <p:cNvGrpSpPr/>
+        <p:nvPr/>
+      </p:nvGrpSpPr>
+      <p:grpSpPr>
+        <a:xfrm>
+          <a:off x="0" y="0"/>
+          <a:ext cx="0" cy="0"/>
+          <a:chOff x="0" y="0"/>
+          <a:chExt cx="0" cy="0"/>
+        </a:xfrm>
+      </p:grpSpPr>
+      <p:sp>
+        <p:nvSpPr>
+          <p:cNvPr id="2" name="Title 1"/>
+          <p:cNvSpPr>
+            <a:spLocks noGrp="1"/>
+          </p:cNvSpPr>
+          <p:nvPr>
+            <p:ph type="title"/>
+          </p:nvPr>
+        </p:nvSpPr>
+        <p:spPr/>
+        <p:txBody>
+          <a:bodyPr/>
+          <a:lstStyle/>
+          <a:p>
+            <a:r>
+              <a:rPr lang="ru-RU" dirty="0" smtClean="0"/>
+              <a:t>Изменяющие</a:t>
+            </a:r>
+            <a:endParaRPr lang="en-US" dirty="0"/>
+          </a:p>
+        </p:txBody>
+      </p:sp>
+      <p:sp>
+        <p:nvSpPr>
+          <p:cNvPr id="3" name="Content Placeholder 2"/>
+          <p:cNvSpPr>
+            <a:spLocks noGrp="1"/>
+          </p:cNvSpPr>
+          <p:nvPr>
+            <p:ph idx="1"/>
+          </p:nvPr>
+        </p:nvSpPr>
+        <p:spPr/>
+        <p:txBody>
+          <a:bodyPr>
+            <a:normAutofit lnSpcReduction="10000"/>
+          </a:bodyPr>
+          <a:lstStyle/>
+          <a:p>
+            <a:r>
+              <a:rPr lang="en-US" dirty="0" smtClean="0"/>
+              <a:t>copy / </a:t>
+            </a:r>
+            <a:r>
+              <a:rPr lang="en-US" dirty="0" err="1" smtClean="0"/>
+              <a:t>copy_backward</a:t>
+            </a:r>
+            <a:endParaRPr lang="en-US" dirty="0" smtClean="0"/>
+          </a:p>
+          <a:p>
+            <a:r>
+              <a:rPr lang="en-US" dirty="0" smtClean="0"/>
+              <a:t>transform</a:t>
+            </a:r>
+          </a:p>
+          <a:p>
+            <a:r>
+              <a:rPr lang="en-US" dirty="0" smtClean="0"/>
+              <a:t>unique</a:t>
+            </a:r>
+          </a:p>
+          <a:p>
+            <a:r>
+              <a:rPr lang="en-US" dirty="0" smtClean="0"/>
+              <a:t>replace</a:t>
+            </a:r>
+          </a:p>
+          <a:p>
+            <a:r>
+              <a:rPr lang="en-US" dirty="0" smtClean="0"/>
+              <a:t>remove</a:t>
+            </a:r>
+          </a:p>
+          <a:p>
+            <a:r>
+              <a:rPr lang="en-US" dirty="0" smtClean="0"/>
+              <a:t>f</a:t>
+            </a:r>
+            <a:r>
+              <a:rPr lang="en-US" dirty="0" smtClean="0"/>
+              <a:t>ill / generate</a:t>
+            </a:r>
+          </a:p>
+          <a:p>
+            <a:r>
+              <a:rPr lang="en-US" dirty="0" smtClean="0"/>
+              <a:t>reverse / rotate</a:t>
+            </a:r>
+          </a:p>
+          <a:p>
+            <a:r>
+              <a:rPr lang="en-US" dirty="0" smtClean="0"/>
+              <a:t>swap</a:t>
+            </a:r>
+          </a:p>
+          <a:p>
+            <a:endParaRPr lang="en-US" dirty="0" smtClean="0"/>
+          </a:p>
+          <a:p>
+            <a:endParaRPr lang="en-US" dirty="0"/>
+          </a:p>
+        </p:txBody>
+      </p:sp>
+    </p:spTree>
+  </p:cSld>
+  <p:clrMapOvr>
+    <a:masterClrMapping/>
+  </p:clrMapOvr>
+</p:sld>
+</file>
+
+<file path=ppt/slides/slide27.xml><?xml version="1.0" encoding="utf-8"?>
+<p:sld xmlns:a="http://schemas.openxmlformats.org/drawingml/2006/main" xmlns:r="http://schemas.openxmlformats.org/officeDocument/2006/relationships" xmlns:p="http://schemas.openxmlformats.org/presentationml/2006/main">
+  <p:cSld>
+    <p:spTree>
+      <p:nvGrpSpPr>
+        <p:cNvPr id="1" name=""/>
+        <p:cNvGrpSpPr/>
+        <p:nvPr/>
+      </p:nvGrpSpPr>
+      <p:grpSpPr>
+        <a:xfrm>
+          <a:off x="0" y="0"/>
+          <a:ext cx="0" cy="0"/>
+          <a:chOff x="0" y="0"/>
+          <a:chExt cx="0" cy="0"/>
+        </a:xfrm>
+      </p:grpSpPr>
+      <p:sp>
+        <p:nvSpPr>
+          <p:cNvPr id="2" name="Title 1"/>
+          <p:cNvSpPr>
+            <a:spLocks noGrp="1"/>
+          </p:cNvSpPr>
+          <p:nvPr>
+            <p:ph type="title"/>
+          </p:nvPr>
+        </p:nvSpPr>
+        <p:spPr/>
+        <p:txBody>
+          <a:bodyPr/>
+          <a:lstStyle/>
+          <a:p>
+            <a:r>
+              <a:rPr lang="ru-RU" dirty="0" smtClean="0"/>
+              <a:t>Сортирующие алгоритмы</a:t>
+            </a:r>
+            <a:endParaRPr lang="en-US" dirty="0"/>
+          </a:p>
+        </p:txBody>
+      </p:sp>
+      <p:sp>
+        <p:nvSpPr>
+          <p:cNvPr id="3" name="Content Placeholder 2"/>
+          <p:cNvSpPr>
+            <a:spLocks noGrp="1"/>
+          </p:cNvSpPr>
+          <p:nvPr>
+            <p:ph idx="1"/>
+          </p:nvPr>
+        </p:nvSpPr>
+        <p:spPr/>
+        <p:txBody>
+          <a:bodyPr/>
+          <a:lstStyle/>
+          <a:p>
+            <a:r>
+              <a:rPr lang="en-US" dirty="0" smtClean="0"/>
+              <a:t>sort / </a:t>
+            </a:r>
+            <a:r>
+              <a:rPr lang="en-US" dirty="0" err="1" smtClean="0"/>
+              <a:t>partial_sort</a:t>
+            </a:r>
+            <a:r>
+              <a:rPr lang="en-US" dirty="0" smtClean="0"/>
+              <a:t> / </a:t>
+            </a:r>
+            <a:r>
+              <a:rPr lang="en-US" dirty="0" err="1" smtClean="0"/>
+              <a:t>stable_sort</a:t>
+            </a:r>
+            <a:endParaRPr lang="en-US" dirty="0" smtClean="0"/>
+          </a:p>
+          <a:p>
+            <a:r>
+              <a:rPr lang="en-US" dirty="0" smtClean="0"/>
+              <a:t>find</a:t>
+            </a:r>
+          </a:p>
+          <a:p>
+            <a:r>
+              <a:rPr lang="en-US" dirty="0" smtClean="0"/>
+              <a:t>merge / </a:t>
+            </a:r>
+            <a:r>
+              <a:rPr lang="en-US" dirty="0" err="1" smtClean="0"/>
+              <a:t>inplace_merge</a:t>
+            </a:r>
+            <a:endParaRPr lang="en-US" dirty="0" smtClean="0"/>
+          </a:p>
+          <a:p>
+            <a:r>
+              <a:rPr lang="en-US" dirty="0" smtClean="0"/>
+              <a:t>partition / </a:t>
+            </a:r>
+            <a:r>
+              <a:rPr lang="en-US" dirty="0" err="1" smtClean="0"/>
+              <a:t>stable_partition</a:t>
+            </a:r>
+            <a:endParaRPr lang="en-US" dirty="0" smtClean="0"/>
+          </a:p>
+          <a:p>
+            <a:r>
+              <a:rPr lang="en-US" dirty="0" err="1" smtClean="0"/>
+              <a:t>make_heap</a:t>
+            </a:r>
+            <a:r>
+              <a:rPr lang="en-US" dirty="0" smtClean="0"/>
+              <a:t> / </a:t>
+            </a:r>
+            <a:r>
+              <a:rPr lang="en-US" dirty="0" err="1" smtClean="0"/>
+              <a:t>push_heap</a:t>
+            </a:r>
+            <a:r>
+              <a:rPr lang="en-US" dirty="0" smtClean="0"/>
+              <a:t> / </a:t>
+            </a:r>
+            <a:r>
+              <a:rPr lang="en-US" dirty="0" err="1" smtClean="0"/>
+              <a:t>pop_heap</a:t>
+            </a:r>
+            <a:endParaRPr lang="en-US" dirty="0" smtClean="0"/>
+          </a:p>
+          <a:p>
+            <a:r>
+              <a:rPr lang="en-US" dirty="0" smtClean="0"/>
+              <a:t>min / max</a:t>
+            </a:r>
+          </a:p>
+          <a:p>
+            <a:endParaRPr lang="en-US" dirty="0" smtClean="0"/>
+          </a:p>
+          <a:p>
+            <a:endParaRPr lang="en-US" dirty="0"/>
+          </a:p>
+        </p:txBody>
+      </p:sp>
+    </p:spTree>
+  </p:cSld>
+  <p:clrMapOvr>
+    <a:masterClrMapping/>
+  </p:clrMapOvr>
+</p:sld>
+</file>
+
+<file path=ppt/slides/slide28.xml><?xml version="1.0" encoding="utf-8"?>
+<p:sld xmlns:a="http://schemas.openxmlformats.org/drawingml/2006/main" xmlns:r="http://schemas.openxmlformats.org/officeDocument/2006/relationships" xmlns:p="http://schemas.openxmlformats.org/presentationml/2006/main">
+  <p:cSld>
+    <p:spTree>
+      <p:nvGrpSpPr>
+        <p:cNvPr id="1" name=""/>
+        <p:cNvGrpSpPr/>
+        <p:nvPr/>
+      </p:nvGrpSpPr>
+      <p:grpSpPr>
+        <a:xfrm>
+          <a:off x="0" y="0"/>
+          <a:ext cx="0" cy="0"/>
+          <a:chOff x="0" y="0"/>
+          <a:chExt cx="0" cy="0"/>
+        </a:xfrm>
+      </p:grpSpPr>
+      <p:sp>
+        <p:nvSpPr>
+          <p:cNvPr id="2" name="Title 1"/>
+          <p:cNvSpPr>
+            <a:spLocks noGrp="1"/>
+          </p:cNvSpPr>
+          <p:nvPr>
+            <p:ph type="title"/>
+          </p:nvPr>
+        </p:nvSpPr>
+        <p:spPr/>
+        <p:txBody>
+          <a:bodyPr/>
+          <a:lstStyle/>
+          <a:p>
+            <a:r>
+              <a:rPr lang="ru-RU" dirty="0" smtClean="0"/>
+              <a:t>Итераторы</a:t>
+            </a:r>
+            <a:endParaRPr lang="en-US" dirty="0"/>
+          </a:p>
+        </p:txBody>
+      </p:sp>
+      <p:sp>
+        <p:nvSpPr>
+          <p:cNvPr id="3" name="Content Placeholder 2"/>
+          <p:cNvSpPr>
+            <a:spLocks noGrp="1"/>
+          </p:cNvSpPr>
+          <p:nvPr>
+            <p:ph idx="1"/>
+          </p:nvPr>
+        </p:nvSpPr>
+        <p:spPr/>
+        <p:txBody>
+          <a:bodyPr/>
+          <a:lstStyle/>
+          <a:p>
+            <a:r>
+              <a:rPr lang="en-US" dirty="0" smtClean="0"/>
+              <a:t>Out</a:t>
+            </a:r>
+          </a:p>
+          <a:p>
+            <a:r>
+              <a:rPr lang="en-US" dirty="0" smtClean="0"/>
+              <a:t>In</a:t>
+            </a:r>
+          </a:p>
+          <a:p>
+            <a:r>
+              <a:rPr lang="en-US" dirty="0" smtClean="0"/>
+              <a:t>For</a:t>
+            </a:r>
+          </a:p>
+          <a:p>
+            <a:r>
+              <a:rPr lang="en-US" dirty="0" smtClean="0"/>
+              <a:t>Bi</a:t>
+            </a:r>
+          </a:p>
+          <a:p>
+            <a:r>
+              <a:rPr lang="en-US" dirty="0" smtClean="0"/>
+              <a:t>Ran</a:t>
+            </a:r>
+          </a:p>
+          <a:p>
+            <a:r>
+              <a:rPr lang="en-US" dirty="0" smtClean="0">
+                <a:hlinkClick r:id="rId2"/>
+              </a:rPr>
+              <a:t>http://www.cplusplus.com/reference/iterator</a:t>
+            </a:r>
+            <a:r>
+              <a:rPr lang="en-US" dirty="0" smtClean="0">
+                <a:hlinkClick r:id="rId2"/>
+              </a:rPr>
+              <a:t>/</a:t>
+            </a:r>
+            <a:endParaRPr lang="en-US" dirty="0" smtClean="0"/>
+          </a:p>
+          <a:p>
+            <a:pPr>
+              <a:buNone/>
+            </a:pPr>
+            <a:endParaRPr lang="en-US" dirty="0"/>
+          </a:p>
+        </p:txBody>
+      </p:sp>
+    </p:spTree>
+  </p:cSld>
+  <p:clrMapOvr>
+    <a:masterClrMapping/>
+  </p:clrMapOvr>
+</p:sld>
+</file>
+
+<file path=ppt/slides/slide29.xml><?xml version="1.0" encoding="utf-8"?>
+<p:sld xmlns:a="http://schemas.openxmlformats.org/drawingml/2006/main" xmlns:r="http://schemas.openxmlformats.org/officeDocument/2006/relationships" xmlns:p="http://schemas.openxmlformats.org/presentationml/2006/main">
+  <p:cSld>
+    <p:spTree>
+      <p:nvGrpSpPr>
+        <p:cNvPr id="1" name=""/>
+        <p:cNvGrpSpPr/>
+        <p:nvPr/>
+      </p:nvGrpSpPr>
+      <p:grpSpPr>
+        <a:xfrm>
+          <a:off x="0" y="0"/>
+          <a:ext cx="0" cy="0"/>
+          <a:chOff x="0" y="0"/>
+          <a:chExt cx="0" cy="0"/>
+        </a:xfrm>
+      </p:grpSpPr>
+      <p:sp>
+        <p:nvSpPr>
+          <p:cNvPr id="2" name="Title 1"/>
+          <p:cNvSpPr>
+            <a:spLocks noGrp="1"/>
+          </p:cNvSpPr>
+          <p:nvPr>
+            <p:ph type="title"/>
+          </p:nvPr>
+        </p:nvSpPr>
+        <p:spPr/>
+        <p:txBody>
+          <a:bodyPr/>
+          <a:lstStyle/>
+          <a:p>
+            <a:r>
+              <a:rPr lang="en-US" dirty="0" smtClean="0"/>
+              <a:t>Q?</a:t>
+            </a:r>
+            <a:endParaRPr lang="en-US" dirty="0"/>
+          </a:p>
+        </p:txBody>
+      </p:sp>
+      <p:sp>
+        <p:nvSpPr>
+          <p:cNvPr id="3" name="Content Placeholder 2"/>
+          <p:cNvSpPr>
+            <a:spLocks noGrp="1"/>
+          </p:cNvSpPr>
+          <p:nvPr>
+            <p:ph idx="1"/>
+          </p:nvPr>
+        </p:nvSpPr>
+        <p:spPr/>
+        <p:txBody>
+          <a:bodyPr/>
+          <a:lstStyle/>
+          <a:p>
+            <a:endParaRPr lang="en-US"/>
+          </a:p>
+        </p:txBody>
+      </p:sp>
+    </p:spTree>
+  </p:cSld>
+  <p:clrMapOvr>
+    <a:masterClrMapping/>
+  </p:clrMapOvr>
+</p:sld>
+</file>
+
 <file path=ppt/slides/slide3.xml><?xml version="1.0" encoding="utf-8"?>
 <p:sld xmlns:a="http://schemas.openxmlformats.org/drawingml/2006/main" xmlns:r="http://schemas.openxmlformats.org/officeDocument/2006/relationships" xmlns:p="http://schemas.openxmlformats.org/presentationml/2006/main">
   <p:cSld>
@@ -3901,11 +7701,7 @@
             </a:pPr>
             <a:r>
               <a:rPr lang="en-US" dirty="0" smtClean="0"/>
-              <a:t> </a:t>
-            </a:r>
-            <a:r>
-              <a:rPr lang="en-US" dirty="0" smtClean="0"/>
-              <a:t>   ~A(){}</a:t>
+              <a:t>    ~A(){}</a:t>
             </a:r>
           </a:p>
           <a:p>
@@ -4245,14 +8041,19 @@
                 <a:latin typeface="Consolas" pitchFamily="49" charset="0"/>
                 <a:cs typeface="Consolas" pitchFamily="49" charset="0"/>
               </a:rPr>
-              <a:t> </a:t>
-            </a:r>
+              <a:t>     {</a:t>
+            </a:r>
+          </a:p>
+          <a:p>
+            <a:pPr>
+              <a:buNone/>
+            </a:pPr>
             <a:r>
               <a:rPr lang="en-US" dirty="0" smtClean="0">
                 <a:latin typeface="Consolas" pitchFamily="49" charset="0"/>
                 <a:cs typeface="Consolas" pitchFamily="49" charset="0"/>
               </a:rPr>
-              <a:t>    {</a:t>
+              <a:t>          // actions</a:t>
             </a:r>
           </a:p>
           <a:p>
@@ -4264,52 +8065,19 @@
                 <a:latin typeface="Consolas" pitchFamily="49" charset="0"/>
                 <a:cs typeface="Consolas" pitchFamily="49" charset="0"/>
               </a:rPr>
-              <a:t> </a:t>
-            </a:r>
+              <a:t>          return *this;</a:t>
+            </a:r>
+          </a:p>
+          <a:p>
+            <a:pPr>
+              <a:buNone/>
+            </a:pPr>
             <a:r>
               <a:rPr lang="en-US" dirty="0" smtClean="0">
                 <a:latin typeface="Consolas" pitchFamily="49" charset="0"/>
                 <a:cs typeface="Consolas" pitchFamily="49" charset="0"/>
               </a:rPr>
-              <a:t>         // actions</a:t>
-            </a:r>
-          </a:p>
-          <a:p>
-            <a:pPr>
-              <a:buNone/>
-            </a:pPr>
-            <a:r>
-              <a:rPr lang="en-US" dirty="0" smtClean="0">
-                <a:latin typeface="Consolas" pitchFamily="49" charset="0"/>
-                <a:cs typeface="Consolas" pitchFamily="49" charset="0"/>
-              </a:rPr>
-              <a:t> </a:t>
-            </a:r>
-            <a:r>
-              <a:rPr lang="en-US" dirty="0" smtClean="0">
-                <a:latin typeface="Consolas" pitchFamily="49" charset="0"/>
-                <a:cs typeface="Consolas" pitchFamily="49" charset="0"/>
-              </a:rPr>
-              <a:t>         return *this;</a:t>
-            </a:r>
-          </a:p>
-          <a:p>
-            <a:pPr>
-              <a:buNone/>
-            </a:pPr>
-            <a:r>
-              <a:rPr lang="en-US" dirty="0" smtClean="0">
-                <a:latin typeface="Consolas" pitchFamily="49" charset="0"/>
-                <a:cs typeface="Consolas" pitchFamily="49" charset="0"/>
-              </a:rPr>
-              <a:t> </a:t>
-            </a:r>
-            <a:r>
-              <a:rPr lang="en-US" dirty="0" smtClean="0">
-                <a:latin typeface="Consolas" pitchFamily="49" charset="0"/>
-                <a:cs typeface="Consolas" pitchFamily="49" charset="0"/>
-              </a:rPr>
-              <a:t>    }</a:t>
+              <a:t>     }</a:t>
             </a:r>
           </a:p>
           <a:p>
@@ -4617,14 +8385,7 @@
                 <a:latin typeface="Consolas" pitchFamily="49" charset="0"/>
                 <a:cs typeface="Consolas" pitchFamily="49" charset="0"/>
               </a:rPr>
-              <a:t> </a:t>
-            </a:r>
-            <a:r>
-              <a:rPr lang="en-US" sz="2600" dirty="0" smtClean="0">
-                <a:latin typeface="Consolas" pitchFamily="49" charset="0"/>
-                <a:cs typeface="Consolas" pitchFamily="49" charset="0"/>
-              </a:rPr>
-              <a:t>  3.obj, 4.obj -&gt; </a:t>
+              <a:t>   3.obj, 4.obj -&gt; </a:t>
             </a:r>
             <a:r>
               <a:rPr lang="en-US" sz="2600" dirty="0" err="1" smtClean="0">
@@ -4705,15 +8466,7 @@
                 <a:cs typeface="Consolas" pitchFamily="49" charset="0"/>
                 <a:hlinkClick r:id="rId2"/>
               </a:rPr>
-              <a:t>http://habrahabr.ru/post/155201</a:t>
-            </a:r>
-            <a:r>
-              <a:rPr lang="en-US" sz="2600" dirty="0" smtClean="0">
-                <a:latin typeface="Consolas" pitchFamily="49" charset="0"/>
-                <a:cs typeface="Consolas" pitchFamily="49" charset="0"/>
-                <a:hlinkClick r:id="rId2"/>
-              </a:rPr>
-              <a:t>/</a:t>
+              <a:t>http://habrahabr.ru/post/155201/</a:t>
             </a:r>
             <a:endParaRPr lang="en-US" sz="2600" dirty="0" smtClean="0">
               <a:latin typeface="Consolas" pitchFamily="49" charset="0"/>

</xml_diff>

<commit_message>
adding lection 2 fixes, adding solution example
</commit_message>
<xml_diff>
--- a/lections/cpp_craft_lec_2_pre.pptx
+++ b/lections/cpp_craft_lec_2_pre.pptx
@@ -27,13 +27,14 @@
     <p:sldId id="275" r:id="rId21"/>
     <p:sldId id="276" r:id="rId22"/>
     <p:sldId id="277" r:id="rId23"/>
-    <p:sldId id="278" r:id="rId24"/>
-    <p:sldId id="279" r:id="rId25"/>
-    <p:sldId id="280" r:id="rId26"/>
-    <p:sldId id="281" r:id="rId27"/>
-    <p:sldId id="282" r:id="rId28"/>
-    <p:sldId id="283" r:id="rId29"/>
-    <p:sldId id="284" r:id="rId30"/>
+    <p:sldId id="286" r:id="rId24"/>
+    <p:sldId id="278" r:id="rId25"/>
+    <p:sldId id="279" r:id="rId26"/>
+    <p:sldId id="280" r:id="rId27"/>
+    <p:sldId id="281" r:id="rId28"/>
+    <p:sldId id="282" r:id="rId29"/>
+    <p:sldId id="283" r:id="rId30"/>
+    <p:sldId id="285" r:id="rId31"/>
   </p:sldIdLst>
   <p:sldSz cx="9144000" cy="6858000" type="screen4x3"/>
   <p:notesSz cx="6858000" cy="9144000"/>
@@ -317,7 +318,7 @@
             <a:fld id="{8281312E-8B3E-4748-9BAE-A66E5A6CC2C8}" type="datetimeFigureOut">
               <a:rPr lang="en-US" smtClean="0"/>
               <a:pPr/>
-              <a:t>10/10/2013</a:t>
+              <a:t>10/14/2013</a:t>
             </a:fld>
             <a:endParaRPr lang="en-US"/>
           </a:p>
@@ -484,7 +485,7 @@
             <a:fld id="{8281312E-8B3E-4748-9BAE-A66E5A6CC2C8}" type="datetimeFigureOut">
               <a:rPr lang="en-US" smtClean="0"/>
               <a:pPr/>
-              <a:t>10/10/2013</a:t>
+              <a:t>10/14/2013</a:t>
             </a:fld>
             <a:endParaRPr lang="en-US"/>
           </a:p>
@@ -661,7 +662,7 @@
             <a:fld id="{8281312E-8B3E-4748-9BAE-A66E5A6CC2C8}" type="datetimeFigureOut">
               <a:rPr lang="en-US" smtClean="0"/>
               <a:pPr/>
-              <a:t>10/10/2013</a:t>
+              <a:t>10/14/2013</a:t>
             </a:fld>
             <a:endParaRPr lang="en-US"/>
           </a:p>
@@ -828,7 +829,7 @@
             <a:fld id="{8281312E-8B3E-4748-9BAE-A66E5A6CC2C8}" type="datetimeFigureOut">
               <a:rPr lang="en-US" smtClean="0"/>
               <a:pPr/>
-              <a:t>10/10/2013</a:t>
+              <a:t>10/14/2013</a:t>
             </a:fld>
             <a:endParaRPr lang="en-US"/>
           </a:p>
@@ -1071,7 +1072,7 @@
             <a:fld id="{8281312E-8B3E-4748-9BAE-A66E5A6CC2C8}" type="datetimeFigureOut">
               <a:rPr lang="en-US" smtClean="0"/>
               <a:pPr/>
-              <a:t>10/10/2013</a:t>
+              <a:t>10/14/2013</a:t>
             </a:fld>
             <a:endParaRPr lang="en-US"/>
           </a:p>
@@ -1356,7 +1357,7 @@
             <a:fld id="{8281312E-8B3E-4748-9BAE-A66E5A6CC2C8}" type="datetimeFigureOut">
               <a:rPr lang="en-US" smtClean="0"/>
               <a:pPr/>
-              <a:t>10/10/2013</a:t>
+              <a:t>10/14/2013</a:t>
             </a:fld>
             <a:endParaRPr lang="en-US"/>
           </a:p>
@@ -1775,7 +1776,7 @@
             <a:fld id="{8281312E-8B3E-4748-9BAE-A66E5A6CC2C8}" type="datetimeFigureOut">
               <a:rPr lang="en-US" smtClean="0"/>
               <a:pPr/>
-              <a:t>10/10/2013</a:t>
+              <a:t>10/14/2013</a:t>
             </a:fld>
             <a:endParaRPr lang="en-US"/>
           </a:p>
@@ -1890,7 +1891,7 @@
             <a:fld id="{8281312E-8B3E-4748-9BAE-A66E5A6CC2C8}" type="datetimeFigureOut">
               <a:rPr lang="en-US" smtClean="0"/>
               <a:pPr/>
-              <a:t>10/10/2013</a:t>
+              <a:t>10/14/2013</a:t>
             </a:fld>
             <a:endParaRPr lang="en-US"/>
           </a:p>
@@ -1982,7 +1983,7 @@
             <a:fld id="{8281312E-8B3E-4748-9BAE-A66E5A6CC2C8}" type="datetimeFigureOut">
               <a:rPr lang="en-US" smtClean="0"/>
               <a:pPr/>
-              <a:t>10/10/2013</a:t>
+              <a:t>10/14/2013</a:t>
             </a:fld>
             <a:endParaRPr lang="en-US"/>
           </a:p>
@@ -2256,7 +2257,7 @@
             <a:fld id="{8281312E-8B3E-4748-9BAE-A66E5A6CC2C8}" type="datetimeFigureOut">
               <a:rPr lang="en-US" smtClean="0"/>
               <a:pPr/>
-              <a:t>10/10/2013</a:t>
+              <a:t>10/14/2013</a:t>
             </a:fld>
             <a:endParaRPr lang="en-US"/>
           </a:p>
@@ -2506,7 +2507,7 @@
             <a:fld id="{8281312E-8B3E-4748-9BAE-A66E5A6CC2C8}" type="datetimeFigureOut">
               <a:rPr lang="en-US" smtClean="0"/>
               <a:pPr/>
-              <a:t>10/10/2013</a:t>
+              <a:t>10/14/2013</a:t>
             </a:fld>
             <a:endParaRPr lang="en-US"/>
           </a:p>
@@ -2716,7 +2717,7 @@
             <a:fld id="{8281312E-8B3E-4748-9BAE-A66E5A6CC2C8}" type="datetimeFigureOut">
               <a:rPr lang="en-US" smtClean="0"/>
               <a:pPr/>
-              <a:t>10/10/2013</a:t>
+              <a:t>10/14/2013</a:t>
             </a:fld>
             <a:endParaRPr lang="en-US"/>
           </a:p>
@@ -3143,11 +3144,42 @@
           </a:p>
         </p:txBody>
       </p:sp>
+      <p:pic>
+        <p:nvPicPr>
+          <p:cNvPr id="4" name="Рисунок 3" descr="cpp_craft.jpg"/>
+          <p:cNvPicPr>
+            <a:picLocks noChangeAspect="1"/>
+          </p:cNvPicPr>
+          <p:nvPr/>
+        </p:nvPicPr>
+        <p:blipFill>
+          <a:blip r:embed="rId2" cstate="print"/>
+          <a:stretch>
+            <a:fillRect/>
+          </a:stretch>
+        </p:blipFill>
+        <p:spPr>
+          <a:xfrm>
+            <a:off x="0" y="685800"/>
+            <a:ext cx="9144000" cy="1371600"/>
+          </a:xfrm>
+          <a:prstGeom prst="rect">
+            <a:avLst/>
+          </a:prstGeom>
+        </p:spPr>
+      </p:pic>
     </p:spTree>
   </p:cSld>
   <p:clrMapOvr>
     <a:masterClrMapping/>
   </p:clrMapOvr>
+  <p:timing>
+    <p:tnLst>
+      <p:par>
+        <p:cTn id="1" dur="indefinite" restart="never" nodeType="tmRoot"/>
+      </p:par>
+    </p:tnLst>
+  </p:timing>
 </p:sld>
 </file>
 
@@ -3229,291 +3261,193 @@
           </a:p>
         </p:txBody>
       </p:sp>
-      <p:graphicFrame>
-        <p:nvGraphicFramePr>
-          <p:cNvPr id="4" name="Table 3"/>
-          <p:cNvGraphicFramePr>
-            <a:graphicFrameLocks noGrp="1"/>
-          </p:cNvGraphicFramePr>
+      <p:sp>
+        <p:nvSpPr>
+          <p:cNvPr id="6" name="Скругленный прямоугольник 5"/>
+          <p:cNvSpPr/>
           <p:nvPr/>
-        </p:nvGraphicFramePr>
-        <p:xfrm>
-          <a:off x="609600" y="1600200"/>
-          <a:ext cx="8229600" cy="4206240"/>
-        </p:xfrm>
-        <a:graphic>
-          <a:graphicData uri="http://schemas.openxmlformats.org/drawingml/2006/table">
-            <a:tbl>
-              <a:tblPr firstRow="1" bandRow="1">
-                <a:tableStyleId>{5C22544A-7EE6-4342-B048-85BDC9FD1C3A}</a:tableStyleId>
-              </a:tblPr>
-              <a:tblGrid>
-                <a:gridCol w="8229600"/>
-              </a:tblGrid>
-              <a:tr h="3200400">
-                <a:tc>
-                  <a:txBody>
-                    <a:bodyPr/>
-                    <a:lstStyle/>
-                    <a:p>
-                      <a:r>
-                        <a:rPr lang="en-US" sz="1800" b="0" kern="1200" dirty="0" smtClean="0">
-                          <a:solidFill>
-                            <a:schemeClr val="lt1"/>
-                          </a:solidFill>
-                          <a:latin typeface="+mn-lt"/>
-                          <a:ea typeface="+mn-ea"/>
-                          <a:cs typeface="+mn-cs"/>
-                        </a:rPr>
-                        <a:t>A::A()</a:t>
-                      </a:r>
-                    </a:p>
-                    <a:p>
-                      <a:r>
-                        <a:rPr lang="en-US" sz="1800" b="0" kern="1200" dirty="0" smtClean="0">
-                          <a:solidFill>
-                            <a:schemeClr val="lt1"/>
-                          </a:solidFill>
-                          <a:latin typeface="+mn-lt"/>
-                          <a:ea typeface="+mn-ea"/>
-                          <a:cs typeface="+mn-cs"/>
-                        </a:rPr>
-                        <a:t>{</a:t>
-                      </a:r>
-                    </a:p>
-                    <a:p>
-                      <a:r>
-                        <a:rPr lang="en-US" sz="1800" b="0" kern="1200" dirty="0" smtClean="0">
-                          <a:solidFill>
-                            <a:schemeClr val="lt1"/>
-                          </a:solidFill>
-                          <a:latin typeface="+mn-lt"/>
-                          <a:ea typeface="+mn-ea"/>
-                          <a:cs typeface="+mn-cs"/>
-                        </a:rPr>
-                        <a:t>}</a:t>
-                      </a:r>
-                    </a:p>
-                    <a:p>
-                      <a:endParaRPr lang="en-US" sz="1800" b="0" kern="1200" dirty="0" smtClean="0">
-                        <a:solidFill>
-                          <a:schemeClr val="lt1"/>
-                        </a:solidFill>
-                        <a:latin typeface="+mn-lt"/>
-                        <a:ea typeface="+mn-ea"/>
-                        <a:cs typeface="+mn-cs"/>
-                      </a:endParaRPr>
-                    </a:p>
-                    <a:p>
-                      <a:r>
-                        <a:rPr lang="en-US" sz="1800" b="0" kern="1200" dirty="0" smtClean="0">
-                          <a:solidFill>
-                            <a:schemeClr val="lt1"/>
-                          </a:solidFill>
-                          <a:latin typeface="+mn-lt"/>
-                          <a:ea typeface="+mn-ea"/>
-                          <a:cs typeface="+mn-cs"/>
-                        </a:rPr>
-                        <a:t>A::A()</a:t>
-                      </a:r>
-                    </a:p>
-                    <a:p>
-                      <a:r>
-                        <a:rPr lang="en-US" sz="1800" b="0" kern="1200" dirty="0" smtClean="0">
-                          <a:solidFill>
-                            <a:schemeClr val="lt1"/>
-                          </a:solidFill>
-                          <a:latin typeface="+mn-lt"/>
-                          <a:ea typeface="+mn-ea"/>
-                          <a:cs typeface="+mn-cs"/>
-                        </a:rPr>
-                        <a:t>{</a:t>
-                      </a:r>
-                    </a:p>
-                    <a:p>
-                      <a:r>
-                        <a:rPr lang="en-US" sz="1800" b="0" kern="1200" dirty="0" smtClean="0">
-                          <a:solidFill>
-                            <a:schemeClr val="lt1"/>
-                          </a:solidFill>
-                          <a:latin typeface="+mn-lt"/>
-                          <a:ea typeface="+mn-ea"/>
-                          <a:cs typeface="+mn-cs"/>
-                        </a:rPr>
-                        <a:t>}</a:t>
-                      </a:r>
-                      <a:endParaRPr lang="ru-RU" sz="1800" b="0" kern="1200" dirty="0" smtClean="0">
-                        <a:solidFill>
-                          <a:schemeClr val="lt1"/>
-                        </a:solidFill>
-                        <a:latin typeface="+mn-lt"/>
-                        <a:ea typeface="+mn-ea"/>
-                        <a:cs typeface="+mn-cs"/>
-                      </a:endParaRPr>
-                    </a:p>
-                    <a:p>
-                      <a:endParaRPr lang="ru-RU" sz="1800" b="0" kern="1200" dirty="0" smtClean="0">
-                        <a:solidFill>
-                          <a:schemeClr val="lt1"/>
-                        </a:solidFill>
-                        <a:latin typeface="+mn-lt"/>
-                        <a:ea typeface="+mn-ea"/>
-                        <a:cs typeface="+mn-cs"/>
-                      </a:endParaRPr>
-                    </a:p>
-                    <a:p>
-                      <a:r>
-                        <a:rPr lang="en-US" sz="1800" b="0" kern="1200" dirty="0" smtClean="0">
-                          <a:solidFill>
-                            <a:schemeClr val="lt1"/>
-                          </a:solidFill>
-                          <a:latin typeface="+mn-lt"/>
-                          <a:ea typeface="+mn-ea"/>
-                          <a:cs typeface="+mn-cs"/>
-                        </a:rPr>
-                        <a:t>//</a:t>
-                      </a:r>
-                      <a:r>
-                        <a:rPr lang="en-US" sz="1800" b="0" kern="1200" baseline="0" dirty="0" smtClean="0">
-                          <a:solidFill>
-                            <a:schemeClr val="lt1"/>
-                          </a:solidFill>
-                          <a:latin typeface="+mn-lt"/>
-                          <a:ea typeface="+mn-ea"/>
-                          <a:cs typeface="+mn-cs"/>
-                        </a:rPr>
-                        <a:t> </a:t>
-                      </a:r>
-                      <a:r>
-                        <a:rPr lang="ru-RU" sz="1800" b="0" kern="1200" baseline="0" dirty="0" smtClean="0">
-                          <a:solidFill>
-                            <a:schemeClr val="lt1"/>
-                          </a:solidFill>
-                          <a:latin typeface="+mn-lt"/>
-                          <a:ea typeface="+mn-ea"/>
-                          <a:cs typeface="+mn-cs"/>
-                        </a:rPr>
-                        <a:t>в одном файле</a:t>
-                      </a:r>
-                      <a:endParaRPr lang="ru-RU" sz="1800" b="0" kern="1200" dirty="0" smtClean="0">
-                        <a:solidFill>
-                          <a:schemeClr val="lt1"/>
-                        </a:solidFill>
-                        <a:latin typeface="+mn-lt"/>
-                        <a:ea typeface="+mn-ea"/>
-                        <a:cs typeface="+mn-cs"/>
-                      </a:endParaRPr>
-                    </a:p>
-                    <a:p>
-                      <a:r>
-                        <a:rPr lang="en-US" sz="1800" b="0" kern="1200" dirty="0" smtClean="0">
-                          <a:solidFill>
-                            <a:schemeClr val="lt1"/>
-                          </a:solidFill>
-                          <a:latin typeface="+mn-lt"/>
-                          <a:ea typeface="+mn-ea"/>
-                          <a:cs typeface="+mn-cs"/>
-                        </a:rPr>
-                        <a:t>function 'A::A(void)' already has a body</a:t>
-                      </a:r>
-                      <a:endParaRPr lang="ru-RU" sz="1800" b="0" kern="1200" dirty="0" smtClean="0">
-                        <a:solidFill>
-                          <a:schemeClr val="lt1"/>
-                        </a:solidFill>
-                        <a:latin typeface="+mn-lt"/>
-                        <a:ea typeface="+mn-ea"/>
-                        <a:cs typeface="+mn-cs"/>
-                      </a:endParaRPr>
-                    </a:p>
-                    <a:p>
-                      <a:endParaRPr lang="ru-RU" sz="1800" b="0" kern="1200" dirty="0" smtClean="0">
-                        <a:solidFill>
-                          <a:schemeClr val="lt1"/>
-                        </a:solidFill>
-                        <a:latin typeface="+mn-lt"/>
-                        <a:ea typeface="+mn-ea"/>
-                        <a:cs typeface="+mn-cs"/>
-                      </a:endParaRPr>
-                    </a:p>
-                    <a:p>
-                      <a:r>
-                        <a:rPr lang="en-US" sz="1800" b="0" kern="1200" dirty="0" smtClean="0">
-                          <a:solidFill>
-                            <a:schemeClr val="lt1"/>
-                          </a:solidFill>
-                          <a:latin typeface="+mn-lt"/>
-                          <a:ea typeface="+mn-ea"/>
-                          <a:cs typeface="+mn-cs"/>
-                        </a:rPr>
-                        <a:t>// </a:t>
-                      </a:r>
-                      <a:r>
-                        <a:rPr lang="ru-RU" sz="1800" b="0" kern="1200" dirty="0" smtClean="0">
-                          <a:solidFill>
-                            <a:schemeClr val="lt1"/>
-                          </a:solidFill>
-                          <a:latin typeface="+mn-lt"/>
-                          <a:ea typeface="+mn-ea"/>
-                          <a:cs typeface="+mn-cs"/>
-                        </a:rPr>
-                        <a:t>в разных файлах</a:t>
-                      </a:r>
-                    </a:p>
-                    <a:p>
-                      <a:pPr marL="0" marR="0" indent="0" algn="l" defTabSz="914400" rtl="0" eaLnBrk="1" fontAlgn="auto" latinLnBrk="0" hangingPunct="1">
-                        <a:lnSpc>
-                          <a:spcPct val="100000"/>
-                        </a:lnSpc>
-                        <a:spcBef>
-                          <a:spcPts val="0"/>
-                        </a:spcBef>
-                        <a:spcAft>
-                          <a:spcPts val="0"/>
-                        </a:spcAft>
-                        <a:buClrTx/>
-                        <a:buSzTx/>
-                        <a:buFontTx/>
-                        <a:buNone/>
-                        <a:tabLst/>
-                        <a:defRPr/>
-                      </a:pPr>
-                      <a:r>
-                        <a:rPr lang="en-US" b="0" dirty="0" smtClean="0">
-                          <a:latin typeface="Consolas" pitchFamily="49" charset="0"/>
-                          <a:cs typeface="Consolas" pitchFamily="49" charset="0"/>
-                        </a:rPr>
-                        <a:t>"public: __</a:t>
-                      </a:r>
-                      <a:r>
-                        <a:rPr lang="en-US" b="0" dirty="0" err="1" smtClean="0">
-                          <a:latin typeface="Consolas" pitchFamily="49" charset="0"/>
-                          <a:cs typeface="Consolas" pitchFamily="49" charset="0"/>
-                        </a:rPr>
-                        <a:t>thiscall</a:t>
-                      </a:r>
-                      <a:r>
-                        <a:rPr lang="en-US" b="0" dirty="0" smtClean="0">
-                          <a:latin typeface="Consolas" pitchFamily="49" charset="0"/>
-                          <a:cs typeface="Consolas" pitchFamily="49" charset="0"/>
-                        </a:rPr>
-                        <a:t> A::A(void)" (??0A@@QAE@XZ) already defined in file_name.obj</a:t>
-                      </a:r>
-                      <a:endParaRPr lang="ru-RU" b="0" dirty="0" smtClean="0">
-                        <a:latin typeface="Consolas" pitchFamily="49" charset="0"/>
-                        <a:cs typeface="Consolas" pitchFamily="49" charset="0"/>
-                      </a:endParaRPr>
-                    </a:p>
-                    <a:p>
-                      <a:endParaRPr lang="en-US" b="0" dirty="0"/>
-                    </a:p>
-                  </a:txBody>
-                  <a:tcPr/>
-                </a:tc>
-              </a:tr>
-            </a:tbl>
-          </a:graphicData>
-        </a:graphic>
-      </p:graphicFrame>
+        </p:nvSpPr>
+        <p:spPr>
+          <a:xfrm>
+            <a:off x="304800" y="1447800"/>
+            <a:ext cx="8686800" cy="4419600"/>
+          </a:xfrm>
+          <a:prstGeom prst="roundRect">
+            <a:avLst/>
+          </a:prstGeom>
+        </p:spPr>
+        <p:style>
+          <a:lnRef idx="2">
+            <a:schemeClr val="accent1">
+              <a:shade val="50000"/>
+            </a:schemeClr>
+          </a:lnRef>
+          <a:fillRef idx="1">
+            <a:schemeClr val="accent1"/>
+          </a:fillRef>
+          <a:effectRef idx="0">
+            <a:schemeClr val="accent1"/>
+          </a:effectRef>
+          <a:fontRef idx="minor">
+            <a:schemeClr val="lt1"/>
+          </a:fontRef>
+        </p:style>
+        <p:txBody>
+          <a:bodyPr rtlCol="0" anchor="ctr"/>
+          <a:lstStyle/>
+          <a:p>
+            <a:r>
+              <a:rPr lang="en-US" dirty="0" smtClean="0">
+                <a:latin typeface="Consolas" pitchFamily="49" charset="0"/>
+                <a:cs typeface="Consolas" pitchFamily="49" charset="0"/>
+              </a:rPr>
+              <a:t>A::A()</a:t>
+            </a:r>
+          </a:p>
+          <a:p>
+            <a:r>
+              <a:rPr lang="en-US" dirty="0" smtClean="0">
+                <a:latin typeface="Consolas" pitchFamily="49" charset="0"/>
+                <a:cs typeface="Consolas" pitchFamily="49" charset="0"/>
+              </a:rPr>
+              <a:t>{</a:t>
+            </a:r>
+          </a:p>
+          <a:p>
+            <a:r>
+              <a:rPr lang="en-US" dirty="0" smtClean="0">
+                <a:latin typeface="Consolas" pitchFamily="49" charset="0"/>
+                <a:cs typeface="Consolas" pitchFamily="49" charset="0"/>
+              </a:rPr>
+              <a:t>}</a:t>
+            </a:r>
+          </a:p>
+          <a:p>
+            <a:endParaRPr lang="en-US" dirty="0" smtClean="0">
+              <a:latin typeface="Consolas" pitchFamily="49" charset="0"/>
+              <a:cs typeface="Consolas" pitchFamily="49" charset="0"/>
+            </a:endParaRPr>
+          </a:p>
+          <a:p>
+            <a:r>
+              <a:rPr lang="en-US" dirty="0" smtClean="0">
+                <a:latin typeface="Consolas" pitchFamily="49" charset="0"/>
+                <a:cs typeface="Consolas" pitchFamily="49" charset="0"/>
+              </a:rPr>
+              <a:t>A::A()</a:t>
+            </a:r>
+          </a:p>
+          <a:p>
+            <a:r>
+              <a:rPr lang="en-US" dirty="0" smtClean="0">
+                <a:latin typeface="Consolas" pitchFamily="49" charset="0"/>
+                <a:cs typeface="Consolas" pitchFamily="49" charset="0"/>
+              </a:rPr>
+              <a:t>{</a:t>
+            </a:r>
+          </a:p>
+          <a:p>
+            <a:r>
+              <a:rPr lang="en-US" dirty="0" smtClean="0">
+                <a:latin typeface="Consolas" pitchFamily="49" charset="0"/>
+                <a:cs typeface="Consolas" pitchFamily="49" charset="0"/>
+              </a:rPr>
+              <a:t>}</a:t>
+            </a:r>
+            <a:endParaRPr lang="ru-RU" dirty="0" smtClean="0">
+              <a:latin typeface="Consolas" pitchFamily="49" charset="0"/>
+              <a:cs typeface="Consolas" pitchFamily="49" charset="0"/>
+            </a:endParaRPr>
+          </a:p>
+          <a:p>
+            <a:endParaRPr lang="ru-RU" dirty="0" smtClean="0">
+              <a:latin typeface="Consolas" pitchFamily="49" charset="0"/>
+              <a:cs typeface="Consolas" pitchFamily="49" charset="0"/>
+            </a:endParaRPr>
+          </a:p>
+          <a:p>
+            <a:r>
+              <a:rPr lang="en-US" dirty="0" smtClean="0">
+                <a:latin typeface="Consolas" pitchFamily="49" charset="0"/>
+                <a:cs typeface="Consolas" pitchFamily="49" charset="0"/>
+              </a:rPr>
+              <a:t>// </a:t>
+            </a:r>
+            <a:r>
+              <a:rPr lang="ru-RU" dirty="0" smtClean="0">
+                <a:latin typeface="Consolas" pitchFamily="49" charset="0"/>
+                <a:cs typeface="Consolas" pitchFamily="49" charset="0"/>
+              </a:rPr>
+              <a:t>в одном файле</a:t>
+            </a:r>
+          </a:p>
+          <a:p>
+            <a:r>
+              <a:rPr lang="en-US" dirty="0" smtClean="0">
+                <a:latin typeface="Consolas" pitchFamily="49" charset="0"/>
+                <a:cs typeface="Consolas" pitchFamily="49" charset="0"/>
+              </a:rPr>
+              <a:t>function 'A::A(void)' already has a body</a:t>
+            </a:r>
+            <a:endParaRPr lang="ru-RU" dirty="0" smtClean="0">
+              <a:latin typeface="Consolas" pitchFamily="49" charset="0"/>
+              <a:cs typeface="Consolas" pitchFamily="49" charset="0"/>
+            </a:endParaRPr>
+          </a:p>
+          <a:p>
+            <a:endParaRPr lang="ru-RU" dirty="0" smtClean="0">
+              <a:latin typeface="Consolas" pitchFamily="49" charset="0"/>
+              <a:cs typeface="Consolas" pitchFamily="49" charset="0"/>
+            </a:endParaRPr>
+          </a:p>
+          <a:p>
+            <a:r>
+              <a:rPr lang="en-US" dirty="0" smtClean="0">
+                <a:latin typeface="Consolas" pitchFamily="49" charset="0"/>
+                <a:cs typeface="Consolas" pitchFamily="49" charset="0"/>
+              </a:rPr>
+              <a:t>// </a:t>
+            </a:r>
+            <a:r>
+              <a:rPr lang="ru-RU" dirty="0" smtClean="0">
+                <a:latin typeface="Consolas" pitchFamily="49" charset="0"/>
+                <a:cs typeface="Consolas" pitchFamily="49" charset="0"/>
+              </a:rPr>
+              <a:t>в разных файлах</a:t>
+            </a:r>
+          </a:p>
+          <a:p>
+            <a:pPr>
+              <a:defRPr/>
+            </a:pPr>
+            <a:r>
+              <a:rPr lang="en-US" dirty="0" smtClean="0">
+                <a:latin typeface="Consolas" pitchFamily="49" charset="0"/>
+                <a:cs typeface="Consolas" pitchFamily="49" charset="0"/>
+              </a:rPr>
+              <a:t>"public: __</a:t>
+            </a:r>
+            <a:r>
+              <a:rPr lang="en-US" dirty="0" err="1" smtClean="0">
+                <a:latin typeface="Consolas" pitchFamily="49" charset="0"/>
+                <a:cs typeface="Consolas" pitchFamily="49" charset="0"/>
+              </a:rPr>
+              <a:t>thiscall</a:t>
+            </a:r>
+            <a:r>
+              <a:rPr lang="en-US" dirty="0" smtClean="0">
+                <a:latin typeface="Consolas" pitchFamily="49" charset="0"/>
+                <a:cs typeface="Consolas" pitchFamily="49" charset="0"/>
+              </a:rPr>
+              <a:t> A::A(void)" (??0A@@QAE@XZ) already defined in file_name.obj</a:t>
+            </a:r>
+            <a:endParaRPr lang="en-US" dirty="0">
+              <a:latin typeface="Consolas" pitchFamily="49" charset="0"/>
+              <a:cs typeface="Consolas" pitchFamily="49" charset="0"/>
+            </a:endParaRPr>
+          </a:p>
+        </p:txBody>
+      </p:sp>
     </p:spTree>
   </p:cSld>
   <p:clrMapOvr>
@@ -3717,11 +3651,7 @@
           <a:p>
             <a:r>
               <a:rPr lang="en-US" dirty="0" smtClean="0"/>
-              <a:t>a</a:t>
-            </a:r>
-            <a:r>
-              <a:rPr lang="en-US" dirty="0" smtClean="0"/>
-              <a:t>lgorithm</a:t>
+              <a:t>algorithm</a:t>
             </a:r>
           </a:p>
         </p:txBody>
@@ -3750,11 +3680,7 @@
           <a:p>
             <a:r>
               <a:rPr lang="en-US" sz="2800" dirty="0" err="1" smtClean="0"/>
-              <a:t>t</a:t>
-            </a:r>
-            <a:r>
-              <a:rPr lang="en-US" sz="2800" dirty="0" err="1" smtClean="0"/>
-              <a:t>cp</a:t>
+              <a:t>tcp</a:t>
             </a:r>
             <a:endParaRPr lang="en-US" sz="2800" dirty="0" smtClean="0"/>
           </a:p>
@@ -3854,11 +3780,79 @@
           </a:p>
         </p:txBody>
       </p:sp>
+      <p:sp>
+        <p:nvSpPr>
+          <p:cNvPr id="6" name="Прямоугольник 5"/>
+          <p:cNvSpPr/>
+          <p:nvPr/>
+        </p:nvSpPr>
+        <p:spPr>
+          <a:xfrm>
+            <a:off x="6477000" y="6260068"/>
+            <a:ext cx="2352119" cy="369332"/>
+          </a:xfrm>
+          <a:prstGeom prst="rect">
+            <a:avLst/>
+          </a:prstGeom>
+        </p:spPr>
+        <p:txBody>
+          <a:bodyPr wrap="none">
+            <a:spAutoFit/>
+          </a:bodyPr>
+          <a:lstStyle/>
+          <a:p>
+            <a:r>
+              <a:rPr lang="en-US" dirty="0" smtClean="0">
+                <a:hlinkClick r:id="rId2"/>
+              </a:rPr>
+              <a:t>http://www.boost.org/</a:t>
+            </a:r>
+            <a:endParaRPr lang="en-US" dirty="0"/>
+          </a:p>
+        </p:txBody>
+      </p:sp>
+      <p:cxnSp>
+        <p:nvCxnSpPr>
+          <p:cNvPr id="7" name="Прямая соединительная линия 6"/>
+          <p:cNvCxnSpPr/>
+          <p:nvPr/>
+        </p:nvCxnSpPr>
+        <p:spPr>
+          <a:xfrm>
+            <a:off x="3581400" y="6172200"/>
+            <a:ext cx="5181600" cy="0"/>
+          </a:xfrm>
+          <a:prstGeom prst="line">
+            <a:avLst/>
+          </a:prstGeom>
+        </p:spPr>
+        <p:style>
+          <a:lnRef idx="1">
+            <a:schemeClr val="accent1"/>
+          </a:lnRef>
+          <a:fillRef idx="0">
+            <a:schemeClr val="accent1"/>
+          </a:fillRef>
+          <a:effectRef idx="0">
+            <a:schemeClr val="accent1"/>
+          </a:effectRef>
+          <a:fontRef idx="minor">
+            <a:schemeClr val="tx1"/>
+          </a:fontRef>
+        </p:style>
+      </p:cxnSp>
     </p:spTree>
   </p:cSld>
   <p:clrMapOvr>
     <a:masterClrMapping/>
   </p:clrMapOvr>
+  <p:timing>
+    <p:tnLst>
+      <p:par>
+        <p:cTn id="1" dur="indefinite" restart="never" nodeType="tmRoot"/>
+      </p:par>
+    </p:tnLst>
+  </p:timing>
 </p:sld>
 </file>
 
@@ -3912,85 +3906,137 @@
             <p:ph idx="1"/>
           </p:nvPr>
         </p:nvSpPr>
-        <p:spPr/>
+        <p:spPr>
+          <a:xfrm>
+            <a:off x="457200" y="1600201"/>
+            <a:ext cx="8229600" cy="3048000"/>
+          </a:xfrm>
+        </p:spPr>
         <p:txBody>
           <a:bodyPr/>
           <a:lstStyle/>
           <a:p>
+            <a:r>
+              <a:rPr lang="en-US" dirty="0" smtClean="0"/>
+              <a:t>boost::</a:t>
+            </a:r>
+            <a:r>
+              <a:rPr lang="en-US" dirty="0" err="1" smtClean="0"/>
+              <a:t>shared_ptr</a:t>
+            </a:r>
+            <a:r>
+              <a:rPr lang="en-US" dirty="0" smtClean="0"/>
+              <a:t>&lt; T &gt;</a:t>
+            </a:r>
+          </a:p>
+          <a:p>
+            <a:r>
+              <a:rPr lang="en-US" dirty="0" smtClean="0"/>
+              <a:t>boost::</a:t>
+            </a:r>
+            <a:r>
+              <a:rPr lang="en-US" dirty="0" err="1" smtClean="0"/>
+              <a:t>scoped_ptr</a:t>
+            </a:r>
+            <a:r>
+              <a:rPr lang="en-US" dirty="0" smtClean="0"/>
+              <a:t>&lt; T &gt; </a:t>
+            </a:r>
+          </a:p>
+          <a:p>
+            <a:endParaRPr lang="en-US" dirty="0" smtClean="0"/>
+          </a:p>
+          <a:p>
+            <a:r>
+              <a:rPr lang="en-US" strike="sngStrike" dirty="0" smtClean="0"/>
+              <a:t>std::</a:t>
+            </a:r>
+            <a:r>
+              <a:rPr lang="en-US" strike="sngStrike" dirty="0" err="1" smtClean="0"/>
+              <a:t>auto_ptr</a:t>
+            </a:r>
+            <a:r>
+              <a:rPr lang="en-US" strike="sngStrike" dirty="0" smtClean="0"/>
+              <a:t>&lt; T &gt;</a:t>
+            </a:r>
+            <a:endParaRPr lang="en-US" strike="sngStrike" dirty="0"/>
+          </a:p>
+        </p:txBody>
+      </p:sp>
+      <p:sp>
+        <p:nvSpPr>
+          <p:cNvPr id="4" name="Прямоугольник 3"/>
+          <p:cNvSpPr/>
+          <p:nvPr/>
+        </p:nvSpPr>
+        <p:spPr>
+          <a:xfrm>
+            <a:off x="1981200" y="6248400"/>
+            <a:ext cx="6934200" cy="369332"/>
+          </a:xfrm>
+          <a:prstGeom prst="rect">
+            <a:avLst/>
+          </a:prstGeom>
+        </p:spPr>
+        <p:txBody>
+          <a:bodyPr wrap="square">
+            <a:spAutoFit/>
+          </a:bodyPr>
+          <a:lstStyle/>
+          <a:p>
+            <a:pPr algn="r"/>
             <a:r>
               <a:rPr lang="en-US" dirty="0" smtClean="0">
                 <a:hlinkClick r:id="rId2"/>
               </a:rPr>
-              <a:t>http://</a:t>
-            </a:r>
-            <a:r>
-              <a:rPr lang="en-US" dirty="0" smtClean="0">
-                <a:hlinkClick r:id="rId2"/>
-              </a:rPr>
-              <a:t>en.wikipedia.org/wiki/Resource_Acquisition_Is_Initialization</a:t>
+              <a:t>http://en.wikipedia.org/wiki/Resource_Acquisition_Is_Initialization</a:t>
             </a:r>
             <a:endParaRPr lang="en-US" dirty="0" smtClean="0"/>
           </a:p>
-          <a:p>
-            <a:endParaRPr lang="en-US" dirty="0" smtClean="0"/>
-          </a:p>
-          <a:p>
-            <a:r>
-              <a:rPr lang="en-US" dirty="0" smtClean="0"/>
-              <a:t>b</a:t>
-            </a:r>
-            <a:r>
-              <a:rPr lang="en-US" dirty="0" smtClean="0"/>
-              <a:t>oost::</a:t>
-            </a:r>
-            <a:r>
-              <a:rPr lang="en-US" dirty="0" err="1" smtClean="0"/>
-              <a:t>shared_ptr</a:t>
-            </a:r>
-            <a:r>
-              <a:rPr lang="en-US" dirty="0" smtClean="0"/>
-              <a:t>&lt; T &gt;</a:t>
-            </a:r>
-          </a:p>
-          <a:p>
-            <a:r>
-              <a:rPr lang="en-US" dirty="0" smtClean="0"/>
-              <a:t>boost::</a:t>
-            </a:r>
-            <a:r>
-              <a:rPr lang="en-US" dirty="0" err="1" smtClean="0"/>
-              <a:t>scoped_ptr</a:t>
-            </a:r>
-            <a:r>
-              <a:rPr lang="en-US" dirty="0" smtClean="0"/>
-              <a:t>&lt; T &gt; </a:t>
-            </a:r>
-          </a:p>
-          <a:p>
-            <a:endParaRPr lang="en-US" dirty="0" smtClean="0"/>
-          </a:p>
-          <a:p>
-            <a:r>
-              <a:rPr lang="en-US" strike="sngStrike" dirty="0" smtClean="0"/>
-              <a:t>std::</a:t>
-            </a:r>
-            <a:r>
-              <a:rPr lang="en-US" strike="sngStrike" dirty="0" err="1" smtClean="0"/>
-              <a:t>auto_ptr</a:t>
-            </a:r>
-            <a:r>
-              <a:rPr lang="en-US" strike="sngStrike" dirty="0" smtClean="0"/>
-              <a:t>&lt; T &gt;</a:t>
-            </a:r>
-            <a:endParaRPr lang="en-US" strike="sngStrike" dirty="0"/>
-          </a:p>
-        </p:txBody>
-      </p:sp>
+        </p:txBody>
+      </p:sp>
+      <p:cxnSp>
+        <p:nvCxnSpPr>
+          <p:cNvPr id="5" name="Прямая соединительная линия 4"/>
+          <p:cNvCxnSpPr/>
+          <p:nvPr/>
+        </p:nvCxnSpPr>
+        <p:spPr>
+          <a:xfrm>
+            <a:off x="3581400" y="6172200"/>
+            <a:ext cx="5181600" cy="0"/>
+          </a:xfrm>
+          <a:prstGeom prst="line">
+            <a:avLst/>
+          </a:prstGeom>
+        </p:spPr>
+        <p:style>
+          <a:lnRef idx="1">
+            <a:schemeClr val="accent1"/>
+          </a:lnRef>
+          <a:fillRef idx="0">
+            <a:schemeClr val="accent1"/>
+          </a:fillRef>
+          <a:effectRef idx="0">
+            <a:schemeClr val="accent1"/>
+          </a:effectRef>
+          <a:fontRef idx="minor">
+            <a:schemeClr val="tx1"/>
+          </a:fontRef>
+        </p:style>
+      </p:cxnSp>
     </p:spTree>
   </p:cSld>
   <p:clrMapOvr>
     <a:masterClrMapping/>
   </p:clrMapOvr>
+  <p:timing>
+    <p:tnLst>
+      <p:par>
+        <p:cTn id="1" dur="indefinite" restart="never" nodeType="tmRoot"/>
+      </p:par>
+    </p:tnLst>
+  </p:timing>
 </p:sld>
 </file>
 
@@ -4093,6 +4139,13 @@
   <p:clrMapOvr>
     <a:masterClrMapping/>
   </p:clrMapOvr>
+  <p:timing>
+    <p:tnLst>
+      <p:par>
+        <p:cTn id="1" dur="indefinite" restart="never" nodeType="tmRoot"/>
+      </p:par>
+    </p:tnLst>
+  </p:timing>
 </p:sld>
 </file>
 
@@ -4263,7 +4316,6 @@
               <a:rPr lang="en-US" dirty="0" smtClean="0"/>
               <a:t>(45);</a:t>
             </a:r>
-            <a:endParaRPr lang="en-US" dirty="0" smtClean="0"/>
           </a:p>
           <a:p>
             <a:endParaRPr lang="en-US" dirty="0" smtClean="0"/>
@@ -4277,7 +4329,6 @@
               <a:rPr lang="en-US" dirty="0" smtClean="0"/>
               <a:t>(67);</a:t>
             </a:r>
-            <a:endParaRPr lang="en-US" dirty="0" smtClean="0"/>
           </a:p>
           <a:p>
             <a:r>
@@ -4288,7 +4339,6 @@
               <a:rPr lang="en-US" dirty="0" smtClean="0"/>
               <a:t>(89);</a:t>
             </a:r>
-            <a:endParaRPr lang="en-US" dirty="0" smtClean="0"/>
           </a:p>
           <a:p>
             <a:endParaRPr lang="en-US" dirty="0" smtClean="0"/>
@@ -4302,7 +4352,6 @@
               <a:rPr lang="en-US" dirty="0" smtClean="0"/>
               <a:t>(11);</a:t>
             </a:r>
-            <a:endParaRPr lang="en-US" dirty="0" smtClean="0"/>
           </a:p>
           <a:p>
             <a:r>
@@ -4340,15 +4389,7 @@
             </a:r>
             <a:r>
               <a:rPr lang="en-US" dirty="0" smtClean="0"/>
-              <a:t>(), </a:t>
-            </a:r>
-            <a:r>
-              <a:rPr lang="en-US" dirty="0" smtClean="0"/>
-              <a:t>45 </a:t>
-            </a:r>
-            <a:r>
-              <a:rPr lang="en-US" dirty="0" smtClean="0"/>
-              <a:t>), </a:t>
+              <a:t>(), 45 ), </a:t>
             </a:r>
             <a:r>
               <a:rPr lang="en-US" dirty="0" err="1" smtClean="0"/>
@@ -5051,6 +5092,13 @@
   <p:clrMapOvr>
     <a:masterClrMapping/>
   </p:clrMapOvr>
+  <p:timing>
+    <p:tnLst>
+      <p:par>
+        <p:cTn id="1" dur="indefinite" restart="never" nodeType="tmRoot"/>
+      </p:par>
+    </p:tnLst>
+  </p:timing>
 </p:sld>
 </file>
 
@@ -5545,14 +5593,7 @@
                 <a:latin typeface="Consolas" pitchFamily="49" charset="0"/>
                 <a:cs typeface="Consolas" pitchFamily="49" charset="0"/>
               </a:rPr>
-              <a:t>std</a:t>
-            </a:r>
-            <a:r>
-              <a:rPr lang="en-US" dirty="0" smtClean="0">
-                <a:latin typeface="Consolas" pitchFamily="49" charset="0"/>
-                <a:cs typeface="Consolas" pitchFamily="49" charset="0"/>
-              </a:rPr>
-              <a:t>::list&lt; </a:t>
+              <a:t>std::list&lt; </a:t>
             </a:r>
             <a:r>
               <a:rPr lang="en-US" dirty="0" err="1" smtClean="0">
@@ -5681,6 +5722,13 @@
   <p:clrMapOvr>
     <a:masterClrMapping/>
   </p:clrMapOvr>
+  <p:timing>
+    <p:tnLst>
+      <p:par>
+        <p:cTn id="1" dur="indefinite" restart="never" nodeType="tmRoot"/>
+      </p:par>
+    </p:tnLst>
+  </p:timing>
 </p:sld>
 </file>
 
@@ -6096,11 +6144,7 @@
           <a:p>
             <a:r>
               <a:rPr lang="en-US" dirty="0" smtClean="0"/>
-              <a:t>std</a:t>
-            </a:r>
-            <a:r>
-              <a:rPr lang="en-US" dirty="0" smtClean="0"/>
-              <a:t>::list&lt; </a:t>
+              <a:t>std::list&lt; </a:t>
             </a:r>
             <a:r>
               <a:rPr lang="en-US" dirty="0" err="1" smtClean="0"/>
@@ -6171,6 +6215,13 @@
   <p:clrMapOvr>
     <a:masterClrMapping/>
   </p:clrMapOvr>
+  <p:timing>
+    <p:tnLst>
+      <p:par>
+        <p:cTn id="1" dur="indefinite" restart="never" nodeType="tmRoot"/>
+      </p:par>
+    </p:tnLst>
+  </p:timing>
 </p:sld>
 </file>
 
@@ -6246,6 +6297,13 @@
   <p:clrMapOvr>
     <a:masterClrMapping/>
   </p:clrMapOvr>
+  <p:timing>
+    <p:tnLst>
+      <p:par>
+        <p:cTn id="1" dur="indefinite" restart="never" nodeType="tmRoot"/>
+      </p:par>
+    </p:tnLst>
+  </p:timing>
 </p:sld>
 </file>
 
@@ -6330,13 +6388,7 @@
               <a:rPr lang="en-US" dirty="0" smtClean="0">
                 <a:hlinkClick r:id="rId2"/>
               </a:rPr>
-              <a:t>http://</a:t>
-            </a:r>
-            <a:r>
-              <a:rPr lang="en-US" dirty="0" smtClean="0">
-                <a:hlinkClick r:id="rId2"/>
-              </a:rPr>
-              <a:t>ru.cppreference.com/w/cpp/container/deque</a:t>
+              <a:t>http://ru.cppreference.com/w/cpp/container/deque</a:t>
             </a:r>
             <a:endParaRPr lang="en-US" dirty="0" smtClean="0"/>
           </a:p>
@@ -6345,13 +6397,7 @@
               <a:rPr lang="en-US" dirty="0" smtClean="0">
                 <a:hlinkClick r:id="rId3"/>
               </a:rPr>
-              <a:t>http://www.cplusplus.com/reference/deque/deque</a:t>
-            </a:r>
-            <a:r>
-              <a:rPr lang="en-US" dirty="0" smtClean="0">
-                <a:hlinkClick r:id="rId3"/>
-              </a:rPr>
-              <a:t>/</a:t>
+              <a:t>http://www.cplusplus.com/reference/deque/deque/</a:t>
             </a:r>
             <a:endParaRPr lang="en-US" dirty="0" smtClean="0"/>
           </a:p>
@@ -6365,6 +6411,13 @@
   <p:clrMapOvr>
     <a:masterClrMapping/>
   </p:clrMapOvr>
+  <p:timing>
+    <p:tnLst>
+      <p:par>
+        <p:cTn id="1" dur="indefinite" restart="never" nodeType="tmRoot"/>
+      </p:par>
+    </p:tnLst>
+  </p:timing>
 </p:sld>
 </file>
 
@@ -6480,11 +6533,85 @@
           </a:p>
         </p:txBody>
       </p:sp>
+      <p:sp>
+        <p:nvSpPr>
+          <p:cNvPr id="4" name="Прямоугольник 3"/>
+          <p:cNvSpPr/>
+          <p:nvPr/>
+        </p:nvSpPr>
+        <p:spPr>
+          <a:xfrm>
+            <a:off x="3733800" y="6096000"/>
+            <a:ext cx="5105400" cy="646331"/>
+          </a:xfrm>
+          <a:prstGeom prst="rect">
+            <a:avLst/>
+          </a:prstGeom>
+        </p:spPr>
+        <p:txBody>
+          <a:bodyPr wrap="square">
+            <a:spAutoFit/>
+          </a:bodyPr>
+          <a:lstStyle/>
+          <a:p>
+            <a:pPr algn="r"/>
+            <a:r>
+              <a:rPr lang="ru-RU" dirty="0" smtClean="0"/>
+              <a:t>Бьерн Страуструп «Язык программирования С++» </a:t>
+            </a:r>
+            <a:endParaRPr lang="en-US" dirty="0" smtClean="0"/>
+          </a:p>
+          <a:p>
+            <a:r>
+              <a:rPr lang="ru-RU" dirty="0" smtClean="0"/>
+              <a:t>			     - глава 10 «Классы»</a:t>
+            </a:r>
+            <a:endParaRPr lang="en-US" dirty="0" smtClean="0"/>
+          </a:p>
+        </p:txBody>
+      </p:sp>
+      <p:cxnSp>
+        <p:nvCxnSpPr>
+          <p:cNvPr id="5" name="Прямая соединительная линия 4"/>
+          <p:cNvCxnSpPr/>
+          <p:nvPr/>
+        </p:nvCxnSpPr>
+        <p:spPr>
+          <a:xfrm>
+            <a:off x="3581400" y="6019800"/>
+            <a:ext cx="5181600" cy="0"/>
+          </a:xfrm>
+          <a:prstGeom prst="line">
+            <a:avLst/>
+          </a:prstGeom>
+        </p:spPr>
+        <p:style>
+          <a:lnRef idx="1">
+            <a:schemeClr val="accent1"/>
+          </a:lnRef>
+          <a:fillRef idx="0">
+            <a:schemeClr val="accent1"/>
+          </a:fillRef>
+          <a:effectRef idx="0">
+            <a:schemeClr val="accent1"/>
+          </a:effectRef>
+          <a:fontRef idx="minor">
+            <a:schemeClr val="tx1"/>
+          </a:fontRef>
+        </p:style>
+      </p:cxnSp>
     </p:spTree>
   </p:cSld>
   <p:clrMapOvr>
     <a:masterClrMapping/>
   </p:clrMapOvr>
+  <p:timing>
+    <p:tnLst>
+      <p:par>
+        <p:cTn id="1" dur="indefinite" restart="never" nodeType="tmRoot"/>
+      </p:par>
+    </p:tnLst>
+  </p:timing>
 </p:sld>
 </file>
 
@@ -6598,7 +6725,6 @@
               <a:rPr lang="en-US" dirty="0" smtClean="0"/>
               <a:t>begin(), end(), find()</a:t>
             </a:r>
-            <a:endParaRPr lang="en-US" dirty="0" smtClean="0"/>
           </a:p>
           <a:p>
             <a:endParaRPr lang="en-US" dirty="0" smtClean="0"/>
@@ -6622,6 +6748,13 @@
   <p:clrMapOvr>
     <a:masterClrMapping/>
   </p:clrMapOvr>
+  <p:timing>
+    <p:tnLst>
+      <p:par>
+        <p:cTn id="1" dur="indefinite" restart="never" nodeType="tmRoot"/>
+      </p:par>
+    </p:tnLst>
+  </p:timing>
 </p:sld>
 </file>
 
@@ -6723,6 +6856,13 @@
   <p:clrMapOvr>
     <a:masterClrMapping/>
   </p:clrMapOvr>
+  <p:timing>
+    <p:tnLst>
+      <p:par>
+        <p:cTn id="1" dur="indefinite" restart="never" nodeType="tmRoot"/>
+      </p:par>
+    </p:tnLst>
+  </p:timing>
 </p:sld>
 </file>
 
@@ -6829,11 +6969,7 @@
             </a:r>
             <a:r>
               <a:rPr lang="en-US" dirty="0" smtClean="0"/>
-              <a:t>( </a:t>
-            </a:r>
-            <a:r>
-              <a:rPr lang="en-US" dirty="0" smtClean="0"/>
-              <a:t>const T&amp; v );</a:t>
+              <a:t>( const T&amp; v );</a:t>
             </a:r>
           </a:p>
           <a:p>
@@ -6846,6 +6982,13 @@
   <p:clrMapOvr>
     <a:masterClrMapping/>
   </p:clrMapOvr>
+  <p:timing>
+    <p:tnLst>
+      <p:par>
+        <p:cTn id="1" dur="indefinite" restart="never" nodeType="tmRoot"/>
+      </p:par>
+    </p:tnLst>
+  </p:timing>
 </p:sld>
 </file>
 
@@ -6868,7 +7011,7 @@
       </p:grpSpPr>
       <p:sp>
         <p:nvSpPr>
-          <p:cNvPr id="2" name="Title 1"/>
+          <p:cNvPr id="2" name="Заголовок 1"/>
           <p:cNvSpPr>
             <a:spLocks noGrp="1"/>
           </p:cNvSpPr>
@@ -6882,8 +7025,8 @@
           <a:lstStyle/>
           <a:p>
             <a:r>
-              <a:rPr lang="en-US" dirty="0" smtClean="0"/>
-              <a:t>Q?</a:t>
+              <a:rPr lang="ru-RU" dirty="0" smtClean="0"/>
+              <a:t>Логика</a:t>
             </a:r>
             <a:endParaRPr lang="en-US" dirty="0"/>
           </a:p>
@@ -6891,7 +7034,7 @@
       </p:sp>
       <p:sp>
         <p:nvSpPr>
-          <p:cNvPr id="3" name="Content Placeholder 2"/>
+          <p:cNvPr id="3" name="Содержимое 2"/>
           <p:cNvSpPr>
             <a:spLocks noGrp="1"/>
           </p:cNvSpPr>
@@ -6904,10 +7047,112 @@
           <a:bodyPr/>
           <a:lstStyle/>
           <a:p>
+            <a:r>
+              <a:rPr lang="ru-RU" dirty="0" smtClean="0"/>
+              <a:t>Использовать контейнеры и алгоритмы нужно с умом</a:t>
+            </a:r>
+            <a:r>
+              <a:rPr lang="en-US" dirty="0" smtClean="0"/>
+              <a:t>:</a:t>
+            </a:r>
+            <a:r>
+              <a:rPr lang="ru-RU" dirty="0" smtClean="0"/>
+              <a:t> у каждого из них свои особенности (сложность).</a:t>
+            </a:r>
             <a:endParaRPr lang="en-US" dirty="0"/>
           </a:p>
         </p:txBody>
       </p:sp>
+      <p:pic>
+        <p:nvPicPr>
+          <p:cNvPr id="4" name="Рисунок 3" descr="1.jpg"/>
+          <p:cNvPicPr>
+            <a:picLocks noChangeAspect="1"/>
+          </p:cNvPicPr>
+          <p:nvPr/>
+        </p:nvPicPr>
+        <p:blipFill>
+          <a:blip r:embed="rId2" cstate="print"/>
+          <a:stretch>
+            <a:fillRect/>
+          </a:stretch>
+        </p:blipFill>
+        <p:spPr>
+          <a:xfrm>
+            <a:off x="5562600" y="2667000"/>
+            <a:ext cx="1295400" cy="1431417"/>
+          </a:xfrm>
+          <a:prstGeom prst="rect">
+            <a:avLst/>
+          </a:prstGeom>
+        </p:spPr>
+      </p:pic>
+      <p:sp>
+        <p:nvSpPr>
+          <p:cNvPr id="5" name="Прямоугольник 4"/>
+          <p:cNvSpPr/>
+          <p:nvPr/>
+        </p:nvSpPr>
+        <p:spPr>
+          <a:xfrm>
+            <a:off x="2590800" y="6107668"/>
+            <a:ext cx="6312818" cy="369332"/>
+          </a:xfrm>
+          <a:prstGeom prst="rect">
+            <a:avLst/>
+          </a:prstGeom>
+        </p:spPr>
+        <p:txBody>
+          <a:bodyPr wrap="none">
+            <a:spAutoFit/>
+          </a:bodyPr>
+          <a:lstStyle/>
+          <a:p>
+            <a:pPr fontAlgn="base"/>
+            <a:r>
+              <a:rPr lang="ru-RU" dirty="0" smtClean="0"/>
+              <a:t>Знай сложности алгоритмов! </a:t>
+            </a:r>
+            <a:r>
+              <a:rPr lang="en-US" dirty="0" smtClean="0">
+                <a:hlinkClick r:id="rId3"/>
+              </a:rPr>
+              <a:t>http://habrahabr.ru/post/188010/</a:t>
+            </a:r>
+            <a:endParaRPr lang="en-US" dirty="0" smtClean="0"/>
+          </a:p>
+        </p:txBody>
+      </p:sp>
+      <p:cxnSp>
+        <p:nvCxnSpPr>
+          <p:cNvPr id="7" name="Прямая соединительная линия 6"/>
+          <p:cNvCxnSpPr/>
+          <p:nvPr/>
+        </p:nvCxnSpPr>
+        <p:spPr>
+          <a:xfrm>
+            <a:off x="3581400" y="6019800"/>
+            <a:ext cx="5181600" cy="0"/>
+          </a:xfrm>
+          <a:prstGeom prst="line">
+            <a:avLst/>
+          </a:prstGeom>
+        </p:spPr>
+        <p:style>
+          <a:lnRef idx="1">
+            <a:schemeClr val="accent1"/>
+          </a:lnRef>
+          <a:fillRef idx="0">
+            <a:schemeClr val="accent1"/>
+          </a:fillRef>
+          <a:effectRef idx="0">
+            <a:schemeClr val="accent1"/>
+          </a:effectRef>
+          <a:fontRef idx="minor">
+            <a:schemeClr val="tx1"/>
+          </a:fontRef>
+        </p:style>
+      </p:cxnSp>
     </p:spTree>
   </p:cSld>
   <p:clrMapOvr>
@@ -6943,60 +7188,23 @@
             <p:ph type="title"/>
           </p:nvPr>
         </p:nvSpPr>
-        <p:spPr/>
-        <p:txBody>
-          <a:bodyPr/>
-          <a:lstStyle/>
-          <a:p>
-            <a:r>
-              <a:rPr lang="ru-RU" dirty="0" smtClean="0"/>
-              <a:t>Алгоритмы</a:t>
-            </a:r>
-            <a:endParaRPr lang="en-US" dirty="0"/>
-          </a:p>
-        </p:txBody>
-      </p:sp>
-      <p:sp>
-        <p:nvSpPr>
-          <p:cNvPr id="3" name="Content Placeholder 2"/>
-          <p:cNvSpPr>
-            <a:spLocks noGrp="1"/>
-          </p:cNvSpPr>
-          <p:nvPr>
-            <p:ph idx="1"/>
-          </p:nvPr>
-        </p:nvSpPr>
         <p:spPr>
           <a:xfrm>
-            <a:off x="457200" y="2590800"/>
-            <a:ext cx="8229600" cy="3535363"/>
+            <a:off x="609600" y="2286000"/>
+            <a:ext cx="8229600" cy="1143000"/>
           </a:xfrm>
         </p:spPr>
         <p:txBody>
-          <a:bodyPr/>
-          <a:lstStyle/>
-          <a:p>
-            <a:r>
-              <a:rPr lang="ru-RU" dirty="0" smtClean="0"/>
-              <a:t>Не изменяющие последовательность</a:t>
-            </a:r>
-          </a:p>
-          <a:p>
-            <a:r>
-              <a:rPr lang="ru-RU" dirty="0" smtClean="0"/>
-              <a:t>Изменяющие последовательность</a:t>
-            </a:r>
-            <a:endParaRPr lang="en-US" dirty="0" smtClean="0"/>
-          </a:p>
-          <a:p>
-            <a:pPr lvl="1"/>
-            <a:r>
-              <a:rPr lang="ru-RU" dirty="0" smtClean="0"/>
-              <a:t>Сортирующие последовательность</a:t>
-            </a:r>
-          </a:p>
-          <a:p>
-            <a:endParaRPr lang="en-US" dirty="0"/>
+          <a:bodyPr>
+            <a:normAutofit/>
+          </a:bodyPr>
+          <a:lstStyle/>
+          <a:p>
+            <a:r>
+              <a:rPr lang="en-US" sz="6600" dirty="0" smtClean="0"/>
+              <a:t>Q?</a:t>
+            </a:r>
+            <a:endParaRPr lang="en-US" sz="6600" dirty="0"/>
           </a:p>
         </p:txBody>
       </p:sp>
@@ -7005,6 +7213,13 @@
   <p:clrMapOvr>
     <a:masterClrMapping/>
   </p:clrMapOvr>
+  <p:timing>
+    <p:tnLst>
+      <p:par>
+        <p:cTn id="1" dur="indefinite" restart="never" nodeType="tmRoot"/>
+      </p:par>
+    </p:tnLst>
+  </p:timing>
 </p:sld>
 </file>
 
@@ -7042,7 +7257,7 @@
           <a:p>
             <a:r>
               <a:rPr lang="ru-RU" dirty="0" smtClean="0"/>
-              <a:t>Не изменяющие</a:t>
+              <a:t>Алгоритмы</a:t>
             </a:r>
             <a:endParaRPr lang="en-US" dirty="0"/>
           </a:p>
@@ -7058,63 +7273,34 @@
             <p:ph idx="1"/>
           </p:nvPr>
         </p:nvSpPr>
-        <p:spPr/>
+        <p:spPr>
+          <a:xfrm>
+            <a:off x="457200" y="2590800"/>
+            <a:ext cx="8229600" cy="3535363"/>
+          </a:xfrm>
+        </p:spPr>
         <p:txBody>
           <a:bodyPr/>
           <a:lstStyle/>
           <a:p>
             <a:r>
-              <a:rPr lang="en-US" dirty="0" err="1" smtClean="0"/>
-              <a:t>for_each</a:t>
+              <a:rPr lang="ru-RU" dirty="0" smtClean="0"/>
+              <a:t>Не изменяющие последовательность</a:t>
+            </a:r>
+          </a:p>
+          <a:p>
+            <a:r>
+              <a:rPr lang="ru-RU" dirty="0" smtClean="0"/>
+              <a:t>Изменяющие последовательность</a:t>
             </a:r>
             <a:endParaRPr lang="en-US" dirty="0" smtClean="0"/>
           </a:p>
           <a:p>
-            <a:r>
-              <a:rPr lang="en-US" dirty="0" smtClean="0"/>
-              <a:t>find / </a:t>
-            </a:r>
-            <a:r>
-              <a:rPr lang="en-US" dirty="0" err="1" smtClean="0"/>
-              <a:t>find_if</a:t>
-            </a:r>
-            <a:endParaRPr lang="en-US" dirty="0" smtClean="0"/>
-          </a:p>
-          <a:p>
-            <a:r>
-              <a:rPr lang="en-US" dirty="0" smtClean="0"/>
-              <a:t>count / </a:t>
-            </a:r>
-            <a:r>
-              <a:rPr lang="en-US" dirty="0" err="1" smtClean="0"/>
-              <a:t>count_if</a:t>
-            </a:r>
-            <a:endParaRPr lang="en-US" dirty="0" smtClean="0"/>
-          </a:p>
-          <a:p>
-            <a:r>
-              <a:rPr lang="en-US" dirty="0" smtClean="0"/>
-              <a:t>equal / mismatch</a:t>
-            </a:r>
-          </a:p>
-          <a:p>
-            <a:r>
-              <a:rPr lang="en-US" dirty="0" smtClean="0"/>
-              <a:t>search / </a:t>
-            </a:r>
-            <a:r>
-              <a:rPr lang="en-US" dirty="0" err="1" smtClean="0"/>
-              <a:t>search_end</a:t>
-            </a:r>
-            <a:r>
-              <a:rPr lang="en-US" dirty="0" smtClean="0"/>
-              <a:t> / </a:t>
-            </a:r>
-            <a:r>
-              <a:rPr lang="en-US" dirty="0" err="1" smtClean="0"/>
-              <a:t>find_end</a:t>
-            </a:r>
-            <a:endParaRPr lang="en-US" dirty="0" smtClean="0"/>
+            <a:pPr lvl="1"/>
+            <a:r>
+              <a:rPr lang="ru-RU" dirty="0" smtClean="0"/>
+              <a:t>Сортирующие последовательность</a:t>
+            </a:r>
           </a:p>
           <a:p>
             <a:endParaRPr lang="en-US" dirty="0"/>
@@ -7126,6 +7312,13 @@
   <p:clrMapOvr>
     <a:masterClrMapping/>
   </p:clrMapOvr>
+  <p:timing>
+    <p:tnLst>
+      <p:par>
+        <p:cTn id="1" dur="indefinite" restart="never" nodeType="tmRoot"/>
+      </p:par>
+    </p:tnLst>
+  </p:timing>
 </p:sld>
 </file>
 
@@ -7163,7 +7356,7 @@
           <a:p>
             <a:r>
               <a:rPr lang="ru-RU" dirty="0" smtClean="0"/>
-              <a:t>Изменяющие</a:t>
+              <a:t>Не изменяющие</a:t>
             </a:r>
             <a:endParaRPr lang="en-US" dirty="0"/>
           </a:p>
@@ -7181,68 +7374,60 @@
         </p:nvSpPr>
         <p:spPr/>
         <p:txBody>
-          <a:bodyPr>
-            <a:normAutofit lnSpcReduction="10000"/>
-          </a:bodyPr>
-          <a:lstStyle/>
-          <a:p>
-            <a:r>
-              <a:rPr lang="en-US" dirty="0" smtClean="0"/>
-              <a:t>copy / </a:t>
-            </a:r>
+          <a:bodyPr/>
+          <a:lstStyle/>
+          <a:p>
             <a:r>
               <a:rPr lang="en-US" dirty="0" err="1" smtClean="0"/>
-              <a:t>copy_backward</a:t>
+              <a:t>for_each</a:t>
             </a:r>
             <a:endParaRPr lang="en-US" dirty="0" smtClean="0"/>
           </a:p>
           <a:p>
             <a:r>
               <a:rPr lang="en-US" dirty="0" smtClean="0"/>
-              <a:t>transform</a:t>
-            </a:r>
-          </a:p>
-          <a:p>
-            <a:r>
-              <a:rPr lang="en-US" dirty="0" smtClean="0"/>
-              <a:t>unique</a:t>
-            </a:r>
-          </a:p>
-          <a:p>
-            <a:r>
-              <a:rPr lang="en-US" dirty="0" smtClean="0"/>
-              <a:t>replace</a:t>
-            </a:r>
-          </a:p>
-          <a:p>
-            <a:r>
-              <a:rPr lang="en-US" dirty="0" smtClean="0"/>
-              <a:t>remove</a:t>
-            </a:r>
-          </a:p>
-          <a:p>
-            <a:r>
-              <a:rPr lang="en-US" dirty="0" smtClean="0"/>
-              <a:t>f</a:t>
-            </a:r>
-            <a:r>
-              <a:rPr lang="en-US" dirty="0" smtClean="0"/>
-              <a:t>ill / generate</a:t>
-            </a:r>
-          </a:p>
-          <a:p>
-            <a:r>
-              <a:rPr lang="en-US" dirty="0" smtClean="0"/>
-              <a:t>reverse / rotate</a:t>
-            </a:r>
-          </a:p>
-          <a:p>
-            <a:r>
-              <a:rPr lang="en-US" dirty="0" smtClean="0"/>
-              <a:t>swap</a:t>
-            </a:r>
-          </a:p>
-          <a:p>
+              <a:t>find / </a:t>
+            </a:r>
+            <a:r>
+              <a:rPr lang="en-US" dirty="0" err="1" smtClean="0"/>
+              <a:t>find_if</a:t>
+            </a:r>
+            <a:endParaRPr lang="en-US" dirty="0" smtClean="0"/>
+          </a:p>
+          <a:p>
+            <a:r>
+              <a:rPr lang="en-US" dirty="0" smtClean="0"/>
+              <a:t>count / </a:t>
+            </a:r>
+            <a:r>
+              <a:rPr lang="en-US" dirty="0" err="1" smtClean="0"/>
+              <a:t>count_if</a:t>
+            </a:r>
+            <a:endParaRPr lang="en-US" dirty="0" smtClean="0"/>
+          </a:p>
+          <a:p>
+            <a:r>
+              <a:rPr lang="en-US" dirty="0" smtClean="0"/>
+              <a:t>equal / mismatch</a:t>
+            </a:r>
+          </a:p>
+          <a:p>
+            <a:r>
+              <a:rPr lang="en-US" dirty="0" smtClean="0"/>
+              <a:t>search / </a:t>
+            </a:r>
+            <a:r>
+              <a:rPr lang="en-US" dirty="0" err="1" smtClean="0"/>
+              <a:t>search_end</a:t>
+            </a:r>
+            <a:r>
+              <a:rPr lang="en-US" dirty="0" smtClean="0"/>
+              <a:t> / </a:t>
+            </a:r>
+            <a:r>
+              <a:rPr lang="en-US" dirty="0" err="1" smtClean="0"/>
+              <a:t>find_end</a:t>
+            </a:r>
             <a:endParaRPr lang="en-US" dirty="0" smtClean="0"/>
           </a:p>
           <a:p>
@@ -7292,7 +7477,7 @@
           <a:p>
             <a:r>
               <a:rPr lang="ru-RU" dirty="0" smtClean="0"/>
-              <a:t>Сортирующие алгоритмы</a:t>
+              <a:t>Изменяющие</a:t>
             </a:r>
             <a:endParaRPr lang="en-US" dirty="0"/>
           </a:p>
@@ -7310,82 +7495,61 @@
         </p:nvSpPr>
         <p:spPr/>
         <p:txBody>
-          <a:bodyPr/>
-          <a:lstStyle/>
-          <a:p>
-            <a:r>
-              <a:rPr lang="en-US" dirty="0" smtClean="0"/>
-              <a:t>sort / </a:t>
+          <a:bodyPr>
+            <a:normAutofit lnSpcReduction="10000"/>
+          </a:bodyPr>
+          <a:lstStyle/>
+          <a:p>
+            <a:r>
+              <a:rPr lang="en-US" dirty="0" smtClean="0"/>
+              <a:t>copy / </a:t>
             </a:r>
             <a:r>
               <a:rPr lang="en-US" dirty="0" err="1" smtClean="0"/>
-              <a:t>partial_sort</a:t>
-            </a:r>
-            <a:r>
-              <a:rPr lang="en-US" dirty="0" smtClean="0"/>
-              <a:t> / </a:t>
-            </a:r>
-            <a:r>
-              <a:rPr lang="en-US" dirty="0" err="1" smtClean="0"/>
-              <a:t>stable_sort</a:t>
+              <a:t>copy_backward</a:t>
             </a:r>
             <a:endParaRPr lang="en-US" dirty="0" smtClean="0"/>
           </a:p>
           <a:p>
             <a:r>
               <a:rPr lang="en-US" dirty="0" smtClean="0"/>
-              <a:t>find</a:t>
-            </a:r>
-          </a:p>
-          <a:p>
-            <a:r>
-              <a:rPr lang="en-US" dirty="0" smtClean="0"/>
-              <a:t>merge / </a:t>
-            </a:r>
-            <a:r>
-              <a:rPr lang="en-US" dirty="0" err="1" smtClean="0"/>
-              <a:t>inplace_merge</a:t>
-            </a:r>
-            <a:endParaRPr lang="en-US" dirty="0" smtClean="0"/>
-          </a:p>
-          <a:p>
-            <a:r>
-              <a:rPr lang="en-US" dirty="0" smtClean="0"/>
-              <a:t>partition / </a:t>
-            </a:r>
-            <a:r>
-              <a:rPr lang="en-US" dirty="0" err="1" smtClean="0"/>
-              <a:t>stable_partition</a:t>
-            </a:r>
-            <a:endParaRPr lang="en-US" dirty="0" smtClean="0"/>
-          </a:p>
-          <a:p>
-            <a:r>
-              <a:rPr lang="en-US" dirty="0" err="1" smtClean="0"/>
-              <a:t>make_heap</a:t>
-            </a:r>
-            <a:r>
-              <a:rPr lang="en-US" dirty="0" smtClean="0"/>
-              <a:t> / </a:t>
-            </a:r>
-            <a:r>
-              <a:rPr lang="en-US" dirty="0" err="1" smtClean="0"/>
-              <a:t>push_heap</a:t>
-            </a:r>
-            <a:r>
-              <a:rPr lang="en-US" dirty="0" smtClean="0"/>
-              <a:t> / </a:t>
-            </a:r>
-            <a:r>
-              <a:rPr lang="en-US" dirty="0" err="1" smtClean="0"/>
-              <a:t>pop_heap</a:t>
-            </a:r>
-            <a:endParaRPr lang="en-US" dirty="0" smtClean="0"/>
-          </a:p>
-          <a:p>
-            <a:r>
-              <a:rPr lang="en-US" dirty="0" smtClean="0"/>
-              <a:t>min / max</a:t>
+              <a:t>transform</a:t>
+            </a:r>
+          </a:p>
+          <a:p>
+            <a:r>
+              <a:rPr lang="en-US" dirty="0" smtClean="0"/>
+              <a:t>unique</a:t>
+            </a:r>
+          </a:p>
+          <a:p>
+            <a:r>
+              <a:rPr lang="en-US" dirty="0" smtClean="0"/>
+              <a:t>replace</a:t>
+            </a:r>
+          </a:p>
+          <a:p>
+            <a:r>
+              <a:rPr lang="en-US" dirty="0" smtClean="0"/>
+              <a:t>remove</a:t>
+            </a:r>
+          </a:p>
+          <a:p>
+            <a:r>
+              <a:rPr lang="en-US" dirty="0" smtClean="0"/>
+              <a:t>fill / generate</a:t>
+            </a:r>
+          </a:p>
+          <a:p>
+            <a:r>
+              <a:rPr lang="en-US" dirty="0" smtClean="0"/>
+              <a:t>reverse / rotate</a:t>
+            </a:r>
+          </a:p>
+          <a:p>
+            <a:r>
+              <a:rPr lang="en-US" dirty="0" smtClean="0"/>
+              <a:t>swap</a:t>
             </a:r>
           </a:p>
           <a:p>
@@ -7438,7 +7602,7 @@
           <a:p>
             <a:r>
               <a:rPr lang="ru-RU" dirty="0" smtClean="0"/>
-              <a:t>Итераторы</a:t>
+              <a:t>Сортирующие алгоритмы</a:t>
             </a:r>
             <a:endParaRPr lang="en-US" dirty="0"/>
           </a:p>
@@ -7461,52 +7625,83 @@
           <a:p>
             <a:r>
               <a:rPr lang="en-US" dirty="0" smtClean="0"/>
-              <a:t>Out</a:t>
-            </a:r>
-          </a:p>
-          <a:p>
-            <a:r>
-              <a:rPr lang="en-US" dirty="0" smtClean="0"/>
-              <a:t>In</a:t>
-            </a:r>
-          </a:p>
-          <a:p>
-            <a:r>
-              <a:rPr lang="en-US" dirty="0" smtClean="0"/>
-              <a:t>For</a:t>
-            </a:r>
-          </a:p>
-          <a:p>
-            <a:r>
-              <a:rPr lang="en-US" dirty="0" smtClean="0"/>
-              <a:t>Bi</a:t>
-            </a:r>
-          </a:p>
-          <a:p>
-            <a:r>
-              <a:rPr lang="en-US" dirty="0" smtClean="0"/>
-              <a:t>Ran</a:t>
-            </a:r>
-          </a:p>
-          <a:p>
-            <a:r>
-              <a:rPr lang="en-US" dirty="0" smtClean="0">
-                <a:hlinkClick r:id="rId2"/>
-              </a:rPr>
-              <a:t>http://www.cplusplus.com/reference/iterator</a:t>
-            </a:r>
-            <a:r>
-              <a:rPr lang="en-US" dirty="0" smtClean="0">
-                <a:hlinkClick r:id="rId2"/>
-              </a:rPr>
-              <a:t>/</a:t>
+              <a:t>sort / </a:t>
+            </a:r>
+            <a:r>
+              <a:rPr lang="en-US" dirty="0" err="1" smtClean="0"/>
+              <a:t>partial_sort</a:t>
+            </a:r>
+            <a:r>
+              <a:rPr lang="en-US" dirty="0" smtClean="0"/>
+              <a:t> / </a:t>
+            </a:r>
+            <a:r>
+              <a:rPr lang="en-US" dirty="0" err="1" smtClean="0"/>
+              <a:t>stable_sort</a:t>
             </a:r>
             <a:endParaRPr lang="en-US" dirty="0" smtClean="0"/>
           </a:p>
           <a:p>
-            <a:pPr>
-              <a:buNone/>
-            </a:pPr>
+            <a:r>
+              <a:rPr lang="en-US" dirty="0" smtClean="0"/>
+              <a:t>find</a:t>
+            </a:r>
+          </a:p>
+          <a:p>
+            <a:r>
+              <a:rPr lang="en-US" dirty="0" smtClean="0"/>
+              <a:t>merge / </a:t>
+            </a:r>
+            <a:r>
+              <a:rPr lang="en-US" dirty="0" err="1" smtClean="0"/>
+              <a:t>inplace_merge</a:t>
+            </a:r>
+            <a:endParaRPr lang="en-US" dirty="0" smtClean="0"/>
+          </a:p>
+          <a:p>
+            <a:r>
+              <a:rPr lang="en-US" dirty="0" smtClean="0"/>
+              <a:t>partition / </a:t>
+            </a:r>
+            <a:r>
+              <a:rPr lang="en-US" dirty="0" err="1" smtClean="0"/>
+              <a:t>stable_partition</a:t>
+            </a:r>
+            <a:endParaRPr lang="en-US" dirty="0" smtClean="0"/>
+          </a:p>
+          <a:p>
+            <a:r>
+              <a:rPr lang="en-US" dirty="0" err="1" smtClean="0"/>
+              <a:t>make_heap</a:t>
+            </a:r>
+            <a:r>
+              <a:rPr lang="en-US" dirty="0" smtClean="0"/>
+              <a:t> / </a:t>
+            </a:r>
+            <a:r>
+              <a:rPr lang="en-US" dirty="0" err="1" smtClean="0"/>
+              <a:t>push_heap</a:t>
+            </a:r>
+            <a:r>
+              <a:rPr lang="en-US" dirty="0" smtClean="0"/>
+              <a:t> / </a:t>
+            </a:r>
+            <a:r>
+              <a:rPr lang="en-US" dirty="0" err="1" smtClean="0"/>
+              <a:t>pop_heap</a:t>
+            </a:r>
+            <a:endParaRPr lang="en-US" dirty="0" smtClean="0"/>
+          </a:p>
+          <a:p>
+            <a:r>
+              <a:rPr lang="en-US" dirty="0" smtClean="0"/>
+              <a:t>min / max</a:t>
+            </a:r>
+          </a:p>
+          <a:p>
+            <a:endParaRPr lang="en-US" dirty="0" smtClean="0"/>
+          </a:p>
+          <a:p>
             <a:endParaRPr lang="en-US" dirty="0"/>
           </a:p>
         </p:txBody>
@@ -7552,8 +7747,8 @@
           <a:lstStyle/>
           <a:p>
             <a:r>
-              <a:rPr lang="en-US" dirty="0" smtClean="0"/>
-              <a:t>Q?</a:t>
+              <a:rPr lang="ru-RU" dirty="0" smtClean="0"/>
+              <a:t>Итераторы</a:t>
             </a:r>
             <a:endParaRPr lang="en-US" dirty="0"/>
           </a:p>
@@ -7574,7 +7769,106 @@
           <a:bodyPr/>
           <a:lstStyle/>
           <a:p>
-            <a:endParaRPr lang="en-US"/>
+            <a:r>
+              <a:rPr lang="en-US" dirty="0" smtClean="0"/>
+              <a:t>Out</a:t>
+            </a:r>
+          </a:p>
+          <a:p>
+            <a:r>
+              <a:rPr lang="en-US" dirty="0" smtClean="0"/>
+              <a:t>In</a:t>
+            </a:r>
+          </a:p>
+          <a:p>
+            <a:r>
+              <a:rPr lang="en-US" dirty="0" smtClean="0"/>
+              <a:t>For</a:t>
+            </a:r>
+          </a:p>
+          <a:p>
+            <a:r>
+              <a:rPr lang="en-US" dirty="0" smtClean="0"/>
+              <a:t>Bi</a:t>
+            </a:r>
+          </a:p>
+          <a:p>
+            <a:r>
+              <a:rPr lang="en-US" dirty="0" smtClean="0"/>
+              <a:t>Ran</a:t>
+            </a:r>
+          </a:p>
+          <a:p>
+            <a:pPr>
+              <a:buNone/>
+            </a:pPr>
+            <a:endParaRPr lang="en-US" dirty="0"/>
+          </a:p>
+        </p:txBody>
+      </p:sp>
+      <p:cxnSp>
+        <p:nvCxnSpPr>
+          <p:cNvPr id="4" name="Прямая соединительная линия 6"/>
+          <p:cNvCxnSpPr/>
+          <p:nvPr/>
+        </p:nvCxnSpPr>
+        <p:spPr>
+          <a:xfrm>
+            <a:off x="3581400" y="6019800"/>
+            <a:ext cx="5181600" cy="0"/>
+          </a:xfrm>
+          <a:prstGeom prst="line">
+            <a:avLst/>
+          </a:prstGeom>
+        </p:spPr>
+        <p:style>
+          <a:lnRef idx="1">
+            <a:schemeClr val="accent1"/>
+          </a:lnRef>
+          <a:fillRef idx="0">
+            <a:schemeClr val="accent1"/>
+          </a:fillRef>
+          <a:effectRef idx="0">
+            <a:schemeClr val="accent1"/>
+          </a:effectRef>
+          <a:fontRef idx="minor">
+            <a:schemeClr val="tx1"/>
+          </a:fontRef>
+        </p:style>
+      </p:cxnSp>
+      <p:sp>
+        <p:nvSpPr>
+          <p:cNvPr id="6" name="Прямоугольник 4"/>
+          <p:cNvSpPr/>
+          <p:nvPr/>
+        </p:nvSpPr>
+        <p:spPr>
+          <a:xfrm>
+            <a:off x="4114800" y="6096000"/>
+            <a:ext cx="4648200" cy="646331"/>
+          </a:xfrm>
+          <a:prstGeom prst="rect">
+            <a:avLst/>
+          </a:prstGeom>
+        </p:spPr>
+        <p:txBody>
+          <a:bodyPr wrap="square">
+            <a:spAutoFit/>
+          </a:bodyPr>
+          <a:lstStyle/>
+          <a:p>
+            <a:pPr fontAlgn="base"/>
+            <a:r>
+              <a:rPr lang="en-US" dirty="0" smtClean="0">
+                <a:hlinkClick r:id="rId2"/>
+              </a:rPr>
+              <a:t>http://www.cplusplus.com/reference/iterator/</a:t>
+            </a:r>
+            <a:endParaRPr lang="en-US" dirty="0" smtClean="0"/>
+          </a:p>
+          <a:p>
+            <a:pPr fontAlgn="base"/>
+            <a:endParaRPr lang="en-US" dirty="0" smtClean="0"/>
           </a:p>
         </p:txBody>
       </p:sp>
@@ -7720,6 +8014,68 @@
   <p:clrMapOvr>
     <a:masterClrMapping/>
   </p:clrMapOvr>
+  <p:timing>
+    <p:tnLst>
+      <p:par>
+        <p:cTn id="1" dur="indefinite" restart="never" nodeType="tmRoot"/>
+      </p:par>
+    </p:tnLst>
+  </p:timing>
+</p:sld>
+</file>
+
+<file path=ppt/slides/slide30.xml><?xml version="1.0" encoding="utf-8"?>
+<p:sld xmlns:a="http://schemas.openxmlformats.org/drawingml/2006/main" xmlns:r="http://schemas.openxmlformats.org/officeDocument/2006/relationships" xmlns:p="http://schemas.openxmlformats.org/presentationml/2006/main">
+  <p:cSld>
+    <p:spTree>
+      <p:nvGrpSpPr>
+        <p:cNvPr id="1" name=""/>
+        <p:cNvGrpSpPr/>
+        <p:nvPr/>
+      </p:nvGrpSpPr>
+      <p:grpSpPr>
+        <a:xfrm>
+          <a:off x="0" y="0"/>
+          <a:ext cx="0" cy="0"/>
+          <a:chOff x="0" y="0"/>
+          <a:chExt cx="0" cy="0"/>
+        </a:xfrm>
+      </p:grpSpPr>
+      <p:sp>
+        <p:nvSpPr>
+          <p:cNvPr id="2" name="Title 1"/>
+          <p:cNvSpPr>
+            <a:spLocks noGrp="1"/>
+          </p:cNvSpPr>
+          <p:nvPr>
+            <p:ph type="title"/>
+          </p:nvPr>
+        </p:nvSpPr>
+        <p:spPr>
+          <a:xfrm>
+            <a:off x="609600" y="2286000"/>
+            <a:ext cx="8229600" cy="1143000"/>
+          </a:xfrm>
+        </p:spPr>
+        <p:txBody>
+          <a:bodyPr>
+            <a:normAutofit/>
+          </a:bodyPr>
+          <a:lstStyle/>
+          <a:p>
+            <a:r>
+              <a:rPr lang="en-US" sz="6600" dirty="0" smtClean="0"/>
+              <a:t>Q?</a:t>
+            </a:r>
+            <a:endParaRPr lang="en-US" sz="6600" dirty="0"/>
+          </a:p>
+        </p:txBody>
+      </p:sp>
+    </p:spTree>
+  </p:cSld>
+  <p:clrMapOvr>
+    <a:masterClrMapping/>
+  </p:clrMapOvr>
 </p:sld>
 </file>
 
@@ -7767,164 +8123,246 @@
           </a:p>
         </p:txBody>
       </p:sp>
-      <p:graphicFrame>
-        <p:nvGraphicFramePr>
-          <p:cNvPr id="4" name="Content Placeholder 3"/>
-          <p:cNvGraphicFramePr>
-            <a:graphicFrameLocks noGrp="1"/>
-          </p:cNvGraphicFramePr>
-          <p:nvPr>
-            <p:ph idx="1"/>
-          </p:nvPr>
-        </p:nvGraphicFramePr>
-        <p:xfrm>
-          <a:off x="838200" y="1676400"/>
-          <a:ext cx="7848600" cy="2895600"/>
-        </p:xfrm>
-        <a:graphic>
-          <a:graphicData uri="http://schemas.openxmlformats.org/drawingml/2006/table">
-            <a:tbl>
-              <a:tblPr firstRow="1" bandRow="1">
-                <a:tableStyleId>{5C22544A-7EE6-4342-B048-85BDC9FD1C3A}</a:tableStyleId>
-              </a:tblPr>
-              <a:tblGrid>
-                <a:gridCol w="7848600"/>
-              </a:tblGrid>
-              <a:tr h="2895600">
-                <a:tc>
-                  <a:txBody>
-                    <a:bodyPr/>
-                    <a:lstStyle/>
-                    <a:p>
-                      <a:r>
-                        <a:rPr lang="en-US" dirty="0" smtClean="0"/>
-                        <a:t>class </a:t>
-                      </a:r>
-                      <a:r>
-                        <a:rPr lang="en-US" dirty="0" err="1" smtClean="0"/>
-                        <a:t>noncopyable</a:t>
-                      </a:r>
-                      <a:r>
-                        <a:rPr lang="en-US" dirty="0" smtClean="0"/>
-                        <a:t>  </a:t>
-                      </a:r>
-                    </a:p>
-                    <a:p>
-                      <a:r>
-                        <a:rPr lang="en-US" dirty="0" smtClean="0"/>
-                        <a:t>{</a:t>
-                      </a:r>
-                    </a:p>
-                    <a:p>
-                      <a:r>
-                        <a:rPr lang="en-US" dirty="0" smtClean="0"/>
-                        <a:t>protected: </a:t>
-                      </a:r>
-                    </a:p>
-                    <a:p>
-                      <a:r>
-                        <a:rPr lang="en-US" dirty="0" smtClean="0"/>
-                        <a:t>     </a:t>
-                      </a:r>
-                      <a:r>
-                        <a:rPr lang="en-US" dirty="0" err="1" smtClean="0"/>
-                        <a:t>noncopyable</a:t>
-                      </a:r>
-                      <a:r>
-                        <a:rPr lang="en-US" dirty="0" smtClean="0"/>
-                        <a:t>() {} </a:t>
-                      </a:r>
-                    </a:p>
-                    <a:p>
-                      <a:r>
-                        <a:rPr lang="en-US" dirty="0" smtClean="0"/>
-                        <a:t>     ~</a:t>
-                      </a:r>
-                      <a:r>
-                        <a:rPr lang="en-US" dirty="0" err="1" smtClean="0"/>
-                        <a:t>noncopyable</a:t>
-                      </a:r>
-                      <a:r>
-                        <a:rPr lang="en-US" dirty="0" smtClean="0"/>
-                        <a:t>() {} </a:t>
-                      </a:r>
-                    </a:p>
-                    <a:p>
-                      <a:r>
-                        <a:rPr lang="en-US" dirty="0" smtClean="0"/>
-                        <a:t>private:  </a:t>
-                      </a:r>
-                    </a:p>
-                    <a:p>
-                      <a:r>
-                        <a:rPr lang="en-US" dirty="0" smtClean="0"/>
-                        <a:t>// emphasize the following members are private </a:t>
-                      </a:r>
-                    </a:p>
-                    <a:p>
-                      <a:r>
-                        <a:rPr lang="en-US" dirty="0" smtClean="0"/>
-                        <a:t>     </a:t>
-                      </a:r>
-                      <a:r>
-                        <a:rPr lang="en-US" dirty="0" err="1" smtClean="0"/>
-                        <a:t>noncopyable</a:t>
-                      </a:r>
-                      <a:r>
-                        <a:rPr lang="en-US" dirty="0" smtClean="0"/>
-                        <a:t>( const </a:t>
-                      </a:r>
-                      <a:r>
-                        <a:rPr lang="en-US" dirty="0" err="1" smtClean="0"/>
-                        <a:t>noncopyable</a:t>
-                      </a:r>
-                      <a:r>
-                        <a:rPr lang="en-US" dirty="0" smtClean="0"/>
-                        <a:t>&amp; );</a:t>
-                      </a:r>
-                    </a:p>
-                    <a:p>
-                      <a:r>
-                        <a:rPr lang="en-US" dirty="0" smtClean="0"/>
-                        <a:t>     const </a:t>
-                      </a:r>
-                      <a:r>
-                        <a:rPr lang="en-US" dirty="0" err="1" smtClean="0"/>
-                        <a:t>noncopyable</a:t>
-                      </a:r>
-                      <a:r>
-                        <a:rPr lang="en-US" dirty="0" smtClean="0"/>
-                        <a:t>&amp; operator=( const </a:t>
-                      </a:r>
-                      <a:r>
-                        <a:rPr lang="en-US" dirty="0" err="1" smtClean="0"/>
-                        <a:t>noncopyable</a:t>
-                      </a:r>
-                      <a:r>
-                        <a:rPr lang="en-US" dirty="0" smtClean="0"/>
-                        <a:t>&amp; ); </a:t>
-                      </a:r>
-                    </a:p>
-                    <a:p>
-                      <a:r>
-                        <a:rPr lang="en-US" dirty="0" smtClean="0"/>
-                        <a:t>};</a:t>
-                      </a:r>
-                      <a:endParaRPr lang="en-US" dirty="0"/>
-                    </a:p>
-                  </a:txBody>
-                  <a:tcPr/>
-                </a:tc>
-              </a:tr>
-            </a:tbl>
-          </a:graphicData>
-        </a:graphic>
-      </p:graphicFrame>
+      <p:sp>
+        <p:nvSpPr>
+          <p:cNvPr id="6" name="Скругленный прямоугольник 5"/>
+          <p:cNvSpPr/>
+          <p:nvPr/>
+        </p:nvSpPr>
+        <p:spPr>
+          <a:xfrm>
+            <a:off x="1371600" y="1600200"/>
+            <a:ext cx="6553200" cy="3581400"/>
+          </a:xfrm>
+          <a:prstGeom prst="roundRect">
+            <a:avLst/>
+          </a:prstGeom>
+        </p:spPr>
+        <p:style>
+          <a:lnRef idx="2">
+            <a:schemeClr val="accent1">
+              <a:shade val="50000"/>
+            </a:schemeClr>
+          </a:lnRef>
+          <a:fillRef idx="1">
+            <a:schemeClr val="accent1"/>
+          </a:fillRef>
+          <a:effectRef idx="0">
+            <a:schemeClr val="accent1"/>
+          </a:effectRef>
+          <a:fontRef idx="minor">
+            <a:schemeClr val="lt1"/>
+          </a:fontRef>
+        </p:style>
+        <p:txBody>
+          <a:bodyPr rtlCol="0" anchor="ctr"/>
+          <a:lstStyle/>
+          <a:p>
+            <a:r>
+              <a:rPr lang="en-US" dirty="0" smtClean="0">
+                <a:latin typeface="Consolas" pitchFamily="49" charset="0"/>
+                <a:cs typeface="Consolas" pitchFamily="49" charset="0"/>
+              </a:rPr>
+              <a:t>class </a:t>
+            </a:r>
+            <a:r>
+              <a:rPr lang="en-US" dirty="0" err="1" smtClean="0">
+                <a:latin typeface="Consolas" pitchFamily="49" charset="0"/>
+                <a:cs typeface="Consolas" pitchFamily="49" charset="0"/>
+              </a:rPr>
+              <a:t>noncopyable</a:t>
+            </a:r>
+            <a:r>
+              <a:rPr lang="en-US" dirty="0" smtClean="0">
+                <a:latin typeface="Consolas" pitchFamily="49" charset="0"/>
+                <a:cs typeface="Consolas" pitchFamily="49" charset="0"/>
+              </a:rPr>
+              <a:t>  </a:t>
+            </a:r>
+          </a:p>
+          <a:p>
+            <a:r>
+              <a:rPr lang="en-US" dirty="0" smtClean="0">
+                <a:latin typeface="Consolas" pitchFamily="49" charset="0"/>
+                <a:cs typeface="Consolas" pitchFamily="49" charset="0"/>
+              </a:rPr>
+              <a:t>{</a:t>
+            </a:r>
+          </a:p>
+          <a:p>
+            <a:r>
+              <a:rPr lang="en-US" dirty="0" smtClean="0">
+                <a:latin typeface="Consolas" pitchFamily="49" charset="0"/>
+                <a:cs typeface="Consolas" pitchFamily="49" charset="0"/>
+              </a:rPr>
+              <a:t>protected: </a:t>
+            </a:r>
+          </a:p>
+          <a:p>
+            <a:r>
+              <a:rPr lang="en-US" dirty="0" smtClean="0">
+                <a:latin typeface="Consolas" pitchFamily="49" charset="0"/>
+                <a:cs typeface="Consolas" pitchFamily="49" charset="0"/>
+              </a:rPr>
+              <a:t>     </a:t>
+            </a:r>
+            <a:r>
+              <a:rPr lang="en-US" dirty="0" err="1" smtClean="0">
+                <a:latin typeface="Consolas" pitchFamily="49" charset="0"/>
+                <a:cs typeface="Consolas" pitchFamily="49" charset="0"/>
+              </a:rPr>
+              <a:t>noncopyable</a:t>
+            </a:r>
+            <a:r>
+              <a:rPr lang="en-US" dirty="0" smtClean="0">
+                <a:latin typeface="Consolas" pitchFamily="49" charset="0"/>
+                <a:cs typeface="Consolas" pitchFamily="49" charset="0"/>
+              </a:rPr>
+              <a:t>() {} </a:t>
+            </a:r>
+          </a:p>
+          <a:p>
+            <a:r>
+              <a:rPr lang="en-US" dirty="0" smtClean="0">
+                <a:latin typeface="Consolas" pitchFamily="49" charset="0"/>
+                <a:cs typeface="Consolas" pitchFamily="49" charset="0"/>
+              </a:rPr>
+              <a:t>     ~</a:t>
+            </a:r>
+            <a:r>
+              <a:rPr lang="en-US" dirty="0" err="1" smtClean="0">
+                <a:latin typeface="Consolas" pitchFamily="49" charset="0"/>
+                <a:cs typeface="Consolas" pitchFamily="49" charset="0"/>
+              </a:rPr>
+              <a:t>noncopyable</a:t>
+            </a:r>
+            <a:r>
+              <a:rPr lang="en-US" dirty="0" smtClean="0">
+                <a:latin typeface="Consolas" pitchFamily="49" charset="0"/>
+                <a:cs typeface="Consolas" pitchFamily="49" charset="0"/>
+              </a:rPr>
+              <a:t>() {} </a:t>
+            </a:r>
+          </a:p>
+          <a:p>
+            <a:r>
+              <a:rPr lang="en-US" dirty="0" smtClean="0">
+                <a:latin typeface="Consolas" pitchFamily="49" charset="0"/>
+                <a:cs typeface="Consolas" pitchFamily="49" charset="0"/>
+              </a:rPr>
+              <a:t>private:  </a:t>
+            </a:r>
+          </a:p>
+          <a:p>
+            <a:r>
+              <a:rPr lang="en-US" dirty="0" smtClean="0">
+                <a:latin typeface="Consolas" pitchFamily="49" charset="0"/>
+                <a:cs typeface="Consolas" pitchFamily="49" charset="0"/>
+              </a:rPr>
+              <a:t>// emphasize the following members are private </a:t>
+            </a:r>
+          </a:p>
+          <a:p>
+            <a:r>
+              <a:rPr lang="en-US" dirty="0" smtClean="0">
+                <a:latin typeface="Consolas" pitchFamily="49" charset="0"/>
+                <a:cs typeface="Consolas" pitchFamily="49" charset="0"/>
+              </a:rPr>
+              <a:t>     </a:t>
+            </a:r>
+            <a:r>
+              <a:rPr lang="en-US" dirty="0" err="1" smtClean="0">
+                <a:latin typeface="Consolas" pitchFamily="49" charset="0"/>
+                <a:cs typeface="Consolas" pitchFamily="49" charset="0"/>
+              </a:rPr>
+              <a:t>noncopyable</a:t>
+            </a:r>
+            <a:r>
+              <a:rPr lang="en-US" dirty="0" smtClean="0">
+                <a:latin typeface="Consolas" pitchFamily="49" charset="0"/>
+                <a:cs typeface="Consolas" pitchFamily="49" charset="0"/>
+              </a:rPr>
+              <a:t>( const </a:t>
+            </a:r>
+            <a:r>
+              <a:rPr lang="en-US" dirty="0" err="1" smtClean="0">
+                <a:latin typeface="Consolas" pitchFamily="49" charset="0"/>
+                <a:cs typeface="Consolas" pitchFamily="49" charset="0"/>
+              </a:rPr>
+              <a:t>noncopyable</a:t>
+            </a:r>
+            <a:r>
+              <a:rPr lang="en-US" dirty="0" smtClean="0">
+                <a:latin typeface="Consolas" pitchFamily="49" charset="0"/>
+                <a:cs typeface="Consolas" pitchFamily="49" charset="0"/>
+              </a:rPr>
+              <a:t>&amp; );</a:t>
+            </a:r>
+          </a:p>
+          <a:p>
+            <a:r>
+              <a:rPr lang="en-US" dirty="0" smtClean="0">
+                <a:latin typeface="Consolas" pitchFamily="49" charset="0"/>
+                <a:cs typeface="Consolas" pitchFamily="49" charset="0"/>
+              </a:rPr>
+              <a:t>     const </a:t>
+            </a:r>
+            <a:r>
+              <a:rPr lang="en-US" dirty="0" err="1" smtClean="0">
+                <a:latin typeface="Consolas" pitchFamily="49" charset="0"/>
+                <a:cs typeface="Consolas" pitchFamily="49" charset="0"/>
+              </a:rPr>
+              <a:t>noncopyable</a:t>
+            </a:r>
+            <a:r>
+              <a:rPr lang="en-US" dirty="0" smtClean="0">
+                <a:latin typeface="Consolas" pitchFamily="49" charset="0"/>
+                <a:cs typeface="Consolas" pitchFamily="49" charset="0"/>
+              </a:rPr>
+              <a:t>&amp; operator=( const </a:t>
+            </a:r>
+            <a:r>
+              <a:rPr lang="en-US" dirty="0" err="1" smtClean="0">
+                <a:latin typeface="Consolas" pitchFamily="49" charset="0"/>
+                <a:cs typeface="Consolas" pitchFamily="49" charset="0"/>
+              </a:rPr>
+              <a:t>noncopyable</a:t>
+            </a:r>
+            <a:r>
+              <a:rPr lang="en-US" dirty="0" smtClean="0">
+                <a:latin typeface="Consolas" pitchFamily="49" charset="0"/>
+                <a:cs typeface="Consolas" pitchFamily="49" charset="0"/>
+              </a:rPr>
+              <a:t>&amp; ); </a:t>
+            </a:r>
+          </a:p>
+          <a:p>
+            <a:r>
+              <a:rPr lang="en-US" dirty="0" smtClean="0">
+                <a:latin typeface="Consolas" pitchFamily="49" charset="0"/>
+                <a:cs typeface="Consolas" pitchFamily="49" charset="0"/>
+              </a:rPr>
+              <a:t>};</a:t>
+            </a:r>
+            <a:endParaRPr lang="en-US" dirty="0">
+              <a:latin typeface="Consolas" pitchFamily="49" charset="0"/>
+              <a:cs typeface="Consolas" pitchFamily="49" charset="0"/>
+            </a:endParaRPr>
+          </a:p>
+        </p:txBody>
+      </p:sp>
     </p:spTree>
   </p:cSld>
   <p:clrMapOvr>
     <a:masterClrMapping/>
   </p:clrMapOvr>
+  <p:timing>
+    <p:tnLst>
+      <p:par>
+        <p:cTn id="1" dur="indefinite" restart="never" nodeType="tmRoot"/>
+      </p:par>
+    </p:tnLst>
+  </p:timing>
 </p:sld>
 </file>
 
@@ -8103,6 +8541,13 @@
   <p:clrMapOvr>
     <a:masterClrMapping/>
   </p:clrMapOvr>
+  <p:timing>
+    <p:tnLst>
+      <p:par>
+        <p:cTn id="1" dur="indefinite" restart="never" nodeType="tmRoot"/>
+      </p:par>
+    </p:tnLst>
+  </p:timing>
 </p:sld>
 </file>
 
@@ -8246,6 +8691,13 @@
   <p:clrMapOvr>
     <a:masterClrMapping/>
   </p:clrMapOvr>
+  <p:timing>
+    <p:tnLst>
+      <p:par>
+        <p:cTn id="1" dur="indefinite" restart="never" nodeType="tmRoot"/>
+      </p:par>
+    </p:tnLst>
+  </p:timing>
 </p:sld>
 </file>
 
@@ -8299,15 +8751,20 @@
             <p:ph idx="1"/>
           </p:nvPr>
         </p:nvSpPr>
-        <p:spPr/>
+        <p:spPr>
+          <a:xfrm>
+            <a:off x="457200" y="1600201"/>
+            <a:ext cx="8229600" cy="3657600"/>
+          </a:xfrm>
+        </p:spPr>
         <p:txBody>
           <a:bodyPr>
-            <a:normAutofit fontScale="77500" lnSpcReduction="20000"/>
+            <a:normAutofit/>
           </a:bodyPr>
           <a:lstStyle/>
           <a:p>
             <a:r>
-              <a:rPr lang="ru-RU" dirty="0" smtClean="0"/>
+              <a:rPr lang="ru-RU" sz="2300" dirty="0" smtClean="0"/>
               <a:t>Компиляция единиц трансляции</a:t>
             </a:r>
           </a:p>
@@ -8316,25 +8773,13 @@
               <a:buNone/>
             </a:pPr>
             <a:r>
-              <a:rPr lang="en-US" dirty="0" smtClean="0">
-                <a:latin typeface="Consolas" pitchFamily="49" charset="0"/>
-                <a:cs typeface="Consolas" pitchFamily="49" charset="0"/>
-              </a:rPr>
-              <a:t>   </a:t>
-            </a:r>
-            <a:r>
-              <a:rPr lang="en-US" sz="2400" dirty="0" smtClean="0">
-                <a:latin typeface="Consolas" pitchFamily="49" charset="0"/>
-                <a:cs typeface="Consolas" pitchFamily="49" charset="0"/>
-              </a:rPr>
-              <a:t>1.cpp, 2.cpp -&gt; 1.obj, 2.obj</a:t>
-            </a:r>
-          </a:p>
-          <a:p>
-            <a:pPr>
-              <a:buNone/>
-            </a:pPr>
-            <a:endParaRPr lang="en-US" sz="2400" dirty="0" smtClean="0">
+              <a:rPr lang="en-US" sz="2300" dirty="0" smtClean="0">
+                <a:latin typeface="Consolas" pitchFamily="49" charset="0"/>
+                <a:cs typeface="Consolas" pitchFamily="49" charset="0"/>
+              </a:rPr>
+              <a:t>   1.cpp, 2.cpp -&gt; 1.obj, 2.obj</a:t>
+            </a:r>
+            <a:endParaRPr lang="ru-RU" sz="2300" dirty="0" smtClean="0">
               <a:latin typeface="Consolas" pitchFamily="49" charset="0"/>
               <a:cs typeface="Consolas" pitchFamily="49" charset="0"/>
             </a:endParaRPr>
@@ -8343,7 +8788,7 @@
             <a:pPr>
               <a:buNone/>
             </a:pPr>
-            <a:endParaRPr lang="en-US" sz="2400" dirty="0" smtClean="0">
+            <a:endParaRPr lang="en-US" sz="2300" dirty="0" smtClean="0">
               <a:latin typeface="Consolas" pitchFamily="49" charset="0"/>
               <a:cs typeface="Consolas" pitchFamily="49" charset="0"/>
             </a:endParaRPr>
@@ -8352,24 +8797,24 @@
             <a:pPr>
               <a:buNone/>
             </a:pPr>
-            <a:endParaRPr lang="en-US" sz="2400" dirty="0" smtClean="0">
+            <a:endParaRPr lang="en-US" sz="2300" dirty="0" smtClean="0">
               <a:latin typeface="Consolas" pitchFamily="49" charset="0"/>
               <a:cs typeface="Consolas" pitchFamily="49" charset="0"/>
             </a:endParaRPr>
           </a:p>
           <a:p>
             <a:r>
-              <a:rPr lang="ru-RU" dirty="0" smtClean="0"/>
+              <a:rPr lang="ru-RU" sz="2300" dirty="0" smtClean="0"/>
               <a:t>Компоновка единиц трансляции</a:t>
             </a:r>
-            <a:endParaRPr lang="en-US" dirty="0" smtClean="0"/>
+            <a:endParaRPr lang="en-US" sz="2300" dirty="0" smtClean="0"/>
           </a:p>
           <a:p>
             <a:pPr>
               <a:buNone/>
             </a:pPr>
             <a:r>
-              <a:rPr lang="en-US" sz="2600" dirty="0" smtClean="0">
+              <a:rPr lang="en-US" sz="2300" dirty="0" smtClean="0">
                 <a:latin typeface="Consolas" pitchFamily="49" charset="0"/>
                 <a:cs typeface="Consolas" pitchFamily="49" charset="0"/>
               </a:rPr>
@@ -8381,20 +8826,20 @@
               <a:buNone/>
             </a:pPr>
             <a:r>
-              <a:rPr lang="en-US" sz="2600" dirty="0" smtClean="0">
+              <a:rPr lang="en-US" sz="2300" dirty="0" smtClean="0">
                 <a:latin typeface="Consolas" pitchFamily="49" charset="0"/>
                 <a:cs typeface="Consolas" pitchFamily="49" charset="0"/>
               </a:rPr>
               <a:t>   3.obj, 4.obj -&gt; </a:t>
             </a:r>
             <a:r>
-              <a:rPr lang="en-US" sz="2600" dirty="0" err="1" smtClean="0">
+              <a:rPr lang="en-US" sz="2300" dirty="0" err="1" smtClean="0">
                 <a:latin typeface="Consolas" pitchFamily="49" charset="0"/>
                 <a:cs typeface="Consolas" pitchFamily="49" charset="0"/>
               </a:rPr>
               <a:t>super.so</a:t>
             </a:r>
-            <a:endParaRPr lang="en-US" sz="2600" dirty="0" smtClean="0">
+            <a:endParaRPr lang="en-US" sz="2300" dirty="0" smtClean="0">
               <a:latin typeface="Consolas" pitchFamily="49" charset="0"/>
               <a:cs typeface="Consolas" pitchFamily="49" charset="0"/>
             </a:endParaRPr>
@@ -8403,7 +8848,7 @@
             <a:pPr>
               <a:buNone/>
             </a:pPr>
-            <a:endParaRPr lang="en-US" sz="2600" dirty="0" smtClean="0">
+            <a:endParaRPr lang="en-US" sz="2300" dirty="0" smtClean="0">
               <a:latin typeface="Consolas" pitchFamily="49" charset="0"/>
               <a:cs typeface="Consolas" pitchFamily="49" charset="0"/>
             </a:endParaRPr>
@@ -8412,72 +8857,7 @@
             <a:pPr>
               <a:buNone/>
             </a:pPr>
-            <a:endParaRPr lang="en-US" sz="2600" dirty="0" smtClean="0">
-              <a:latin typeface="Consolas" pitchFamily="49" charset="0"/>
-              <a:cs typeface="Consolas" pitchFamily="49" charset="0"/>
-            </a:endParaRPr>
-          </a:p>
-          <a:p>
-            <a:pPr>
-              <a:buNone/>
-            </a:pPr>
-            <a:endParaRPr lang="en-US" sz="2600" dirty="0" smtClean="0">
-              <a:latin typeface="Consolas" pitchFamily="49" charset="0"/>
-              <a:cs typeface="Consolas" pitchFamily="49" charset="0"/>
-            </a:endParaRPr>
-          </a:p>
-          <a:p>
-            <a:pPr>
-              <a:buNone/>
-            </a:pPr>
-            <a:endParaRPr lang="en-US" sz="2600" dirty="0" smtClean="0">
-              <a:latin typeface="Consolas" pitchFamily="49" charset="0"/>
-              <a:cs typeface="Consolas" pitchFamily="49" charset="0"/>
-            </a:endParaRPr>
-          </a:p>
-          <a:p>
-            <a:pPr>
-              <a:buNone/>
-            </a:pPr>
-            <a:r>
-              <a:rPr lang="en-US" sz="2400" dirty="0" smtClean="0"/>
-              <a:t>http://ru.wikipedia.org/wiki/</a:t>
-            </a:r>
-            <a:r>
-              <a:rPr lang="ru-RU" sz="2400" dirty="0" err="1" smtClean="0"/>
-              <a:t>Единица_трансляции</a:t>
-            </a:r>
-            <a:r>
-              <a:rPr lang="ru-RU" sz="2400" dirty="0" smtClean="0"/>
-              <a:t>‎</a:t>
-            </a:r>
-            <a:endParaRPr lang="en-US" sz="2600" dirty="0" smtClean="0">
-              <a:latin typeface="Consolas" pitchFamily="49" charset="0"/>
-              <a:cs typeface="Consolas" pitchFamily="49" charset="0"/>
-            </a:endParaRPr>
-          </a:p>
-          <a:p>
-            <a:pPr>
-              <a:buNone/>
-            </a:pPr>
-            <a:r>
-              <a:rPr lang="en-US" sz="2600" dirty="0" smtClean="0">
-                <a:latin typeface="Consolas" pitchFamily="49" charset="0"/>
-                <a:cs typeface="Consolas" pitchFamily="49" charset="0"/>
-                <a:hlinkClick r:id="rId2"/>
-              </a:rPr>
-              <a:t>http://habrahabr.ru/post/155201/</a:t>
-            </a:r>
-            <a:endParaRPr lang="en-US" sz="2600" dirty="0" smtClean="0">
-              <a:latin typeface="Consolas" pitchFamily="49" charset="0"/>
-              <a:cs typeface="Consolas" pitchFamily="49" charset="0"/>
-            </a:endParaRPr>
-          </a:p>
-          <a:p>
-            <a:pPr>
-              <a:buNone/>
-            </a:pPr>
-            <a:endParaRPr lang="en-US" sz="2600" dirty="0">
+            <a:endParaRPr lang="en-US" sz="2300" dirty="0">
               <a:latin typeface="Consolas" pitchFamily="49" charset="0"/>
               <a:cs typeface="Consolas" pitchFamily="49" charset="0"/>
             </a:endParaRPr>
@@ -8493,7 +8873,7 @@
           <p:nvPr/>
         </p:nvGraphicFramePr>
         <p:xfrm>
-          <a:off x="533400" y="2438400"/>
+          <a:off x="533400" y="2484120"/>
           <a:ext cx="8001000" cy="640080"/>
         </p:xfrm>
         <a:graphic>
@@ -8565,7 +8945,7 @@
           <p:nvPr/>
         </p:nvGraphicFramePr>
         <p:xfrm>
-          <a:off x="533400" y="4419600"/>
+          <a:off x="533400" y="4617720"/>
           <a:ext cx="8001000" cy="640080"/>
         </p:xfrm>
         <a:graphic>
@@ -8695,11 +9075,108 @@
           </a:graphicData>
         </a:graphic>
       </p:graphicFrame>
+      <p:cxnSp>
+        <p:nvCxnSpPr>
+          <p:cNvPr id="6" name="Прямая соединительная линия 5"/>
+          <p:cNvCxnSpPr/>
+          <p:nvPr/>
+        </p:nvCxnSpPr>
+        <p:spPr>
+          <a:xfrm>
+            <a:off x="3581400" y="6019800"/>
+            <a:ext cx="5181600" cy="0"/>
+          </a:xfrm>
+          <a:prstGeom prst="line">
+            <a:avLst/>
+          </a:prstGeom>
+        </p:spPr>
+        <p:style>
+          <a:lnRef idx="1">
+            <a:schemeClr val="accent1"/>
+          </a:lnRef>
+          <a:fillRef idx="0">
+            <a:schemeClr val="accent1"/>
+          </a:fillRef>
+          <a:effectRef idx="0">
+            <a:schemeClr val="accent1"/>
+          </a:effectRef>
+          <a:fontRef idx="minor">
+            <a:schemeClr val="tx1"/>
+          </a:fontRef>
+        </p:style>
+      </p:cxnSp>
+      <p:sp>
+        <p:nvSpPr>
+          <p:cNvPr id="7" name="Прямоугольник 6"/>
+          <p:cNvSpPr/>
+          <p:nvPr/>
+        </p:nvSpPr>
+        <p:spPr>
+          <a:xfrm>
+            <a:off x="1676400" y="6096000"/>
+            <a:ext cx="7162800" cy="677108"/>
+          </a:xfrm>
+          <a:prstGeom prst="rect">
+            <a:avLst/>
+          </a:prstGeom>
+        </p:spPr>
+        <p:txBody>
+          <a:bodyPr wrap="square">
+            <a:spAutoFit/>
+          </a:bodyPr>
+          <a:lstStyle/>
+          <a:p>
+            <a:pPr algn="r">
+              <a:buNone/>
+            </a:pPr>
+            <a:r>
+              <a:rPr lang="en-US" dirty="0" smtClean="0"/>
+              <a:t>http://ru.wikipedia.org/wiki/</a:t>
+            </a:r>
+            <a:r>
+              <a:rPr lang="ru-RU" dirty="0" err="1" smtClean="0"/>
+              <a:t>Единица_трансляции</a:t>
+            </a:r>
+            <a:r>
+              <a:rPr lang="ru-RU" dirty="0" smtClean="0"/>
+              <a:t>‎</a:t>
+            </a:r>
+            <a:endParaRPr lang="en-US" sz="2000" dirty="0" smtClean="0">
+              <a:latin typeface="Consolas" pitchFamily="49" charset="0"/>
+              <a:cs typeface="Consolas" pitchFamily="49" charset="0"/>
+            </a:endParaRPr>
+          </a:p>
+          <a:p>
+            <a:pPr algn="r">
+              <a:buNone/>
+            </a:pPr>
+            <a:r>
+              <a:rPr lang="en-US" sz="2000" dirty="0" smtClean="0">
+                <a:latin typeface="Consolas" pitchFamily="49" charset="0"/>
+                <a:cs typeface="Consolas" pitchFamily="49" charset="0"/>
+                <a:hlinkClick r:id="rId2"/>
+              </a:rPr>
+              <a:t>http://habrahabr.ru/post/155201/</a:t>
+            </a:r>
+            <a:endParaRPr lang="en-US" sz="2000" dirty="0" smtClean="0">
+              <a:latin typeface="Consolas" pitchFamily="49" charset="0"/>
+              <a:cs typeface="Consolas" pitchFamily="49" charset="0"/>
+            </a:endParaRPr>
+          </a:p>
+        </p:txBody>
+      </p:sp>
     </p:spTree>
   </p:cSld>
   <p:clrMapOvr>
     <a:masterClrMapping/>
   </p:clrMapOvr>
+  <p:timing>
+    <p:tnLst>
+      <p:par>
+        <p:cTn id="1" dur="indefinite" restart="never" nodeType="tmRoot"/>
+      </p:par>
+    </p:tnLst>
+  </p:timing>
 </p:sld>
 </file>
 
@@ -8749,289 +9226,212 @@
           </a:p>
         </p:txBody>
       </p:sp>
-      <p:graphicFrame>
-        <p:nvGraphicFramePr>
-          <p:cNvPr id="4" name="Content Placeholder 3"/>
-          <p:cNvGraphicFramePr>
-            <a:graphicFrameLocks noGrp="1"/>
-          </p:cNvGraphicFramePr>
-          <p:nvPr>
-            <p:ph idx="1"/>
-          </p:nvPr>
-        </p:nvGraphicFramePr>
-        <p:xfrm>
-          <a:off x="457200" y="1600200"/>
-          <a:ext cx="8229600" cy="3108960"/>
-        </p:xfrm>
-        <a:graphic>
-          <a:graphicData uri="http://schemas.openxmlformats.org/drawingml/2006/table">
-            <a:tbl>
-              <a:tblPr firstRow="1" bandRow="1">
-                <a:tableStyleId>{5C22544A-7EE6-4342-B048-85BDC9FD1C3A}</a:tableStyleId>
-              </a:tblPr>
-              <a:tblGrid>
-                <a:gridCol w="8229600"/>
-              </a:tblGrid>
-              <a:tr h="370840">
-                <a:tc>
-                  <a:txBody>
-                    <a:bodyPr/>
-                    <a:lstStyle/>
-                    <a:p>
-                      <a:r>
-                        <a:rPr lang="en-US" sz="1800" b="0" kern="1200" dirty="0" err="1" smtClean="0">
-                          <a:solidFill>
-                            <a:schemeClr val="lt1"/>
-                          </a:solidFill>
-                          <a:latin typeface="+mn-lt"/>
-                          <a:ea typeface="+mn-ea"/>
-                          <a:cs typeface="+mn-cs"/>
-                        </a:rPr>
-                        <a:t>int</a:t>
-                      </a:r>
-                      <a:r>
-                        <a:rPr lang="en-US" sz="1800" b="0" kern="1200" dirty="0" smtClean="0">
-                          <a:solidFill>
-                            <a:schemeClr val="lt1"/>
-                          </a:solidFill>
-                          <a:latin typeface="+mn-lt"/>
-                          <a:ea typeface="+mn-ea"/>
-                          <a:cs typeface="+mn-cs"/>
-                        </a:rPr>
-                        <a:t> f( </a:t>
-                      </a:r>
-                      <a:r>
-                        <a:rPr lang="en-US" sz="1800" b="0" kern="1200" dirty="0" err="1" smtClean="0">
-                          <a:solidFill>
-                            <a:schemeClr val="lt1"/>
-                          </a:solidFill>
-                          <a:latin typeface="+mn-lt"/>
-                          <a:ea typeface="+mn-ea"/>
-                          <a:cs typeface="+mn-cs"/>
-                        </a:rPr>
-                        <a:t>int</a:t>
-                      </a:r>
-                      <a:r>
-                        <a:rPr lang="en-US" sz="1800" b="0" kern="1200" dirty="0" smtClean="0">
-                          <a:solidFill>
-                            <a:schemeClr val="lt1"/>
-                          </a:solidFill>
-                          <a:latin typeface="+mn-lt"/>
-                          <a:ea typeface="+mn-ea"/>
-                          <a:cs typeface="+mn-cs"/>
-                        </a:rPr>
-                        <a:t> r)</a:t>
-                      </a:r>
-                    </a:p>
-                    <a:p>
-                      <a:r>
-                        <a:rPr lang="en-US" sz="1800" b="0" kern="1200" dirty="0" smtClean="0">
-                          <a:solidFill>
-                            <a:schemeClr val="lt1"/>
-                          </a:solidFill>
-                          <a:latin typeface="+mn-lt"/>
-                          <a:ea typeface="+mn-ea"/>
-                          <a:cs typeface="+mn-cs"/>
-                        </a:rPr>
-                        <a:t>{</a:t>
-                      </a:r>
-                    </a:p>
-                    <a:p>
-                      <a:r>
-                        <a:rPr lang="en-US" sz="1800" b="0" kern="1200" dirty="0" smtClean="0">
-                          <a:solidFill>
-                            <a:schemeClr val="lt1"/>
-                          </a:solidFill>
-                          <a:latin typeface="+mn-lt"/>
-                          <a:ea typeface="+mn-ea"/>
-                          <a:cs typeface="+mn-cs"/>
-                        </a:rPr>
-                        <a:t>}</a:t>
-                      </a:r>
-                    </a:p>
-                    <a:p>
-                      <a:endParaRPr lang="en-US" sz="1800" b="0" kern="1200" dirty="0" smtClean="0">
-                        <a:solidFill>
-                          <a:schemeClr val="lt1"/>
-                        </a:solidFill>
-                        <a:latin typeface="+mn-lt"/>
-                        <a:ea typeface="+mn-ea"/>
-                        <a:cs typeface="+mn-cs"/>
-                      </a:endParaRPr>
-                    </a:p>
-                    <a:p>
-                      <a:r>
-                        <a:rPr lang="en-US" sz="1800" b="0" kern="1200" dirty="0" smtClean="0">
-                          <a:solidFill>
-                            <a:schemeClr val="lt1"/>
-                          </a:solidFill>
-                          <a:latin typeface="+mn-lt"/>
-                          <a:ea typeface="+mn-ea"/>
-                          <a:cs typeface="+mn-cs"/>
-                        </a:rPr>
-                        <a:t>void f( </a:t>
-                      </a:r>
-                      <a:r>
-                        <a:rPr lang="en-US" sz="1800" b="0" kern="1200" dirty="0" err="1" smtClean="0">
-                          <a:solidFill>
-                            <a:schemeClr val="lt1"/>
-                          </a:solidFill>
-                          <a:latin typeface="+mn-lt"/>
-                          <a:ea typeface="+mn-ea"/>
-                          <a:cs typeface="+mn-cs"/>
-                        </a:rPr>
-                        <a:t>int</a:t>
-                      </a:r>
-                      <a:r>
-                        <a:rPr lang="en-US" sz="1800" b="0" kern="1200" dirty="0" smtClean="0">
-                          <a:solidFill>
-                            <a:schemeClr val="lt1"/>
-                          </a:solidFill>
-                          <a:latin typeface="+mn-lt"/>
-                          <a:ea typeface="+mn-ea"/>
-                          <a:cs typeface="+mn-cs"/>
-                        </a:rPr>
-                        <a:t> e )</a:t>
-                      </a:r>
-                    </a:p>
-                    <a:p>
-                      <a:r>
-                        <a:rPr lang="en-US" sz="1800" b="0" kern="1200" dirty="0" smtClean="0">
-                          <a:solidFill>
-                            <a:schemeClr val="lt1"/>
-                          </a:solidFill>
-                          <a:latin typeface="+mn-lt"/>
-                          <a:ea typeface="+mn-ea"/>
-                          <a:cs typeface="+mn-cs"/>
-                        </a:rPr>
-                        <a:t>{</a:t>
-                      </a:r>
-                    </a:p>
-                    <a:p>
-                      <a:r>
-                        <a:rPr lang="en-US" sz="1800" b="0" kern="1200" dirty="0" smtClean="0">
-                          <a:solidFill>
-                            <a:schemeClr val="lt1"/>
-                          </a:solidFill>
-                          <a:latin typeface="+mn-lt"/>
-                          <a:ea typeface="+mn-ea"/>
-                          <a:cs typeface="+mn-cs"/>
-                        </a:rPr>
-                        <a:t>}</a:t>
-                      </a:r>
-                    </a:p>
-                    <a:p>
-                      <a:endParaRPr lang="ru-RU" b="0" dirty="0" smtClean="0"/>
-                    </a:p>
-                    <a:p>
-                      <a:r>
-                        <a:rPr lang="en-US" sz="1800" b="0" kern="1200" dirty="0" smtClean="0">
-                          <a:solidFill>
-                            <a:schemeClr val="lt1"/>
-                          </a:solidFill>
-                          <a:latin typeface="+mn-lt"/>
-                          <a:ea typeface="+mn-ea"/>
-                          <a:cs typeface="+mn-cs"/>
-                        </a:rPr>
-                        <a:t>ERROR:: 'void f(</a:t>
-                      </a:r>
-                      <a:r>
-                        <a:rPr lang="en-US" sz="1800" b="0" kern="1200" dirty="0" err="1" smtClean="0">
-                          <a:solidFill>
-                            <a:schemeClr val="lt1"/>
-                          </a:solidFill>
-                          <a:latin typeface="+mn-lt"/>
-                          <a:ea typeface="+mn-ea"/>
-                          <a:cs typeface="+mn-cs"/>
-                        </a:rPr>
-                        <a:t>int</a:t>
-                      </a:r>
-                      <a:r>
-                        <a:rPr lang="en-US" sz="1800" b="0" kern="1200" dirty="0" smtClean="0">
-                          <a:solidFill>
-                            <a:schemeClr val="lt1"/>
-                          </a:solidFill>
-                          <a:latin typeface="+mn-lt"/>
-                          <a:ea typeface="+mn-ea"/>
-                          <a:cs typeface="+mn-cs"/>
-                        </a:rPr>
-                        <a:t>)' : overloaded function differs only by return type from '</a:t>
-                      </a:r>
-                      <a:r>
-                        <a:rPr lang="en-US" sz="1800" b="0" kern="1200" dirty="0" err="1" smtClean="0">
-                          <a:solidFill>
-                            <a:schemeClr val="lt1"/>
-                          </a:solidFill>
-                          <a:latin typeface="+mn-lt"/>
-                          <a:ea typeface="+mn-ea"/>
-                          <a:cs typeface="+mn-cs"/>
-                        </a:rPr>
-                        <a:t>int</a:t>
-                      </a:r>
-                      <a:r>
-                        <a:rPr lang="en-US" sz="1800" b="0" kern="1200" dirty="0" smtClean="0">
-                          <a:solidFill>
-                            <a:schemeClr val="lt1"/>
-                          </a:solidFill>
-                          <a:latin typeface="+mn-lt"/>
-                          <a:ea typeface="+mn-ea"/>
-                          <a:cs typeface="+mn-cs"/>
-                        </a:rPr>
-                        <a:t> f(</a:t>
-                      </a:r>
-                      <a:r>
-                        <a:rPr lang="en-US" sz="1800" b="0" kern="1200" dirty="0" err="1" smtClean="0">
-                          <a:solidFill>
-                            <a:schemeClr val="lt1"/>
-                          </a:solidFill>
-                          <a:latin typeface="+mn-lt"/>
-                          <a:ea typeface="+mn-ea"/>
-                          <a:cs typeface="+mn-cs"/>
-                        </a:rPr>
-                        <a:t>int</a:t>
-                      </a:r>
-                      <a:r>
-                        <a:rPr lang="en-US" sz="1800" b="0" kern="1200" dirty="0" smtClean="0">
-                          <a:solidFill>
-                            <a:schemeClr val="lt1"/>
-                          </a:solidFill>
-                          <a:latin typeface="+mn-lt"/>
-                          <a:ea typeface="+mn-ea"/>
-                          <a:cs typeface="+mn-cs"/>
-                        </a:rPr>
-                        <a:t>)‘</a:t>
-                      </a:r>
-                      <a:endParaRPr lang="ru-RU" sz="1800" b="0" kern="1200" dirty="0" smtClean="0">
-                        <a:solidFill>
-                          <a:schemeClr val="lt1"/>
-                        </a:solidFill>
-                        <a:latin typeface="+mn-lt"/>
-                        <a:ea typeface="+mn-ea"/>
-                        <a:cs typeface="+mn-cs"/>
-                      </a:endParaRPr>
-                    </a:p>
-                    <a:p>
-                      <a:r>
-                        <a:rPr lang="en-US" b="0" dirty="0" smtClean="0"/>
-                        <a:t> </a:t>
-                      </a:r>
-                    </a:p>
-                    <a:p>
-                      <a:endParaRPr lang="en-US" b="0" dirty="0"/>
-                    </a:p>
-                  </a:txBody>
-                  <a:tcPr/>
-                </a:tc>
-              </a:tr>
-            </a:tbl>
-          </a:graphicData>
-        </a:graphic>
-      </p:graphicFrame>
+      <p:sp>
+        <p:nvSpPr>
+          <p:cNvPr id="5" name="Скругленный прямоугольник 4"/>
+          <p:cNvSpPr/>
+          <p:nvPr/>
+        </p:nvSpPr>
+        <p:spPr>
+          <a:xfrm>
+            <a:off x="304800" y="1600200"/>
+            <a:ext cx="8534400" cy="3276600"/>
+          </a:xfrm>
+          <a:prstGeom prst="roundRect">
+            <a:avLst/>
+          </a:prstGeom>
+        </p:spPr>
+        <p:style>
+          <a:lnRef idx="2">
+            <a:schemeClr val="accent1">
+              <a:shade val="50000"/>
+            </a:schemeClr>
+          </a:lnRef>
+          <a:fillRef idx="1">
+            <a:schemeClr val="accent1"/>
+          </a:fillRef>
+          <a:effectRef idx="0">
+            <a:schemeClr val="accent1"/>
+          </a:effectRef>
+          <a:fontRef idx="minor">
+            <a:schemeClr val="lt1"/>
+          </a:fontRef>
+        </p:style>
+        <p:txBody>
+          <a:bodyPr rtlCol="0" anchor="ctr"/>
+          <a:lstStyle/>
+          <a:p>
+            <a:r>
+              <a:rPr lang="en-US" dirty="0" err="1" smtClean="0">
+                <a:latin typeface="Consolas" pitchFamily="49" charset="0"/>
+                <a:cs typeface="Consolas" pitchFamily="49" charset="0"/>
+              </a:rPr>
+              <a:t>int</a:t>
+            </a:r>
+            <a:r>
+              <a:rPr lang="en-US" dirty="0" smtClean="0">
+                <a:latin typeface="Consolas" pitchFamily="49" charset="0"/>
+                <a:cs typeface="Consolas" pitchFamily="49" charset="0"/>
+              </a:rPr>
+              <a:t> f( </a:t>
+            </a:r>
+            <a:r>
+              <a:rPr lang="en-US" dirty="0" err="1" smtClean="0">
+                <a:latin typeface="Consolas" pitchFamily="49" charset="0"/>
+                <a:cs typeface="Consolas" pitchFamily="49" charset="0"/>
+              </a:rPr>
+              <a:t>int</a:t>
+            </a:r>
+            <a:r>
+              <a:rPr lang="en-US" dirty="0" smtClean="0">
+                <a:latin typeface="Consolas" pitchFamily="49" charset="0"/>
+                <a:cs typeface="Consolas" pitchFamily="49" charset="0"/>
+              </a:rPr>
+              <a:t> r)</a:t>
+            </a:r>
+          </a:p>
+          <a:p>
+            <a:r>
+              <a:rPr lang="en-US" dirty="0" smtClean="0">
+                <a:latin typeface="Consolas" pitchFamily="49" charset="0"/>
+                <a:cs typeface="Consolas" pitchFamily="49" charset="0"/>
+              </a:rPr>
+              <a:t>{</a:t>
+            </a:r>
+          </a:p>
+          <a:p>
+            <a:r>
+              <a:rPr lang="en-US" dirty="0" smtClean="0">
+                <a:latin typeface="Consolas" pitchFamily="49" charset="0"/>
+                <a:cs typeface="Consolas" pitchFamily="49" charset="0"/>
+              </a:rPr>
+              <a:t>}</a:t>
+            </a:r>
+          </a:p>
+          <a:p>
+            <a:endParaRPr lang="en-US" dirty="0" smtClean="0">
+              <a:latin typeface="Consolas" pitchFamily="49" charset="0"/>
+              <a:cs typeface="Consolas" pitchFamily="49" charset="0"/>
+            </a:endParaRPr>
+          </a:p>
+          <a:p>
+            <a:r>
+              <a:rPr lang="en-US" dirty="0" smtClean="0">
+                <a:latin typeface="Consolas" pitchFamily="49" charset="0"/>
+                <a:cs typeface="Consolas" pitchFamily="49" charset="0"/>
+              </a:rPr>
+              <a:t>void f( </a:t>
+            </a:r>
+            <a:r>
+              <a:rPr lang="en-US" dirty="0" err="1" smtClean="0">
+                <a:latin typeface="Consolas" pitchFamily="49" charset="0"/>
+                <a:cs typeface="Consolas" pitchFamily="49" charset="0"/>
+              </a:rPr>
+              <a:t>int</a:t>
+            </a:r>
+            <a:r>
+              <a:rPr lang="en-US" dirty="0" smtClean="0">
+                <a:latin typeface="Consolas" pitchFamily="49" charset="0"/>
+                <a:cs typeface="Consolas" pitchFamily="49" charset="0"/>
+              </a:rPr>
+              <a:t> e )</a:t>
+            </a:r>
+          </a:p>
+          <a:p>
+            <a:r>
+              <a:rPr lang="en-US" dirty="0" smtClean="0">
+                <a:latin typeface="Consolas" pitchFamily="49" charset="0"/>
+                <a:cs typeface="Consolas" pitchFamily="49" charset="0"/>
+              </a:rPr>
+              <a:t>{</a:t>
+            </a:r>
+          </a:p>
+          <a:p>
+            <a:r>
+              <a:rPr lang="en-US" dirty="0" smtClean="0">
+                <a:latin typeface="Consolas" pitchFamily="49" charset="0"/>
+                <a:cs typeface="Consolas" pitchFamily="49" charset="0"/>
+              </a:rPr>
+              <a:t>}</a:t>
+            </a:r>
+          </a:p>
+          <a:p>
+            <a:endParaRPr lang="ru-RU" dirty="0" smtClean="0">
+              <a:latin typeface="Consolas" pitchFamily="49" charset="0"/>
+              <a:cs typeface="Consolas" pitchFamily="49" charset="0"/>
+            </a:endParaRPr>
+          </a:p>
+          <a:p>
+            <a:r>
+              <a:rPr lang="en-US" dirty="0" smtClean="0">
+                <a:latin typeface="Consolas" pitchFamily="49" charset="0"/>
+                <a:cs typeface="Consolas" pitchFamily="49" charset="0"/>
+              </a:rPr>
+              <a:t>ERROR:: 'void f(</a:t>
+            </a:r>
+            <a:r>
+              <a:rPr lang="en-US" dirty="0" err="1" smtClean="0">
+                <a:latin typeface="Consolas" pitchFamily="49" charset="0"/>
+                <a:cs typeface="Consolas" pitchFamily="49" charset="0"/>
+              </a:rPr>
+              <a:t>int</a:t>
+            </a:r>
+            <a:r>
+              <a:rPr lang="en-US" dirty="0" smtClean="0">
+                <a:latin typeface="Consolas" pitchFamily="49" charset="0"/>
+                <a:cs typeface="Consolas" pitchFamily="49" charset="0"/>
+              </a:rPr>
+              <a:t>)' : overloaded function differs only by return type from '</a:t>
+            </a:r>
+            <a:r>
+              <a:rPr lang="en-US" dirty="0" err="1" smtClean="0">
+                <a:latin typeface="Consolas" pitchFamily="49" charset="0"/>
+                <a:cs typeface="Consolas" pitchFamily="49" charset="0"/>
+              </a:rPr>
+              <a:t>int</a:t>
+            </a:r>
+            <a:r>
+              <a:rPr lang="en-US" dirty="0" smtClean="0">
+                <a:latin typeface="Consolas" pitchFamily="49" charset="0"/>
+                <a:cs typeface="Consolas" pitchFamily="49" charset="0"/>
+              </a:rPr>
+              <a:t> f(</a:t>
+            </a:r>
+            <a:r>
+              <a:rPr lang="en-US" dirty="0" err="1" smtClean="0">
+                <a:latin typeface="Consolas" pitchFamily="49" charset="0"/>
+                <a:cs typeface="Consolas" pitchFamily="49" charset="0"/>
+              </a:rPr>
+              <a:t>int</a:t>
+            </a:r>
+            <a:r>
+              <a:rPr lang="en-US" dirty="0" smtClean="0">
+                <a:latin typeface="Consolas" pitchFamily="49" charset="0"/>
+                <a:cs typeface="Consolas" pitchFamily="49" charset="0"/>
+              </a:rPr>
+              <a:t>)‘</a:t>
+            </a:r>
+          </a:p>
+          <a:p>
+            <a:endParaRPr lang="en-US" dirty="0">
+              <a:latin typeface="Consolas" pitchFamily="49" charset="0"/>
+              <a:cs typeface="Consolas" pitchFamily="49" charset="0"/>
+            </a:endParaRPr>
+          </a:p>
+        </p:txBody>
+      </p:sp>
     </p:spTree>
   </p:cSld>
   <p:clrMapOvr>
     <a:masterClrMapping/>
   </p:clrMapOvr>
+  <p:timing>
+    <p:tnLst>
+      <p:par>
+        <p:cTn id="1" dur="indefinite" restart="never" nodeType="tmRoot"/>
+      </p:par>
+    </p:tnLst>
+  </p:timing>
 </p:sld>
 </file>
 
@@ -9081,473 +9481,333 @@
           </a:p>
         </p:txBody>
       </p:sp>
-      <p:graphicFrame>
-        <p:nvGraphicFramePr>
-          <p:cNvPr id="4" name="Content Placeholder 3"/>
-          <p:cNvGraphicFramePr>
-            <a:graphicFrameLocks noGrp="1"/>
-          </p:cNvGraphicFramePr>
-          <p:nvPr>
-            <p:ph idx="1"/>
-          </p:nvPr>
-        </p:nvGraphicFramePr>
-        <p:xfrm>
-          <a:off x="457200" y="1600200"/>
-          <a:ext cx="8229600" cy="5029200"/>
-        </p:xfrm>
-        <a:graphic>
-          <a:graphicData uri="http://schemas.openxmlformats.org/drawingml/2006/table">
-            <a:tbl>
-              <a:tblPr firstRow="1" bandRow="1">
-                <a:tableStyleId>{5C22544A-7EE6-4342-B048-85BDC9FD1C3A}</a:tableStyleId>
-              </a:tblPr>
-              <a:tblGrid>
-                <a:gridCol w="8229600"/>
-              </a:tblGrid>
-              <a:tr h="370840">
-                <a:tc>
-                  <a:txBody>
-                    <a:bodyPr/>
-                    <a:lstStyle/>
-                    <a:p>
-                      <a:r>
-                        <a:rPr lang="en-US" b="0" dirty="0" smtClean="0"/>
-                        <a:t>//</a:t>
-                      </a:r>
-                      <a:r>
-                        <a:rPr lang="en-US" b="0" baseline="0" dirty="0" smtClean="0"/>
-                        <a:t> </a:t>
-                      </a:r>
-                      <a:r>
-                        <a:rPr lang="en-US" b="0" baseline="0" dirty="0" err="1" smtClean="0"/>
-                        <a:t>a.h</a:t>
-                      </a:r>
-                      <a:endParaRPr lang="en-US" b="0" baseline="0" dirty="0" smtClean="0"/>
-                    </a:p>
-                    <a:p>
-                      <a:pPr marL="0" marR="0" indent="0" algn="l" defTabSz="914400" rtl="0" eaLnBrk="1" fontAlgn="auto" latinLnBrk="0" hangingPunct="1">
-                        <a:lnSpc>
-                          <a:spcPct val="100000"/>
-                        </a:lnSpc>
-                        <a:spcBef>
-                          <a:spcPts val="0"/>
-                        </a:spcBef>
-                        <a:spcAft>
-                          <a:spcPts val="0"/>
-                        </a:spcAft>
-                        <a:buClrTx/>
-                        <a:buSzTx/>
-                        <a:buFontTx/>
-                        <a:buNone/>
-                        <a:tabLst/>
-                        <a:defRPr/>
-                      </a:pPr>
-                      <a:r>
-                        <a:rPr lang="en-US" sz="1800" b="0" kern="1200" dirty="0" err="1" smtClean="0">
-                          <a:solidFill>
-                            <a:schemeClr val="lt1"/>
-                          </a:solidFill>
-                          <a:latin typeface="+mn-lt"/>
-                          <a:ea typeface="+mn-ea"/>
-                          <a:cs typeface="+mn-cs"/>
-                        </a:rPr>
-                        <a:t>int</a:t>
-                      </a:r>
-                      <a:r>
-                        <a:rPr lang="en-US" sz="1800" b="0" kern="1200" dirty="0" smtClean="0">
-                          <a:solidFill>
-                            <a:schemeClr val="lt1"/>
-                          </a:solidFill>
-                          <a:latin typeface="+mn-lt"/>
-                          <a:ea typeface="+mn-ea"/>
-                          <a:cs typeface="+mn-cs"/>
-                        </a:rPr>
-                        <a:t> f( </a:t>
-                      </a:r>
-                      <a:r>
-                        <a:rPr lang="en-US" sz="1800" b="0" kern="1200" dirty="0" err="1" smtClean="0">
-                          <a:solidFill>
-                            <a:schemeClr val="lt1"/>
-                          </a:solidFill>
-                          <a:latin typeface="+mn-lt"/>
-                          <a:ea typeface="+mn-ea"/>
-                          <a:cs typeface="+mn-cs"/>
-                        </a:rPr>
-                        <a:t>int</a:t>
-                      </a:r>
-                      <a:r>
-                        <a:rPr lang="en-US" sz="1800" b="0" kern="1200" dirty="0" smtClean="0">
-                          <a:solidFill>
-                            <a:schemeClr val="lt1"/>
-                          </a:solidFill>
-                          <a:latin typeface="+mn-lt"/>
-                          <a:ea typeface="+mn-ea"/>
-                          <a:cs typeface="+mn-cs"/>
-                        </a:rPr>
-                        <a:t> x ); // comment</a:t>
-                      </a:r>
-                      <a:r>
-                        <a:rPr lang="en-US" sz="1800" b="0" kern="1200" baseline="0" dirty="0" smtClean="0">
-                          <a:solidFill>
-                            <a:schemeClr val="lt1"/>
-                          </a:solidFill>
-                          <a:latin typeface="+mn-lt"/>
-                          <a:ea typeface="+mn-ea"/>
-                          <a:cs typeface="+mn-cs"/>
-                        </a:rPr>
-                        <a:t> to delete error</a:t>
-                      </a:r>
-                      <a:endParaRPr lang="en-US" sz="1800" b="0" kern="1200" dirty="0" smtClean="0">
-                        <a:solidFill>
-                          <a:schemeClr val="lt1"/>
-                        </a:solidFill>
-                        <a:latin typeface="+mn-lt"/>
-                        <a:ea typeface="+mn-ea"/>
-                        <a:cs typeface="+mn-cs"/>
-                      </a:endParaRPr>
-                    </a:p>
-                    <a:p>
-                      <a:endParaRPr lang="en-US" b="0" baseline="0" dirty="0" smtClean="0"/>
-                    </a:p>
-                    <a:p>
-                      <a:r>
-                        <a:rPr lang="en-US" b="0" baseline="0" dirty="0" smtClean="0"/>
-                        <a:t>// a.cpp</a:t>
-                      </a:r>
-                    </a:p>
-                    <a:p>
-                      <a:r>
-                        <a:rPr lang="en-US" sz="1800" b="0" kern="1200" dirty="0" err="1" smtClean="0">
-                          <a:solidFill>
-                            <a:schemeClr val="lt1"/>
-                          </a:solidFill>
-                          <a:latin typeface="+mn-lt"/>
-                          <a:ea typeface="+mn-ea"/>
-                          <a:cs typeface="+mn-cs"/>
-                        </a:rPr>
-                        <a:t>int</a:t>
-                      </a:r>
-                      <a:r>
-                        <a:rPr lang="en-US" sz="1800" b="0" kern="1200" dirty="0" smtClean="0">
-                          <a:solidFill>
-                            <a:schemeClr val="lt1"/>
-                          </a:solidFill>
-                          <a:latin typeface="+mn-lt"/>
-                          <a:ea typeface="+mn-ea"/>
-                          <a:cs typeface="+mn-cs"/>
-                        </a:rPr>
-                        <a:t> f( </a:t>
-                      </a:r>
-                      <a:r>
-                        <a:rPr lang="en-US" sz="1800" b="0" kern="1200" dirty="0" err="1" smtClean="0">
-                          <a:solidFill>
-                            <a:schemeClr val="lt1"/>
-                          </a:solidFill>
-                          <a:latin typeface="+mn-lt"/>
-                          <a:ea typeface="+mn-ea"/>
-                          <a:cs typeface="+mn-cs"/>
-                        </a:rPr>
-                        <a:t>int</a:t>
-                      </a:r>
-                      <a:r>
-                        <a:rPr lang="en-US" sz="1800" b="0" kern="1200" dirty="0" smtClean="0">
-                          <a:solidFill>
-                            <a:schemeClr val="lt1"/>
-                          </a:solidFill>
-                          <a:latin typeface="+mn-lt"/>
-                          <a:ea typeface="+mn-ea"/>
-                          <a:cs typeface="+mn-cs"/>
-                        </a:rPr>
-                        <a:t> x )</a:t>
-                      </a:r>
-                    </a:p>
-                    <a:p>
-                      <a:r>
-                        <a:rPr lang="en-US" sz="1800" b="0" kern="1200" dirty="0" smtClean="0">
-                          <a:solidFill>
-                            <a:schemeClr val="lt1"/>
-                          </a:solidFill>
-                          <a:latin typeface="+mn-lt"/>
-                          <a:ea typeface="+mn-ea"/>
-                          <a:cs typeface="+mn-cs"/>
-                        </a:rPr>
-                        <a:t>{</a:t>
-                      </a:r>
-                    </a:p>
-                    <a:p>
-                      <a:r>
-                        <a:rPr lang="en-US" sz="1800" b="0" kern="1200" dirty="0" smtClean="0">
-                          <a:solidFill>
-                            <a:schemeClr val="lt1"/>
-                          </a:solidFill>
-                          <a:latin typeface="+mn-lt"/>
-                          <a:ea typeface="+mn-ea"/>
-                          <a:cs typeface="+mn-cs"/>
-                        </a:rPr>
-                        <a:t>      return x;</a:t>
-                      </a:r>
-                    </a:p>
-                    <a:p>
-                      <a:r>
-                        <a:rPr lang="en-US" sz="1800" b="0" kern="1200" dirty="0" smtClean="0">
-                          <a:solidFill>
-                            <a:schemeClr val="lt1"/>
-                          </a:solidFill>
-                          <a:latin typeface="+mn-lt"/>
-                          <a:ea typeface="+mn-ea"/>
-                          <a:cs typeface="+mn-cs"/>
-                        </a:rPr>
-                        <a:t>};</a:t>
-                      </a:r>
-                    </a:p>
-                    <a:p>
-                      <a:endParaRPr lang="en-US" sz="1800" b="0" kern="1200" baseline="0" dirty="0" smtClean="0">
-                        <a:solidFill>
-                          <a:schemeClr val="lt1"/>
-                        </a:solidFill>
-                        <a:latin typeface="+mn-lt"/>
-                        <a:ea typeface="+mn-ea"/>
-                        <a:cs typeface="+mn-cs"/>
-                      </a:endParaRPr>
-                    </a:p>
-                    <a:p>
-                      <a:r>
-                        <a:rPr lang="en-US" sz="1800" b="0" kern="1200" baseline="0" dirty="0" smtClean="0">
-                          <a:solidFill>
-                            <a:schemeClr val="lt1"/>
-                          </a:solidFill>
-                          <a:latin typeface="+mn-lt"/>
-                          <a:ea typeface="+mn-ea"/>
-                          <a:cs typeface="+mn-cs"/>
-                        </a:rPr>
-                        <a:t>// main.cpp</a:t>
-                      </a:r>
-                    </a:p>
-                    <a:p>
-                      <a:r>
-                        <a:rPr lang="en-US" sz="1800" b="0" kern="1200" dirty="0" smtClean="0">
-                          <a:solidFill>
-                            <a:schemeClr val="lt1"/>
-                          </a:solidFill>
-                          <a:latin typeface="+mn-lt"/>
-                          <a:ea typeface="+mn-ea"/>
-                          <a:cs typeface="+mn-cs"/>
-                        </a:rPr>
-                        <a:t>void f( </a:t>
-                      </a:r>
-                      <a:r>
-                        <a:rPr lang="en-US" sz="1800" b="0" kern="1200" dirty="0" err="1" smtClean="0">
-                          <a:solidFill>
-                            <a:schemeClr val="lt1"/>
-                          </a:solidFill>
-                          <a:latin typeface="+mn-lt"/>
-                          <a:ea typeface="+mn-ea"/>
-                          <a:cs typeface="+mn-cs"/>
-                        </a:rPr>
-                        <a:t>int</a:t>
-                      </a:r>
-                      <a:r>
-                        <a:rPr lang="en-US" sz="1800" b="0" kern="1200" dirty="0" smtClean="0">
-                          <a:solidFill>
-                            <a:schemeClr val="lt1"/>
-                          </a:solidFill>
-                          <a:latin typeface="+mn-lt"/>
-                          <a:ea typeface="+mn-ea"/>
-                          <a:cs typeface="+mn-cs"/>
-                        </a:rPr>
-                        <a:t> e )</a:t>
-                      </a:r>
-                    </a:p>
-                    <a:p>
-                      <a:r>
-                        <a:rPr lang="en-US" sz="1800" b="0" kern="1200" dirty="0" smtClean="0">
-                          <a:solidFill>
-                            <a:schemeClr val="lt1"/>
-                          </a:solidFill>
-                          <a:latin typeface="+mn-lt"/>
-                          <a:ea typeface="+mn-ea"/>
-                          <a:cs typeface="+mn-cs"/>
-                        </a:rPr>
-                        <a:t>{</a:t>
-                      </a:r>
-                    </a:p>
-                    <a:p>
-                      <a:r>
-                        <a:rPr lang="en-US" sz="1800" b="0" kern="1200" dirty="0" smtClean="0">
-                          <a:solidFill>
-                            <a:schemeClr val="lt1"/>
-                          </a:solidFill>
-                          <a:latin typeface="+mn-lt"/>
-                          <a:ea typeface="+mn-ea"/>
-                          <a:cs typeface="+mn-cs"/>
-                        </a:rPr>
-                        <a:t>}</a:t>
-                      </a:r>
-                    </a:p>
-                    <a:p>
-                      <a:r>
-                        <a:rPr lang="en-US" sz="1800" b="0" kern="1200" dirty="0" err="1" smtClean="0">
-                          <a:solidFill>
-                            <a:schemeClr val="lt1"/>
-                          </a:solidFill>
-                          <a:latin typeface="+mn-lt"/>
-                          <a:ea typeface="+mn-ea"/>
-                          <a:cs typeface="+mn-cs"/>
-                        </a:rPr>
-                        <a:t>int</a:t>
-                      </a:r>
-                      <a:r>
-                        <a:rPr lang="en-US" sz="1800" b="0" kern="1200" dirty="0" smtClean="0">
-                          <a:solidFill>
-                            <a:schemeClr val="lt1"/>
-                          </a:solidFill>
-                          <a:latin typeface="+mn-lt"/>
-                          <a:ea typeface="+mn-ea"/>
-                          <a:cs typeface="+mn-cs"/>
-                        </a:rPr>
-                        <a:t> main()</a:t>
-                      </a:r>
-                    </a:p>
-                    <a:p>
-                      <a:r>
-                        <a:rPr lang="en-US" sz="1800" b="0" kern="1200" dirty="0" smtClean="0">
-                          <a:solidFill>
-                            <a:schemeClr val="lt1"/>
-                          </a:solidFill>
-                          <a:latin typeface="+mn-lt"/>
-                          <a:ea typeface="+mn-ea"/>
-                          <a:cs typeface="+mn-cs"/>
-                        </a:rPr>
-                        <a:t>{</a:t>
-                      </a:r>
-                    </a:p>
-                    <a:p>
-                      <a:r>
-                        <a:rPr lang="en-US" sz="1800" b="0" kern="1200" dirty="0" smtClean="0">
-                          <a:solidFill>
-                            <a:schemeClr val="lt1"/>
-                          </a:solidFill>
-                          <a:latin typeface="+mn-lt"/>
-                          <a:ea typeface="+mn-ea"/>
-                          <a:cs typeface="+mn-cs"/>
-                        </a:rPr>
-                        <a:t>     f( 56 );</a:t>
-                      </a:r>
-                    </a:p>
-                    <a:p>
-                      <a:r>
-                        <a:rPr lang="en-US" sz="1800" b="0" kern="1200" dirty="0" smtClean="0">
-                          <a:solidFill>
-                            <a:schemeClr val="lt1"/>
-                          </a:solidFill>
-                          <a:latin typeface="+mn-lt"/>
-                          <a:ea typeface="+mn-ea"/>
-                          <a:cs typeface="+mn-cs"/>
-                        </a:rPr>
-                        <a:t>}</a:t>
-                      </a:r>
-                    </a:p>
-                    <a:p>
-                      <a:r>
-                        <a:rPr lang="en-US" b="0" dirty="0" smtClean="0"/>
-                        <a:t>ERROR:</a:t>
-                      </a:r>
-                      <a:r>
-                        <a:rPr lang="en-US" b="0" baseline="0" dirty="0" smtClean="0"/>
-                        <a:t> </a:t>
-                      </a:r>
-                      <a:r>
-                        <a:rPr lang="en-US" sz="1800" b="0" kern="1200" dirty="0" smtClean="0">
-                          <a:solidFill>
-                            <a:schemeClr val="lt1"/>
-                          </a:solidFill>
-                          <a:latin typeface="+mn-lt"/>
-                          <a:ea typeface="+mn-ea"/>
-                          <a:cs typeface="+mn-cs"/>
-                        </a:rPr>
-                        <a:t>'void f(</a:t>
-                      </a:r>
-                      <a:r>
-                        <a:rPr lang="en-US" sz="1800" b="0" kern="1200" dirty="0" err="1" smtClean="0">
-                          <a:solidFill>
-                            <a:schemeClr val="lt1"/>
-                          </a:solidFill>
-                          <a:latin typeface="+mn-lt"/>
-                          <a:ea typeface="+mn-ea"/>
-                          <a:cs typeface="+mn-cs"/>
-                        </a:rPr>
-                        <a:t>int</a:t>
-                      </a:r>
-                      <a:r>
-                        <a:rPr lang="en-US" sz="1800" b="0" kern="1200" dirty="0" smtClean="0">
-                          <a:solidFill>
-                            <a:schemeClr val="lt1"/>
-                          </a:solidFill>
-                          <a:latin typeface="+mn-lt"/>
-                          <a:ea typeface="+mn-ea"/>
-                          <a:cs typeface="+mn-cs"/>
-                        </a:rPr>
-                        <a:t>)' : overloaded function differs only by return type from '</a:t>
-                      </a:r>
-                      <a:r>
-                        <a:rPr lang="en-US" sz="1800" b="0" kern="1200" dirty="0" err="1" smtClean="0">
-                          <a:solidFill>
-                            <a:schemeClr val="lt1"/>
-                          </a:solidFill>
-                          <a:latin typeface="+mn-lt"/>
-                          <a:ea typeface="+mn-ea"/>
-                          <a:cs typeface="+mn-cs"/>
-                        </a:rPr>
-                        <a:t>int</a:t>
-                      </a:r>
-                      <a:r>
-                        <a:rPr lang="en-US" sz="1800" b="0" kern="1200" dirty="0" smtClean="0">
-                          <a:solidFill>
-                            <a:schemeClr val="lt1"/>
-                          </a:solidFill>
-                          <a:latin typeface="+mn-lt"/>
-                          <a:ea typeface="+mn-ea"/>
-                          <a:cs typeface="+mn-cs"/>
-                        </a:rPr>
-                        <a:t> f(</a:t>
-                      </a:r>
-                      <a:r>
-                        <a:rPr lang="en-US" sz="1800" b="0" kern="1200" dirty="0" err="1" smtClean="0">
-                          <a:solidFill>
-                            <a:schemeClr val="lt1"/>
-                          </a:solidFill>
-                          <a:latin typeface="+mn-lt"/>
-                          <a:ea typeface="+mn-ea"/>
-                          <a:cs typeface="+mn-cs"/>
-                        </a:rPr>
-                        <a:t>int</a:t>
-                      </a:r>
-                      <a:r>
-                        <a:rPr lang="en-US" sz="1800" b="0" kern="1200" dirty="0" smtClean="0">
-                          <a:solidFill>
-                            <a:schemeClr val="lt1"/>
-                          </a:solidFill>
-                          <a:latin typeface="+mn-lt"/>
-                          <a:ea typeface="+mn-ea"/>
-                          <a:cs typeface="+mn-cs"/>
-                        </a:rPr>
-                        <a:t>)'</a:t>
-                      </a:r>
-                      <a:endParaRPr lang="en-US" b="0" dirty="0"/>
-                    </a:p>
-                  </a:txBody>
-                  <a:tcPr/>
-                </a:tc>
-              </a:tr>
-            </a:tbl>
-          </a:graphicData>
-        </a:graphic>
-      </p:graphicFrame>
+      <p:sp>
+        <p:nvSpPr>
+          <p:cNvPr id="7" name="Скругленный прямоугольник 6"/>
+          <p:cNvSpPr/>
+          <p:nvPr/>
+        </p:nvSpPr>
+        <p:spPr>
+          <a:xfrm>
+            <a:off x="228600" y="1143000"/>
+            <a:ext cx="8610600" cy="5562600"/>
+          </a:xfrm>
+          <a:prstGeom prst="roundRect">
+            <a:avLst/>
+          </a:prstGeom>
+        </p:spPr>
+        <p:style>
+          <a:lnRef idx="2">
+            <a:schemeClr val="accent1">
+              <a:shade val="50000"/>
+            </a:schemeClr>
+          </a:lnRef>
+          <a:fillRef idx="1">
+            <a:schemeClr val="accent1"/>
+          </a:fillRef>
+          <a:effectRef idx="0">
+            <a:schemeClr val="accent1"/>
+          </a:effectRef>
+          <a:fontRef idx="minor">
+            <a:schemeClr val="lt1"/>
+          </a:fontRef>
+        </p:style>
+        <p:txBody>
+          <a:bodyPr rtlCol="0" anchor="ctr"/>
+          <a:lstStyle/>
+          <a:p>
+            <a:r>
+              <a:rPr lang="en-US" dirty="0" smtClean="0">
+                <a:latin typeface="Consolas" pitchFamily="49" charset="0"/>
+                <a:cs typeface="Consolas" pitchFamily="49" charset="0"/>
+              </a:rPr>
+              <a:t>// </a:t>
+            </a:r>
+            <a:r>
+              <a:rPr lang="en-US" dirty="0" err="1" smtClean="0">
+                <a:latin typeface="Consolas" pitchFamily="49" charset="0"/>
+                <a:cs typeface="Consolas" pitchFamily="49" charset="0"/>
+              </a:rPr>
+              <a:t>a.h</a:t>
+            </a:r>
+            <a:endParaRPr lang="en-US" dirty="0" smtClean="0">
+              <a:latin typeface="Consolas" pitchFamily="49" charset="0"/>
+              <a:cs typeface="Consolas" pitchFamily="49" charset="0"/>
+            </a:endParaRPr>
+          </a:p>
+          <a:p>
+            <a:pPr>
+              <a:defRPr/>
+            </a:pPr>
+            <a:r>
+              <a:rPr lang="en-US" dirty="0" err="1" smtClean="0">
+                <a:latin typeface="Consolas" pitchFamily="49" charset="0"/>
+                <a:cs typeface="Consolas" pitchFamily="49" charset="0"/>
+              </a:rPr>
+              <a:t>int</a:t>
+            </a:r>
+            <a:r>
+              <a:rPr lang="en-US" dirty="0" smtClean="0">
+                <a:latin typeface="Consolas" pitchFamily="49" charset="0"/>
+                <a:cs typeface="Consolas" pitchFamily="49" charset="0"/>
+              </a:rPr>
+              <a:t> f( </a:t>
+            </a:r>
+            <a:r>
+              <a:rPr lang="en-US" dirty="0" err="1" smtClean="0">
+                <a:latin typeface="Consolas" pitchFamily="49" charset="0"/>
+                <a:cs typeface="Consolas" pitchFamily="49" charset="0"/>
+              </a:rPr>
+              <a:t>int</a:t>
+            </a:r>
+            <a:r>
+              <a:rPr lang="en-US" dirty="0" smtClean="0">
+                <a:latin typeface="Consolas" pitchFamily="49" charset="0"/>
+                <a:cs typeface="Consolas" pitchFamily="49" charset="0"/>
+              </a:rPr>
+              <a:t> x ); // comment to delete error</a:t>
+            </a:r>
+          </a:p>
+          <a:p>
+            <a:endParaRPr lang="en-US" dirty="0" smtClean="0">
+              <a:latin typeface="Consolas" pitchFamily="49" charset="0"/>
+              <a:cs typeface="Consolas" pitchFamily="49" charset="0"/>
+            </a:endParaRPr>
+          </a:p>
+          <a:p>
+            <a:r>
+              <a:rPr lang="en-US" dirty="0" smtClean="0">
+                <a:latin typeface="Consolas" pitchFamily="49" charset="0"/>
+                <a:cs typeface="Consolas" pitchFamily="49" charset="0"/>
+              </a:rPr>
+              <a:t>// a.cpp</a:t>
+            </a:r>
+          </a:p>
+          <a:p>
+            <a:r>
+              <a:rPr lang="en-US" dirty="0" err="1" smtClean="0">
+                <a:latin typeface="Consolas" pitchFamily="49" charset="0"/>
+                <a:cs typeface="Consolas" pitchFamily="49" charset="0"/>
+              </a:rPr>
+              <a:t>int</a:t>
+            </a:r>
+            <a:r>
+              <a:rPr lang="en-US" dirty="0" smtClean="0">
+                <a:latin typeface="Consolas" pitchFamily="49" charset="0"/>
+                <a:cs typeface="Consolas" pitchFamily="49" charset="0"/>
+              </a:rPr>
+              <a:t> f( </a:t>
+            </a:r>
+            <a:r>
+              <a:rPr lang="en-US" dirty="0" err="1" smtClean="0">
+                <a:latin typeface="Consolas" pitchFamily="49" charset="0"/>
+                <a:cs typeface="Consolas" pitchFamily="49" charset="0"/>
+              </a:rPr>
+              <a:t>int</a:t>
+            </a:r>
+            <a:r>
+              <a:rPr lang="en-US" dirty="0" smtClean="0">
+                <a:latin typeface="Consolas" pitchFamily="49" charset="0"/>
+                <a:cs typeface="Consolas" pitchFamily="49" charset="0"/>
+              </a:rPr>
+              <a:t> x )</a:t>
+            </a:r>
+          </a:p>
+          <a:p>
+            <a:r>
+              <a:rPr lang="en-US" dirty="0" smtClean="0">
+                <a:latin typeface="Consolas" pitchFamily="49" charset="0"/>
+                <a:cs typeface="Consolas" pitchFamily="49" charset="0"/>
+              </a:rPr>
+              <a:t>{</a:t>
+            </a:r>
+          </a:p>
+          <a:p>
+            <a:r>
+              <a:rPr lang="en-US" dirty="0" smtClean="0">
+                <a:latin typeface="Consolas" pitchFamily="49" charset="0"/>
+                <a:cs typeface="Consolas" pitchFamily="49" charset="0"/>
+              </a:rPr>
+              <a:t>      return x;</a:t>
+            </a:r>
+          </a:p>
+          <a:p>
+            <a:r>
+              <a:rPr lang="en-US" dirty="0" smtClean="0">
+                <a:latin typeface="Consolas" pitchFamily="49" charset="0"/>
+                <a:cs typeface="Consolas" pitchFamily="49" charset="0"/>
+              </a:rPr>
+              <a:t>};</a:t>
+            </a:r>
+          </a:p>
+          <a:p>
+            <a:endParaRPr lang="en-US" dirty="0" smtClean="0">
+              <a:latin typeface="Consolas" pitchFamily="49" charset="0"/>
+              <a:cs typeface="Consolas" pitchFamily="49" charset="0"/>
+            </a:endParaRPr>
+          </a:p>
+          <a:p>
+            <a:r>
+              <a:rPr lang="en-US" dirty="0" smtClean="0">
+                <a:latin typeface="Consolas" pitchFamily="49" charset="0"/>
+                <a:cs typeface="Consolas" pitchFamily="49" charset="0"/>
+              </a:rPr>
+              <a:t>// main.cpp</a:t>
+            </a:r>
+          </a:p>
+          <a:p>
+            <a:r>
+              <a:rPr lang="en-US" dirty="0" smtClean="0">
+                <a:latin typeface="Consolas" pitchFamily="49" charset="0"/>
+                <a:cs typeface="Consolas" pitchFamily="49" charset="0"/>
+              </a:rPr>
+              <a:t>void f( </a:t>
+            </a:r>
+            <a:r>
+              <a:rPr lang="en-US" dirty="0" err="1" smtClean="0">
+                <a:latin typeface="Consolas" pitchFamily="49" charset="0"/>
+                <a:cs typeface="Consolas" pitchFamily="49" charset="0"/>
+              </a:rPr>
+              <a:t>int</a:t>
+            </a:r>
+            <a:r>
+              <a:rPr lang="en-US" dirty="0" smtClean="0">
+                <a:latin typeface="Consolas" pitchFamily="49" charset="0"/>
+                <a:cs typeface="Consolas" pitchFamily="49" charset="0"/>
+              </a:rPr>
+              <a:t> e )</a:t>
+            </a:r>
+          </a:p>
+          <a:p>
+            <a:r>
+              <a:rPr lang="en-US" dirty="0" smtClean="0">
+                <a:latin typeface="Consolas" pitchFamily="49" charset="0"/>
+                <a:cs typeface="Consolas" pitchFamily="49" charset="0"/>
+              </a:rPr>
+              <a:t>{</a:t>
+            </a:r>
+          </a:p>
+          <a:p>
+            <a:r>
+              <a:rPr lang="en-US" dirty="0" smtClean="0">
+                <a:latin typeface="Consolas" pitchFamily="49" charset="0"/>
+                <a:cs typeface="Consolas" pitchFamily="49" charset="0"/>
+              </a:rPr>
+              <a:t>}</a:t>
+            </a:r>
+          </a:p>
+          <a:p>
+            <a:r>
+              <a:rPr lang="en-US" dirty="0" err="1" smtClean="0">
+                <a:latin typeface="Consolas" pitchFamily="49" charset="0"/>
+                <a:cs typeface="Consolas" pitchFamily="49" charset="0"/>
+              </a:rPr>
+              <a:t>int</a:t>
+            </a:r>
+            <a:r>
+              <a:rPr lang="en-US" dirty="0" smtClean="0">
+                <a:latin typeface="Consolas" pitchFamily="49" charset="0"/>
+                <a:cs typeface="Consolas" pitchFamily="49" charset="0"/>
+              </a:rPr>
+              <a:t> main()</a:t>
+            </a:r>
+          </a:p>
+          <a:p>
+            <a:r>
+              <a:rPr lang="en-US" dirty="0" smtClean="0">
+                <a:latin typeface="Consolas" pitchFamily="49" charset="0"/>
+                <a:cs typeface="Consolas" pitchFamily="49" charset="0"/>
+              </a:rPr>
+              <a:t>{</a:t>
+            </a:r>
+          </a:p>
+          <a:p>
+            <a:r>
+              <a:rPr lang="en-US" dirty="0" smtClean="0">
+                <a:latin typeface="Consolas" pitchFamily="49" charset="0"/>
+                <a:cs typeface="Consolas" pitchFamily="49" charset="0"/>
+              </a:rPr>
+              <a:t>     f( 56 );</a:t>
+            </a:r>
+          </a:p>
+          <a:p>
+            <a:r>
+              <a:rPr lang="en-US" dirty="0" smtClean="0">
+                <a:latin typeface="Consolas" pitchFamily="49" charset="0"/>
+                <a:cs typeface="Consolas" pitchFamily="49" charset="0"/>
+              </a:rPr>
+              <a:t>}</a:t>
+            </a:r>
+          </a:p>
+          <a:p>
+            <a:r>
+              <a:rPr lang="en-US" dirty="0" smtClean="0">
+                <a:latin typeface="Consolas" pitchFamily="49" charset="0"/>
+                <a:cs typeface="Consolas" pitchFamily="49" charset="0"/>
+              </a:rPr>
+              <a:t>ERROR: 'void f(</a:t>
+            </a:r>
+            <a:r>
+              <a:rPr lang="en-US" dirty="0" err="1" smtClean="0">
+                <a:latin typeface="Consolas" pitchFamily="49" charset="0"/>
+                <a:cs typeface="Consolas" pitchFamily="49" charset="0"/>
+              </a:rPr>
+              <a:t>int</a:t>
+            </a:r>
+            <a:r>
+              <a:rPr lang="en-US" dirty="0" smtClean="0">
+                <a:latin typeface="Consolas" pitchFamily="49" charset="0"/>
+                <a:cs typeface="Consolas" pitchFamily="49" charset="0"/>
+              </a:rPr>
+              <a:t>)' : overloaded function differs only by return type from '</a:t>
+            </a:r>
+            <a:r>
+              <a:rPr lang="en-US" dirty="0" err="1" smtClean="0">
+                <a:latin typeface="Consolas" pitchFamily="49" charset="0"/>
+                <a:cs typeface="Consolas" pitchFamily="49" charset="0"/>
+              </a:rPr>
+              <a:t>int</a:t>
+            </a:r>
+            <a:r>
+              <a:rPr lang="en-US" dirty="0" smtClean="0">
+                <a:latin typeface="Consolas" pitchFamily="49" charset="0"/>
+                <a:cs typeface="Consolas" pitchFamily="49" charset="0"/>
+              </a:rPr>
+              <a:t> f(</a:t>
+            </a:r>
+            <a:r>
+              <a:rPr lang="en-US" dirty="0" err="1" smtClean="0">
+                <a:latin typeface="Consolas" pitchFamily="49" charset="0"/>
+                <a:cs typeface="Consolas" pitchFamily="49" charset="0"/>
+              </a:rPr>
+              <a:t>int</a:t>
+            </a:r>
+            <a:r>
+              <a:rPr lang="en-US" dirty="0" smtClean="0">
+                <a:latin typeface="Consolas" pitchFamily="49" charset="0"/>
+                <a:cs typeface="Consolas" pitchFamily="49" charset="0"/>
+              </a:rPr>
+              <a:t>)'</a:t>
+            </a:r>
+            <a:endParaRPr lang="en-US" dirty="0">
+              <a:latin typeface="Consolas" pitchFamily="49" charset="0"/>
+              <a:cs typeface="Consolas" pitchFamily="49" charset="0"/>
+            </a:endParaRPr>
+          </a:p>
+        </p:txBody>
+      </p:sp>
     </p:spTree>
   </p:cSld>
   <p:clrMapOvr>
     <a:masterClrMapping/>
   </p:clrMapOvr>
+  <p:timing>
+    <p:tnLst>
+      <p:par>
+        <p:cTn id="1" dur="indefinite" restart="never" nodeType="tmRoot"/>
+      </p:par>
+    </p:tnLst>
+  </p:timing>
 </p:sld>
 </file>
 

</xml_diff>